<commit_message>
update project steps and articles
</commit_message>
<xml_diff>
--- a/Things we did in project.pptx
+++ b/Things we did in project.pptx
@@ -5,7 +5,7 @@
     <p:sldMasterId id="2147483672" r:id="rId1"/>
   </p:sldMasterIdLst>
   <p:notesMasterIdLst>
-    <p:notesMasterId r:id="rId7"/>
+    <p:notesMasterId r:id="rId12"/>
   </p:notesMasterIdLst>
   <p:sldIdLst>
     <p:sldId id="256" r:id="rId2"/>
@@ -13,6 +13,11 @@
     <p:sldId id="264" r:id="rId4"/>
     <p:sldId id="265" r:id="rId5"/>
     <p:sldId id="266" r:id="rId6"/>
+    <p:sldId id="267" r:id="rId7"/>
+    <p:sldId id="268" r:id="rId8"/>
+    <p:sldId id="269" r:id="rId9"/>
+    <p:sldId id="270" r:id="rId10"/>
+    <p:sldId id="271" r:id="rId11"/>
   </p:sldIdLst>
   <p:sldSz cx="12192000" cy="6858000"/>
   <p:notesSz cx="6858000" cy="9144000"/>
@@ -14409,6 +14414,320 @@
 </p:sld>
 </file>
 
+<file path=ppt/slides/slide10.xml><?xml version="1.0" encoding="utf-8"?>
+<p:sld xmlns:a="http://schemas.openxmlformats.org/drawingml/2006/main" xmlns:r="http://schemas.openxmlformats.org/officeDocument/2006/relationships" xmlns:p="http://schemas.openxmlformats.org/presentationml/2006/main">
+  <p:cSld>
+    <p:spTree>
+      <p:nvGrpSpPr>
+        <p:cNvPr id="1" name=""/>
+        <p:cNvGrpSpPr/>
+        <p:nvPr/>
+      </p:nvGrpSpPr>
+      <p:grpSpPr>
+        <a:xfrm>
+          <a:off x="0" y="0"/>
+          <a:ext cx="0" cy="0"/>
+          <a:chOff x="0" y="0"/>
+          <a:chExt cx="0" cy="0"/>
+        </a:xfrm>
+      </p:grpSpPr>
+      <p:sp>
+        <p:nvSpPr>
+          <p:cNvPr id="2" name="כותרת 1">
+            <a:extLst>
+              <a:ext uri="{FF2B5EF4-FFF2-40B4-BE49-F238E27FC236}">
+                <a16:creationId xmlns:a16="http://schemas.microsoft.com/office/drawing/2014/main" id="{5EF63109-57FF-4909-8FC9-A7AD1F49FC56}"/>
+              </a:ext>
+            </a:extLst>
+          </p:cNvPr>
+          <p:cNvSpPr>
+            <a:spLocks noGrp="1"/>
+          </p:cNvSpPr>
+          <p:nvPr>
+            <p:ph type="title"/>
+          </p:nvPr>
+        </p:nvSpPr>
+        <p:spPr/>
+        <p:txBody>
+          <a:bodyPr/>
+          <a:lstStyle/>
+          <a:p>
+            <a:r>
+              <a:rPr lang="en-US" dirty="0"/>
+              <a:t>Main things we did and challenges</a:t>
+            </a:r>
+            <a:endParaRPr lang="he-IL" dirty="0"/>
+          </a:p>
+        </p:txBody>
+      </p:sp>
+      <p:sp>
+        <p:nvSpPr>
+          <p:cNvPr id="4" name="מציין מיקום תוכן 3">
+            <a:extLst>
+              <a:ext uri="{FF2B5EF4-FFF2-40B4-BE49-F238E27FC236}">
+                <a16:creationId xmlns:a16="http://schemas.microsoft.com/office/drawing/2014/main" id="{D1512E5A-B809-4F4B-A4ED-D899E7C8424A}"/>
+              </a:ext>
+            </a:extLst>
+          </p:cNvPr>
+          <p:cNvSpPr>
+            <a:spLocks noGrp="1"/>
+          </p:cNvSpPr>
+          <p:nvPr>
+            <p:ph sz="half" idx="2"/>
+          </p:nvPr>
+        </p:nvSpPr>
+        <p:spPr>
+          <a:xfrm>
+            <a:off x="1154954" y="2603500"/>
+            <a:ext cx="9878917" cy="3416300"/>
+          </a:xfrm>
+        </p:spPr>
+        <p:txBody>
+          <a:bodyPr/>
+          <a:lstStyle/>
+          <a:p>
+            <a:pPr algn="l" rtl="0"/>
+            <a:r>
+              <a:rPr lang="en-US" dirty="0"/>
+              <a:t>Classification of reviews (supervised model)</a:t>
+            </a:r>
+          </a:p>
+          <a:p>
+            <a:pPr lvl="1" algn="l" rtl="0"/>
+            <a:r>
+              <a:rPr lang="en-US" dirty="0"/>
+              <a:t>..continue</a:t>
+            </a:r>
+          </a:p>
+          <a:p>
+            <a:pPr lvl="1" algn="l" rtl="0"/>
+            <a:endParaRPr lang="en-US" dirty="0"/>
+          </a:p>
+          <a:p>
+            <a:pPr lvl="1" algn="l" rtl="0"/>
+            <a:endParaRPr lang="he-IL" dirty="0"/>
+          </a:p>
+        </p:txBody>
+      </p:sp>
+      <p:sp>
+        <p:nvSpPr>
+          <p:cNvPr id="6" name="תיבת טקסט 5">
+            <a:extLst>
+              <a:ext uri="{FF2B5EF4-FFF2-40B4-BE49-F238E27FC236}">
+                <a16:creationId xmlns:a16="http://schemas.microsoft.com/office/drawing/2014/main" id="{43DD3447-9580-41B5-B558-7F65504323AE}"/>
+              </a:ext>
+            </a:extLst>
+          </p:cNvPr>
+          <p:cNvSpPr txBox="1"/>
+          <p:nvPr/>
+        </p:nvSpPr>
+        <p:spPr>
+          <a:xfrm>
+            <a:off x="1280808" y="5835134"/>
+            <a:ext cx="1524212" cy="369332"/>
+          </a:xfrm>
+          <a:prstGeom prst="rect">
+            <a:avLst/>
+          </a:prstGeom>
+          <a:noFill/>
+        </p:spPr>
+        <p:txBody>
+          <a:bodyPr wrap="square" rtlCol="1">
+            <a:spAutoFit/>
+          </a:bodyPr>
+          <a:lstStyle/>
+          <a:p>
+            <a:r>
+              <a:rPr lang="en-US" dirty="0" err="1"/>
+              <a:t>FastText</a:t>
+            </a:r>
+            <a:endParaRPr lang="he-IL" dirty="0"/>
+          </a:p>
+        </p:txBody>
+      </p:sp>
+      <p:pic>
+        <p:nvPicPr>
+          <p:cNvPr id="3" name="תמונה 2">
+            <a:extLst>
+              <a:ext uri="{FF2B5EF4-FFF2-40B4-BE49-F238E27FC236}">
+                <a16:creationId xmlns:a16="http://schemas.microsoft.com/office/drawing/2014/main" id="{07668EC8-73FF-4C26-88E2-D40D99D18281}"/>
+              </a:ext>
+            </a:extLst>
+          </p:cNvPr>
+          <p:cNvPicPr>
+            <a:picLocks noChangeAspect="1"/>
+          </p:cNvPicPr>
+          <p:nvPr/>
+        </p:nvPicPr>
+        <p:blipFill>
+          <a:blip r:embed="rId2"/>
+          <a:stretch>
+            <a:fillRect/>
+          </a:stretch>
+        </p:blipFill>
+        <p:spPr>
+          <a:xfrm>
+            <a:off x="1154954" y="4814021"/>
+            <a:ext cx="1524213" cy="809738"/>
+          </a:xfrm>
+          <a:prstGeom prst="rect">
+            <a:avLst/>
+          </a:prstGeom>
+        </p:spPr>
+      </p:pic>
+      <p:sp>
+        <p:nvSpPr>
+          <p:cNvPr id="9" name="תיבת טקסט 8">
+            <a:extLst>
+              <a:ext uri="{FF2B5EF4-FFF2-40B4-BE49-F238E27FC236}">
+                <a16:creationId xmlns:a16="http://schemas.microsoft.com/office/drawing/2014/main" id="{6D1E9806-7DBD-4ED1-92D8-CD7C96DDFEAD}"/>
+              </a:ext>
+            </a:extLst>
+          </p:cNvPr>
+          <p:cNvSpPr txBox="1"/>
+          <p:nvPr/>
+        </p:nvSpPr>
+        <p:spPr>
+          <a:xfrm>
+            <a:off x="7335560" y="5916917"/>
+            <a:ext cx="3698311" cy="646331"/>
+          </a:xfrm>
+          <a:prstGeom prst="rect">
+            <a:avLst/>
+          </a:prstGeom>
+          <a:noFill/>
+        </p:spPr>
+        <p:txBody>
+          <a:bodyPr wrap="square" rtlCol="1">
+            <a:spAutoFit/>
+          </a:bodyPr>
+          <a:lstStyle/>
+          <a:p>
+            <a:r>
+              <a:rPr lang="en-US" dirty="0" err="1"/>
+              <a:t>FastText</a:t>
+            </a:r>
+            <a:r>
+              <a:rPr lang="en-US" dirty="0"/>
+              <a:t> with cleaned text and learning rate=0.05, epochs=30</a:t>
+            </a:r>
+            <a:endParaRPr lang="he-IL" dirty="0"/>
+          </a:p>
+        </p:txBody>
+      </p:sp>
+      <p:pic>
+        <p:nvPicPr>
+          <p:cNvPr id="7" name="תמונה 6">
+            <a:extLst>
+              <a:ext uri="{FF2B5EF4-FFF2-40B4-BE49-F238E27FC236}">
+                <a16:creationId xmlns:a16="http://schemas.microsoft.com/office/drawing/2014/main" id="{640D5ADA-1733-49DA-8B71-046B3ED16637}"/>
+              </a:ext>
+            </a:extLst>
+          </p:cNvPr>
+          <p:cNvPicPr>
+            <a:picLocks noChangeAspect="1"/>
+          </p:cNvPicPr>
+          <p:nvPr/>
+        </p:nvPicPr>
+        <p:blipFill>
+          <a:blip r:embed="rId3"/>
+          <a:stretch>
+            <a:fillRect/>
+          </a:stretch>
+        </p:blipFill>
+        <p:spPr>
+          <a:xfrm>
+            <a:off x="3906658" y="4727559"/>
+            <a:ext cx="1629002" cy="771633"/>
+          </a:xfrm>
+          <a:prstGeom prst="rect">
+            <a:avLst/>
+          </a:prstGeom>
+        </p:spPr>
+      </p:pic>
+      <p:pic>
+        <p:nvPicPr>
+          <p:cNvPr id="8" name="תמונה 7">
+            <a:extLst>
+              <a:ext uri="{FF2B5EF4-FFF2-40B4-BE49-F238E27FC236}">
+                <a16:creationId xmlns:a16="http://schemas.microsoft.com/office/drawing/2014/main" id="{371B6D2D-36EA-4C29-A6F9-1DEEAF05421A}"/>
+              </a:ext>
+            </a:extLst>
+          </p:cNvPr>
+          <p:cNvPicPr>
+            <a:picLocks noChangeAspect="1"/>
+          </p:cNvPicPr>
+          <p:nvPr/>
+        </p:nvPicPr>
+        <p:blipFill>
+          <a:blip r:embed="rId4"/>
+          <a:stretch>
+            <a:fillRect/>
+          </a:stretch>
+        </p:blipFill>
+        <p:spPr>
+          <a:xfrm>
+            <a:off x="8207982" y="4727559"/>
+            <a:ext cx="1943371" cy="943107"/>
+          </a:xfrm>
+          <a:prstGeom prst="rect">
+            <a:avLst/>
+          </a:prstGeom>
+        </p:spPr>
+      </p:pic>
+      <p:sp>
+        <p:nvSpPr>
+          <p:cNvPr id="12" name="תיבת טקסט 11">
+            <a:extLst>
+              <a:ext uri="{FF2B5EF4-FFF2-40B4-BE49-F238E27FC236}">
+                <a16:creationId xmlns:a16="http://schemas.microsoft.com/office/drawing/2014/main" id="{D30248E4-FC93-420E-B000-C5460B31A626}"/>
+              </a:ext>
+            </a:extLst>
+          </p:cNvPr>
+          <p:cNvSpPr txBox="1"/>
+          <p:nvPr/>
+        </p:nvSpPr>
+        <p:spPr>
+          <a:xfrm>
+            <a:off x="3542311" y="5937274"/>
+            <a:ext cx="3698311" cy="369332"/>
+          </a:xfrm>
+          <a:prstGeom prst="rect">
+            <a:avLst/>
+          </a:prstGeom>
+          <a:noFill/>
+        </p:spPr>
+        <p:txBody>
+          <a:bodyPr wrap="square" rtlCol="1">
+            <a:spAutoFit/>
+          </a:bodyPr>
+          <a:lstStyle/>
+          <a:p>
+            <a:r>
+              <a:rPr lang="en-US" dirty="0" err="1"/>
+              <a:t>FastText</a:t>
+            </a:r>
+            <a:r>
+              <a:rPr lang="en-US" dirty="0"/>
+              <a:t> with cleaned text</a:t>
+            </a:r>
+            <a:endParaRPr lang="he-IL" dirty="0"/>
+          </a:p>
+        </p:txBody>
+      </p:sp>
+    </p:spTree>
+    <p:extLst>
+      <p:ext uri="{BB962C8B-B14F-4D97-AF65-F5344CB8AC3E}">
+        <p14:creationId xmlns:p14="http://schemas.microsoft.com/office/powerpoint/2010/main" val="2447700099"/>
+      </p:ext>
+    </p:extLst>
+  </p:cSld>
+  <p:clrMapOvr>
+    <a:masterClrMapping/>
+  </p:clrMapOvr>
+</p:sld>
+</file>
+
 <file path=ppt/slides/slide2.xml><?xml version="1.0" encoding="utf-8"?>
 <p:sld xmlns:a="http://schemas.openxmlformats.org/drawingml/2006/main" xmlns:r="http://schemas.openxmlformats.org/officeDocument/2006/relationships" xmlns:p="http://schemas.openxmlformats.org/presentationml/2006/main">
   <p:cSld>
@@ -15017,6 +15336,947 @@
     <p:extLst>
       <p:ext uri="{BB962C8B-B14F-4D97-AF65-F5344CB8AC3E}">
         <p14:creationId xmlns:p14="http://schemas.microsoft.com/office/powerpoint/2010/main" val="594490391"/>
+      </p:ext>
+    </p:extLst>
+  </p:cSld>
+  <p:clrMapOvr>
+    <a:masterClrMapping/>
+  </p:clrMapOvr>
+</p:sld>
+</file>
+
+<file path=ppt/slides/slide6.xml><?xml version="1.0" encoding="utf-8"?>
+<p:sld xmlns:a="http://schemas.openxmlformats.org/drawingml/2006/main" xmlns:r="http://schemas.openxmlformats.org/officeDocument/2006/relationships" xmlns:p="http://schemas.openxmlformats.org/presentationml/2006/main">
+  <p:cSld>
+    <p:spTree>
+      <p:nvGrpSpPr>
+        <p:cNvPr id="1" name=""/>
+        <p:cNvGrpSpPr/>
+        <p:nvPr/>
+      </p:nvGrpSpPr>
+      <p:grpSpPr>
+        <a:xfrm>
+          <a:off x="0" y="0"/>
+          <a:ext cx="0" cy="0"/>
+          <a:chOff x="0" y="0"/>
+          <a:chExt cx="0" cy="0"/>
+        </a:xfrm>
+      </p:grpSpPr>
+      <p:sp>
+        <p:nvSpPr>
+          <p:cNvPr id="2" name="כותרת 1">
+            <a:extLst>
+              <a:ext uri="{FF2B5EF4-FFF2-40B4-BE49-F238E27FC236}">
+                <a16:creationId xmlns:a16="http://schemas.microsoft.com/office/drawing/2014/main" id="{5EF63109-57FF-4909-8FC9-A7AD1F49FC56}"/>
+              </a:ext>
+            </a:extLst>
+          </p:cNvPr>
+          <p:cNvSpPr>
+            <a:spLocks noGrp="1"/>
+          </p:cNvSpPr>
+          <p:nvPr>
+            <p:ph type="title"/>
+          </p:nvPr>
+        </p:nvSpPr>
+        <p:spPr/>
+        <p:txBody>
+          <a:bodyPr/>
+          <a:lstStyle/>
+          <a:p>
+            <a:r>
+              <a:rPr lang="en-US" dirty="0"/>
+              <a:t>Main things we did and challenges</a:t>
+            </a:r>
+            <a:endParaRPr lang="he-IL" dirty="0"/>
+          </a:p>
+        </p:txBody>
+      </p:sp>
+      <p:sp>
+        <p:nvSpPr>
+          <p:cNvPr id="4" name="מציין מיקום תוכן 3">
+            <a:extLst>
+              <a:ext uri="{FF2B5EF4-FFF2-40B4-BE49-F238E27FC236}">
+                <a16:creationId xmlns:a16="http://schemas.microsoft.com/office/drawing/2014/main" id="{D1512E5A-B809-4F4B-A4ED-D899E7C8424A}"/>
+              </a:ext>
+            </a:extLst>
+          </p:cNvPr>
+          <p:cNvSpPr>
+            <a:spLocks noGrp="1"/>
+          </p:cNvSpPr>
+          <p:nvPr>
+            <p:ph sz="half" idx="2"/>
+          </p:nvPr>
+        </p:nvSpPr>
+        <p:spPr>
+          <a:xfrm>
+            <a:off x="1154954" y="2603500"/>
+            <a:ext cx="9878917" cy="3416300"/>
+          </a:xfrm>
+        </p:spPr>
+        <p:txBody>
+          <a:bodyPr/>
+          <a:lstStyle/>
+          <a:p>
+            <a:pPr algn="l" rtl="0"/>
+            <a:r>
+              <a:rPr lang="en-US" dirty="0"/>
+              <a:t>Classification of reviews (supervised model)</a:t>
+            </a:r>
+          </a:p>
+          <a:p>
+            <a:pPr lvl="1" algn="l" rtl="0"/>
+            <a:r>
+              <a:rPr lang="en-US" dirty="0"/>
+              <a:t>Running Dord2Vec and using </a:t>
+            </a:r>
+            <a:r>
+              <a:rPr lang="en-US" dirty="0" err="1"/>
+              <a:t>DecisionTreeClassifier</a:t>
+            </a:r>
+            <a:r>
+              <a:rPr lang="en-US" dirty="0"/>
+              <a:t> , and building model from training dataset only (</a:t>
+            </a:r>
+            <a:r>
+              <a:rPr lang="en-US" i="1" dirty="0" err="1"/>
+              <a:t>model.build_vocab</a:t>
+            </a:r>
+            <a:r>
+              <a:rPr lang="en-US" i="1" dirty="0"/>
+              <a:t>(</a:t>
+            </a:r>
+            <a:r>
+              <a:rPr lang="en-US" i="1" dirty="0" err="1"/>
+              <a:t>train_corpus</a:t>
+            </a:r>
+            <a:r>
+              <a:rPr lang="en-US" i="1" dirty="0"/>
+              <a:t>)</a:t>
+            </a:r>
+            <a:r>
+              <a:rPr lang="en-US" dirty="0"/>
+              <a:t>)</a:t>
+            </a:r>
+          </a:p>
+          <a:p>
+            <a:pPr lvl="1" algn="l" rtl="0"/>
+            <a:r>
+              <a:rPr lang="en-US" dirty="0"/>
+              <a:t>Vector size = 50</a:t>
+            </a:r>
+          </a:p>
+          <a:p>
+            <a:pPr lvl="1" algn="l" rtl="0"/>
+            <a:endParaRPr lang="en-US" dirty="0"/>
+          </a:p>
+          <a:p>
+            <a:pPr lvl="1" algn="l" rtl="0"/>
+            <a:endParaRPr lang="he-IL" dirty="0"/>
+          </a:p>
+        </p:txBody>
+      </p:sp>
+      <p:pic>
+        <p:nvPicPr>
+          <p:cNvPr id="3" name="תמונה 2">
+            <a:extLst>
+              <a:ext uri="{FF2B5EF4-FFF2-40B4-BE49-F238E27FC236}">
+                <a16:creationId xmlns:a16="http://schemas.microsoft.com/office/drawing/2014/main" id="{CFA49558-BC76-45EA-9F7B-CA6EFF1807F5}"/>
+              </a:ext>
+            </a:extLst>
+          </p:cNvPr>
+          <p:cNvPicPr>
+            <a:picLocks noChangeAspect="1"/>
+          </p:cNvPicPr>
+          <p:nvPr/>
+        </p:nvPicPr>
+        <p:blipFill>
+          <a:blip r:embed="rId2"/>
+          <a:stretch>
+            <a:fillRect/>
+          </a:stretch>
+        </p:blipFill>
+        <p:spPr>
+          <a:xfrm>
+            <a:off x="3052671" y="4105008"/>
+            <a:ext cx="5658640" cy="1914792"/>
+          </a:xfrm>
+          <a:prstGeom prst="rect">
+            <a:avLst/>
+          </a:prstGeom>
+        </p:spPr>
+      </p:pic>
+      <p:sp>
+        <p:nvSpPr>
+          <p:cNvPr id="5" name="תיבת טקסט 4">
+            <a:extLst>
+              <a:ext uri="{FF2B5EF4-FFF2-40B4-BE49-F238E27FC236}">
+                <a16:creationId xmlns:a16="http://schemas.microsoft.com/office/drawing/2014/main" id="{33E0E4A0-3E4A-442A-8D9C-E2446D6CA570}"/>
+              </a:ext>
+            </a:extLst>
+          </p:cNvPr>
+          <p:cNvSpPr txBox="1"/>
+          <p:nvPr/>
+        </p:nvSpPr>
+        <p:spPr>
+          <a:xfrm>
+            <a:off x="4922196" y="6138153"/>
+            <a:ext cx="2733472" cy="369332"/>
+          </a:xfrm>
+          <a:prstGeom prst="rect">
+            <a:avLst/>
+          </a:prstGeom>
+          <a:noFill/>
+        </p:spPr>
+        <p:txBody>
+          <a:bodyPr wrap="square" rtlCol="1">
+            <a:spAutoFit/>
+          </a:bodyPr>
+          <a:lstStyle/>
+          <a:p>
+            <a:r>
+              <a:rPr lang="en-US" dirty="0" err="1"/>
+              <a:t>DecisionTree</a:t>
+            </a:r>
+            <a:r>
+              <a:rPr lang="en-US" dirty="0"/>
+              <a:t> Model</a:t>
+            </a:r>
+            <a:endParaRPr lang="he-IL" dirty="0"/>
+          </a:p>
+        </p:txBody>
+      </p:sp>
+    </p:spTree>
+    <p:extLst>
+      <p:ext uri="{BB962C8B-B14F-4D97-AF65-F5344CB8AC3E}">
+        <p14:creationId xmlns:p14="http://schemas.microsoft.com/office/powerpoint/2010/main" val="2157378269"/>
+      </p:ext>
+    </p:extLst>
+  </p:cSld>
+  <p:clrMapOvr>
+    <a:masterClrMapping/>
+  </p:clrMapOvr>
+</p:sld>
+</file>
+
+<file path=ppt/slides/slide7.xml><?xml version="1.0" encoding="utf-8"?>
+<p:sld xmlns:a="http://schemas.openxmlformats.org/drawingml/2006/main" xmlns:r="http://schemas.openxmlformats.org/officeDocument/2006/relationships" xmlns:p="http://schemas.openxmlformats.org/presentationml/2006/main">
+  <p:cSld>
+    <p:spTree>
+      <p:nvGrpSpPr>
+        <p:cNvPr id="1" name=""/>
+        <p:cNvGrpSpPr/>
+        <p:nvPr/>
+      </p:nvGrpSpPr>
+      <p:grpSpPr>
+        <a:xfrm>
+          <a:off x="0" y="0"/>
+          <a:ext cx="0" cy="0"/>
+          <a:chOff x="0" y="0"/>
+          <a:chExt cx="0" cy="0"/>
+        </a:xfrm>
+      </p:grpSpPr>
+      <p:sp>
+        <p:nvSpPr>
+          <p:cNvPr id="2" name="כותרת 1">
+            <a:extLst>
+              <a:ext uri="{FF2B5EF4-FFF2-40B4-BE49-F238E27FC236}">
+                <a16:creationId xmlns:a16="http://schemas.microsoft.com/office/drawing/2014/main" id="{5EF63109-57FF-4909-8FC9-A7AD1F49FC56}"/>
+              </a:ext>
+            </a:extLst>
+          </p:cNvPr>
+          <p:cNvSpPr>
+            <a:spLocks noGrp="1"/>
+          </p:cNvSpPr>
+          <p:nvPr>
+            <p:ph type="title"/>
+          </p:nvPr>
+        </p:nvSpPr>
+        <p:spPr/>
+        <p:txBody>
+          <a:bodyPr/>
+          <a:lstStyle/>
+          <a:p>
+            <a:r>
+              <a:rPr lang="en-US" dirty="0"/>
+              <a:t>Main things we did and challenges</a:t>
+            </a:r>
+            <a:endParaRPr lang="he-IL" dirty="0"/>
+          </a:p>
+        </p:txBody>
+      </p:sp>
+      <p:sp>
+        <p:nvSpPr>
+          <p:cNvPr id="4" name="מציין מיקום תוכן 3">
+            <a:extLst>
+              <a:ext uri="{FF2B5EF4-FFF2-40B4-BE49-F238E27FC236}">
+                <a16:creationId xmlns:a16="http://schemas.microsoft.com/office/drawing/2014/main" id="{D1512E5A-B809-4F4B-A4ED-D899E7C8424A}"/>
+              </a:ext>
+            </a:extLst>
+          </p:cNvPr>
+          <p:cNvSpPr>
+            <a:spLocks noGrp="1"/>
+          </p:cNvSpPr>
+          <p:nvPr>
+            <p:ph sz="half" idx="2"/>
+          </p:nvPr>
+        </p:nvSpPr>
+        <p:spPr>
+          <a:xfrm>
+            <a:off x="1154954" y="2603500"/>
+            <a:ext cx="9878917" cy="3416300"/>
+          </a:xfrm>
+        </p:spPr>
+        <p:txBody>
+          <a:bodyPr/>
+          <a:lstStyle/>
+          <a:p>
+            <a:pPr algn="l" rtl="0"/>
+            <a:r>
+              <a:rPr lang="en-US" dirty="0"/>
+              <a:t>Classification of reviews (supervised model)</a:t>
+            </a:r>
+          </a:p>
+          <a:p>
+            <a:pPr lvl="1" algn="l" rtl="0"/>
+            <a:r>
+              <a:rPr lang="en-US" dirty="0"/>
+              <a:t>..continue</a:t>
+            </a:r>
+          </a:p>
+          <a:p>
+            <a:pPr lvl="1" algn="l" rtl="0"/>
+            <a:endParaRPr lang="en-US" dirty="0"/>
+          </a:p>
+          <a:p>
+            <a:pPr lvl="1" algn="l" rtl="0"/>
+            <a:endParaRPr lang="he-IL" dirty="0"/>
+          </a:p>
+        </p:txBody>
+      </p:sp>
+      <p:pic>
+        <p:nvPicPr>
+          <p:cNvPr id="5" name="תמונה 4">
+            <a:extLst>
+              <a:ext uri="{FF2B5EF4-FFF2-40B4-BE49-F238E27FC236}">
+                <a16:creationId xmlns:a16="http://schemas.microsoft.com/office/drawing/2014/main" id="{657F1462-DC54-4F8B-829E-9840A5F9DD92}"/>
+              </a:ext>
+            </a:extLst>
+          </p:cNvPr>
+          <p:cNvPicPr>
+            <a:picLocks noChangeAspect="1"/>
+          </p:cNvPicPr>
+          <p:nvPr/>
+        </p:nvPicPr>
+        <p:blipFill>
+          <a:blip r:embed="rId2"/>
+          <a:stretch>
+            <a:fillRect/>
+          </a:stretch>
+        </p:blipFill>
+        <p:spPr>
+          <a:xfrm>
+            <a:off x="91948" y="4047850"/>
+            <a:ext cx="5591955" cy="1971950"/>
+          </a:xfrm>
+          <a:prstGeom prst="rect">
+            <a:avLst/>
+          </a:prstGeom>
+        </p:spPr>
+      </p:pic>
+      <p:sp>
+        <p:nvSpPr>
+          <p:cNvPr id="6" name="תיבת טקסט 5">
+            <a:extLst>
+              <a:ext uri="{FF2B5EF4-FFF2-40B4-BE49-F238E27FC236}">
+                <a16:creationId xmlns:a16="http://schemas.microsoft.com/office/drawing/2014/main" id="{43DD3447-9580-41B5-B558-7F65504323AE}"/>
+              </a:ext>
+            </a:extLst>
+          </p:cNvPr>
+          <p:cNvSpPr txBox="1"/>
+          <p:nvPr/>
+        </p:nvSpPr>
+        <p:spPr>
+          <a:xfrm>
+            <a:off x="2276273" y="6215975"/>
+            <a:ext cx="1624519" cy="369332"/>
+          </a:xfrm>
+          <a:prstGeom prst="rect">
+            <a:avLst/>
+          </a:prstGeom>
+          <a:noFill/>
+        </p:spPr>
+        <p:txBody>
+          <a:bodyPr wrap="square" rtlCol="1">
+            <a:spAutoFit/>
+          </a:bodyPr>
+          <a:lstStyle/>
+          <a:p>
+            <a:r>
+              <a:rPr lang="en-US" dirty="0"/>
+              <a:t>SVM Model</a:t>
+            </a:r>
+            <a:endParaRPr lang="he-IL" dirty="0"/>
+          </a:p>
+        </p:txBody>
+      </p:sp>
+      <p:pic>
+        <p:nvPicPr>
+          <p:cNvPr id="7" name="תמונה 6">
+            <a:extLst>
+              <a:ext uri="{FF2B5EF4-FFF2-40B4-BE49-F238E27FC236}">
+                <a16:creationId xmlns:a16="http://schemas.microsoft.com/office/drawing/2014/main" id="{9E24C469-6BE0-4530-A453-0C06960573A8}"/>
+              </a:ext>
+            </a:extLst>
+          </p:cNvPr>
+          <p:cNvPicPr>
+            <a:picLocks noChangeAspect="1"/>
+          </p:cNvPicPr>
+          <p:nvPr/>
+        </p:nvPicPr>
+        <p:blipFill>
+          <a:blip r:embed="rId3"/>
+          <a:stretch>
+            <a:fillRect/>
+          </a:stretch>
+        </p:blipFill>
+        <p:spPr>
+          <a:xfrm>
+            <a:off x="6335656" y="4047850"/>
+            <a:ext cx="5649113" cy="1971950"/>
+          </a:xfrm>
+          <a:prstGeom prst="rect">
+            <a:avLst/>
+          </a:prstGeom>
+        </p:spPr>
+      </p:pic>
+      <p:sp>
+        <p:nvSpPr>
+          <p:cNvPr id="8" name="תיבת טקסט 7">
+            <a:extLst>
+              <a:ext uri="{FF2B5EF4-FFF2-40B4-BE49-F238E27FC236}">
+                <a16:creationId xmlns:a16="http://schemas.microsoft.com/office/drawing/2014/main" id="{AC713C63-930E-4995-AE6D-47382FB40DAF}"/>
+              </a:ext>
+            </a:extLst>
+          </p:cNvPr>
+          <p:cNvSpPr txBox="1"/>
+          <p:nvPr/>
+        </p:nvSpPr>
+        <p:spPr>
+          <a:xfrm>
+            <a:off x="8291210" y="6215975"/>
+            <a:ext cx="2916676" cy="369332"/>
+          </a:xfrm>
+          <a:prstGeom prst="rect">
+            <a:avLst/>
+          </a:prstGeom>
+          <a:noFill/>
+        </p:spPr>
+        <p:txBody>
+          <a:bodyPr wrap="square" rtlCol="1">
+            <a:spAutoFit/>
+          </a:bodyPr>
+          <a:lstStyle/>
+          <a:p>
+            <a:r>
+              <a:rPr lang="en-US" dirty="0" err="1"/>
+              <a:t>RandomForest</a:t>
+            </a:r>
+            <a:r>
+              <a:rPr lang="en-US" dirty="0"/>
+              <a:t> Model</a:t>
+            </a:r>
+            <a:endParaRPr lang="he-IL" dirty="0"/>
+          </a:p>
+        </p:txBody>
+      </p:sp>
+    </p:spTree>
+    <p:extLst>
+      <p:ext uri="{BB962C8B-B14F-4D97-AF65-F5344CB8AC3E}">
+        <p14:creationId xmlns:p14="http://schemas.microsoft.com/office/powerpoint/2010/main" val="1051921710"/>
+      </p:ext>
+    </p:extLst>
+  </p:cSld>
+  <p:clrMapOvr>
+    <a:masterClrMapping/>
+  </p:clrMapOvr>
+</p:sld>
+</file>
+
+<file path=ppt/slides/slide8.xml><?xml version="1.0" encoding="utf-8"?>
+<p:sld xmlns:a="http://schemas.openxmlformats.org/drawingml/2006/main" xmlns:r="http://schemas.openxmlformats.org/officeDocument/2006/relationships" xmlns:p="http://schemas.openxmlformats.org/presentationml/2006/main">
+  <p:cSld>
+    <p:spTree>
+      <p:nvGrpSpPr>
+        <p:cNvPr id="1" name=""/>
+        <p:cNvGrpSpPr/>
+        <p:nvPr/>
+      </p:nvGrpSpPr>
+      <p:grpSpPr>
+        <a:xfrm>
+          <a:off x="0" y="0"/>
+          <a:ext cx="0" cy="0"/>
+          <a:chOff x="0" y="0"/>
+          <a:chExt cx="0" cy="0"/>
+        </a:xfrm>
+      </p:grpSpPr>
+      <p:sp>
+        <p:nvSpPr>
+          <p:cNvPr id="2" name="כותרת 1">
+            <a:extLst>
+              <a:ext uri="{FF2B5EF4-FFF2-40B4-BE49-F238E27FC236}">
+                <a16:creationId xmlns:a16="http://schemas.microsoft.com/office/drawing/2014/main" id="{5EF63109-57FF-4909-8FC9-A7AD1F49FC56}"/>
+              </a:ext>
+            </a:extLst>
+          </p:cNvPr>
+          <p:cNvSpPr>
+            <a:spLocks noGrp="1"/>
+          </p:cNvSpPr>
+          <p:nvPr>
+            <p:ph type="title"/>
+          </p:nvPr>
+        </p:nvSpPr>
+        <p:spPr/>
+        <p:txBody>
+          <a:bodyPr/>
+          <a:lstStyle/>
+          <a:p>
+            <a:r>
+              <a:rPr lang="en-US" dirty="0"/>
+              <a:t>Main things we did and challenges</a:t>
+            </a:r>
+            <a:endParaRPr lang="he-IL" dirty="0"/>
+          </a:p>
+        </p:txBody>
+      </p:sp>
+      <p:sp>
+        <p:nvSpPr>
+          <p:cNvPr id="4" name="מציין מיקום תוכן 3">
+            <a:extLst>
+              <a:ext uri="{FF2B5EF4-FFF2-40B4-BE49-F238E27FC236}">
+                <a16:creationId xmlns:a16="http://schemas.microsoft.com/office/drawing/2014/main" id="{D1512E5A-B809-4F4B-A4ED-D899E7C8424A}"/>
+              </a:ext>
+            </a:extLst>
+          </p:cNvPr>
+          <p:cNvSpPr>
+            <a:spLocks noGrp="1"/>
+          </p:cNvSpPr>
+          <p:nvPr>
+            <p:ph sz="half" idx="2"/>
+          </p:nvPr>
+        </p:nvSpPr>
+        <p:spPr>
+          <a:xfrm>
+            <a:off x="1154954" y="2603500"/>
+            <a:ext cx="9878917" cy="3416300"/>
+          </a:xfrm>
+        </p:spPr>
+        <p:txBody>
+          <a:bodyPr/>
+          <a:lstStyle/>
+          <a:p>
+            <a:pPr algn="l" rtl="0"/>
+            <a:r>
+              <a:rPr lang="en-US" dirty="0"/>
+              <a:t>Classification of reviews (supervised model)</a:t>
+            </a:r>
+          </a:p>
+          <a:p>
+            <a:pPr lvl="1" algn="l" rtl="0"/>
+            <a:r>
+              <a:rPr lang="en-US" dirty="0"/>
+              <a:t>..continue</a:t>
+            </a:r>
+          </a:p>
+          <a:p>
+            <a:pPr lvl="1" algn="l" rtl="0"/>
+            <a:endParaRPr lang="en-US" dirty="0"/>
+          </a:p>
+          <a:p>
+            <a:pPr lvl="1" algn="l" rtl="0"/>
+            <a:endParaRPr lang="he-IL" dirty="0"/>
+          </a:p>
+        </p:txBody>
+      </p:sp>
+      <p:sp>
+        <p:nvSpPr>
+          <p:cNvPr id="6" name="תיבת טקסט 5">
+            <a:extLst>
+              <a:ext uri="{FF2B5EF4-FFF2-40B4-BE49-F238E27FC236}">
+                <a16:creationId xmlns:a16="http://schemas.microsoft.com/office/drawing/2014/main" id="{43DD3447-9580-41B5-B558-7F65504323AE}"/>
+              </a:ext>
+            </a:extLst>
+          </p:cNvPr>
+          <p:cNvSpPr txBox="1"/>
+          <p:nvPr/>
+        </p:nvSpPr>
+        <p:spPr>
+          <a:xfrm>
+            <a:off x="1952016" y="6215975"/>
+            <a:ext cx="3073940" cy="369332"/>
+          </a:xfrm>
+          <a:prstGeom prst="rect">
+            <a:avLst/>
+          </a:prstGeom>
+          <a:noFill/>
+        </p:spPr>
+        <p:txBody>
+          <a:bodyPr wrap="square" rtlCol="1">
+            <a:spAutoFit/>
+          </a:bodyPr>
+          <a:lstStyle/>
+          <a:p>
+            <a:r>
+              <a:rPr lang="en-US" dirty="0"/>
+              <a:t>Logistic Regression Model</a:t>
+            </a:r>
+            <a:endParaRPr lang="he-IL" dirty="0"/>
+          </a:p>
+        </p:txBody>
+      </p:sp>
+      <p:sp>
+        <p:nvSpPr>
+          <p:cNvPr id="8" name="תיבת טקסט 7">
+            <a:extLst>
+              <a:ext uri="{FF2B5EF4-FFF2-40B4-BE49-F238E27FC236}">
+                <a16:creationId xmlns:a16="http://schemas.microsoft.com/office/drawing/2014/main" id="{AC713C63-930E-4995-AE6D-47382FB40DAF}"/>
+              </a:ext>
+            </a:extLst>
+          </p:cNvPr>
+          <p:cNvSpPr txBox="1"/>
+          <p:nvPr/>
+        </p:nvSpPr>
+        <p:spPr>
+          <a:xfrm>
+            <a:off x="8291210" y="6215975"/>
+            <a:ext cx="2916676" cy="369332"/>
+          </a:xfrm>
+          <a:prstGeom prst="rect">
+            <a:avLst/>
+          </a:prstGeom>
+          <a:noFill/>
+        </p:spPr>
+        <p:txBody>
+          <a:bodyPr wrap="square" rtlCol="1">
+            <a:spAutoFit/>
+          </a:bodyPr>
+          <a:lstStyle/>
+          <a:p>
+            <a:r>
+              <a:rPr lang="en-US" dirty="0"/>
+              <a:t>Naive Base Model</a:t>
+            </a:r>
+            <a:endParaRPr lang="he-IL" dirty="0"/>
+          </a:p>
+        </p:txBody>
+      </p:sp>
+      <p:pic>
+        <p:nvPicPr>
+          <p:cNvPr id="3" name="תמונה 2">
+            <a:extLst>
+              <a:ext uri="{FF2B5EF4-FFF2-40B4-BE49-F238E27FC236}">
+                <a16:creationId xmlns:a16="http://schemas.microsoft.com/office/drawing/2014/main" id="{5D37AE59-70DB-45A0-9458-876039244BF3}"/>
+              </a:ext>
+            </a:extLst>
+          </p:cNvPr>
+          <p:cNvPicPr>
+            <a:picLocks noChangeAspect="1"/>
+          </p:cNvPicPr>
+          <p:nvPr/>
+        </p:nvPicPr>
+        <p:blipFill>
+          <a:blip r:embed="rId2"/>
+          <a:stretch>
+            <a:fillRect/>
+          </a:stretch>
+        </p:blipFill>
+        <p:spPr>
+          <a:xfrm>
+            <a:off x="531061" y="3786046"/>
+            <a:ext cx="5915851" cy="2029108"/>
+          </a:xfrm>
+          <a:prstGeom prst="rect">
+            <a:avLst/>
+          </a:prstGeom>
+        </p:spPr>
+      </p:pic>
+      <p:pic>
+        <p:nvPicPr>
+          <p:cNvPr id="9" name="תמונה 8">
+            <a:extLst>
+              <a:ext uri="{FF2B5EF4-FFF2-40B4-BE49-F238E27FC236}">
+                <a16:creationId xmlns:a16="http://schemas.microsoft.com/office/drawing/2014/main" id="{78FB95B7-D7F6-4C22-8E4E-614F546EB462}"/>
+              </a:ext>
+            </a:extLst>
+          </p:cNvPr>
+          <p:cNvPicPr>
+            <a:picLocks noChangeAspect="1"/>
+          </p:cNvPicPr>
+          <p:nvPr/>
+        </p:nvPicPr>
+        <p:blipFill>
+          <a:blip r:embed="rId3"/>
+          <a:stretch>
+            <a:fillRect/>
+          </a:stretch>
+        </p:blipFill>
+        <p:spPr>
+          <a:xfrm>
+            <a:off x="6446912" y="3871783"/>
+            <a:ext cx="5630061" cy="1943371"/>
+          </a:xfrm>
+          <a:prstGeom prst="rect">
+            <a:avLst/>
+          </a:prstGeom>
+        </p:spPr>
+      </p:pic>
+    </p:spTree>
+    <p:extLst>
+      <p:ext uri="{BB962C8B-B14F-4D97-AF65-F5344CB8AC3E}">
+        <p14:creationId xmlns:p14="http://schemas.microsoft.com/office/powerpoint/2010/main" val="2121082668"/>
+      </p:ext>
+    </p:extLst>
+  </p:cSld>
+  <p:clrMapOvr>
+    <a:masterClrMapping/>
+  </p:clrMapOvr>
+</p:sld>
+</file>
+
+<file path=ppt/slides/slide9.xml><?xml version="1.0" encoding="utf-8"?>
+<p:sld xmlns:a="http://schemas.openxmlformats.org/drawingml/2006/main" xmlns:r="http://schemas.openxmlformats.org/officeDocument/2006/relationships" xmlns:p="http://schemas.openxmlformats.org/presentationml/2006/main">
+  <p:cSld>
+    <p:spTree>
+      <p:nvGrpSpPr>
+        <p:cNvPr id="1" name=""/>
+        <p:cNvGrpSpPr/>
+        <p:nvPr/>
+      </p:nvGrpSpPr>
+      <p:grpSpPr>
+        <a:xfrm>
+          <a:off x="0" y="0"/>
+          <a:ext cx="0" cy="0"/>
+          <a:chOff x="0" y="0"/>
+          <a:chExt cx="0" cy="0"/>
+        </a:xfrm>
+      </p:grpSpPr>
+      <p:sp>
+        <p:nvSpPr>
+          <p:cNvPr id="2" name="כותרת 1">
+            <a:extLst>
+              <a:ext uri="{FF2B5EF4-FFF2-40B4-BE49-F238E27FC236}">
+                <a16:creationId xmlns:a16="http://schemas.microsoft.com/office/drawing/2014/main" id="{5EF63109-57FF-4909-8FC9-A7AD1F49FC56}"/>
+              </a:ext>
+            </a:extLst>
+          </p:cNvPr>
+          <p:cNvSpPr>
+            <a:spLocks noGrp="1"/>
+          </p:cNvSpPr>
+          <p:nvPr>
+            <p:ph type="title"/>
+          </p:nvPr>
+        </p:nvSpPr>
+        <p:spPr/>
+        <p:txBody>
+          <a:bodyPr/>
+          <a:lstStyle/>
+          <a:p>
+            <a:r>
+              <a:rPr lang="en-US" dirty="0"/>
+              <a:t>Main things we did and challenges</a:t>
+            </a:r>
+            <a:endParaRPr lang="he-IL" dirty="0"/>
+          </a:p>
+        </p:txBody>
+      </p:sp>
+      <p:sp>
+        <p:nvSpPr>
+          <p:cNvPr id="4" name="מציין מיקום תוכן 3">
+            <a:extLst>
+              <a:ext uri="{FF2B5EF4-FFF2-40B4-BE49-F238E27FC236}">
+                <a16:creationId xmlns:a16="http://schemas.microsoft.com/office/drawing/2014/main" id="{D1512E5A-B809-4F4B-A4ED-D899E7C8424A}"/>
+              </a:ext>
+            </a:extLst>
+          </p:cNvPr>
+          <p:cNvSpPr>
+            <a:spLocks noGrp="1"/>
+          </p:cNvSpPr>
+          <p:nvPr>
+            <p:ph sz="half" idx="2"/>
+          </p:nvPr>
+        </p:nvSpPr>
+        <p:spPr>
+          <a:xfrm>
+            <a:off x="1154954" y="2603500"/>
+            <a:ext cx="9878917" cy="3416300"/>
+          </a:xfrm>
+        </p:spPr>
+        <p:txBody>
+          <a:bodyPr/>
+          <a:lstStyle/>
+          <a:p>
+            <a:pPr algn="l" rtl="0"/>
+            <a:r>
+              <a:rPr lang="en-US" dirty="0"/>
+              <a:t>Classification of reviews (supervised model)</a:t>
+            </a:r>
+          </a:p>
+          <a:p>
+            <a:pPr lvl="1" algn="l" rtl="0"/>
+            <a:r>
+              <a:rPr lang="en-US" dirty="0"/>
+              <a:t>..continue</a:t>
+            </a:r>
+          </a:p>
+          <a:p>
+            <a:pPr lvl="1" algn="l" rtl="0"/>
+            <a:endParaRPr lang="en-US" dirty="0"/>
+          </a:p>
+          <a:p>
+            <a:pPr lvl="1" algn="l" rtl="0"/>
+            <a:endParaRPr lang="he-IL" dirty="0"/>
+          </a:p>
+        </p:txBody>
+      </p:sp>
+      <p:sp>
+        <p:nvSpPr>
+          <p:cNvPr id="6" name="תיבת טקסט 5">
+            <a:extLst>
+              <a:ext uri="{FF2B5EF4-FFF2-40B4-BE49-F238E27FC236}">
+                <a16:creationId xmlns:a16="http://schemas.microsoft.com/office/drawing/2014/main" id="{43DD3447-9580-41B5-B558-7F65504323AE}"/>
+              </a:ext>
+            </a:extLst>
+          </p:cNvPr>
+          <p:cNvSpPr txBox="1"/>
+          <p:nvPr/>
+        </p:nvSpPr>
+        <p:spPr>
+          <a:xfrm>
+            <a:off x="1952016" y="6215975"/>
+            <a:ext cx="3073940" cy="369332"/>
+          </a:xfrm>
+          <a:prstGeom prst="rect">
+            <a:avLst/>
+          </a:prstGeom>
+          <a:noFill/>
+        </p:spPr>
+        <p:txBody>
+          <a:bodyPr wrap="square" rtlCol="1">
+            <a:spAutoFit/>
+          </a:bodyPr>
+          <a:lstStyle/>
+          <a:p>
+            <a:r>
+              <a:rPr lang="en-US" dirty="0" err="1"/>
+              <a:t>LinearSVC</a:t>
+            </a:r>
+            <a:r>
+              <a:rPr lang="en-US" dirty="0"/>
+              <a:t> Model</a:t>
+            </a:r>
+            <a:endParaRPr lang="he-IL" dirty="0"/>
+          </a:p>
+        </p:txBody>
+      </p:sp>
+      <p:pic>
+        <p:nvPicPr>
+          <p:cNvPr id="5" name="תמונה 4">
+            <a:extLst>
+              <a:ext uri="{FF2B5EF4-FFF2-40B4-BE49-F238E27FC236}">
+                <a16:creationId xmlns:a16="http://schemas.microsoft.com/office/drawing/2014/main" id="{6B4E1F83-7DE7-4966-866C-673866BB6590}"/>
+              </a:ext>
+            </a:extLst>
+          </p:cNvPr>
+          <p:cNvPicPr>
+            <a:picLocks noChangeAspect="1"/>
+          </p:cNvPicPr>
+          <p:nvPr/>
+        </p:nvPicPr>
+        <p:blipFill>
+          <a:blip r:embed="rId2"/>
+          <a:stretch>
+            <a:fillRect/>
+          </a:stretch>
+        </p:blipFill>
+        <p:spPr>
+          <a:xfrm>
+            <a:off x="464351" y="3863062"/>
+            <a:ext cx="5630061" cy="1952898"/>
+          </a:xfrm>
+          <a:prstGeom prst="rect">
+            <a:avLst/>
+          </a:prstGeom>
+        </p:spPr>
+      </p:pic>
+      <p:sp>
+        <p:nvSpPr>
+          <p:cNvPr id="10" name="תיבת טקסט 9">
+            <a:extLst>
+              <a:ext uri="{FF2B5EF4-FFF2-40B4-BE49-F238E27FC236}">
+                <a16:creationId xmlns:a16="http://schemas.microsoft.com/office/drawing/2014/main" id="{233EEE49-06ED-4996-A0EB-CE0225E9877D}"/>
+              </a:ext>
+            </a:extLst>
+          </p:cNvPr>
+          <p:cNvSpPr txBox="1"/>
+          <p:nvPr/>
+        </p:nvSpPr>
+        <p:spPr>
+          <a:xfrm>
+            <a:off x="8213387" y="6215975"/>
+            <a:ext cx="3073940" cy="369332"/>
+          </a:xfrm>
+          <a:prstGeom prst="rect">
+            <a:avLst/>
+          </a:prstGeom>
+          <a:noFill/>
+        </p:spPr>
+        <p:txBody>
+          <a:bodyPr wrap="square" rtlCol="1">
+            <a:spAutoFit/>
+          </a:bodyPr>
+          <a:lstStyle/>
+          <a:p>
+            <a:r>
+              <a:rPr lang="en-US" dirty="0"/>
+              <a:t>KNN Model (k=7)</a:t>
+            </a:r>
+            <a:endParaRPr lang="he-IL" dirty="0"/>
+          </a:p>
+        </p:txBody>
+      </p:sp>
+      <p:pic>
+        <p:nvPicPr>
+          <p:cNvPr id="11" name="תמונה 10">
+            <a:extLst>
+              <a:ext uri="{FF2B5EF4-FFF2-40B4-BE49-F238E27FC236}">
+                <a16:creationId xmlns:a16="http://schemas.microsoft.com/office/drawing/2014/main" id="{06455232-D515-401C-9D5C-DF308A8CD444}"/>
+              </a:ext>
+            </a:extLst>
+          </p:cNvPr>
+          <p:cNvPicPr>
+            <a:picLocks noChangeAspect="1"/>
+          </p:cNvPicPr>
+          <p:nvPr/>
+        </p:nvPicPr>
+        <p:blipFill>
+          <a:blip r:embed="rId3"/>
+          <a:stretch>
+            <a:fillRect/>
+          </a:stretch>
+        </p:blipFill>
+        <p:spPr>
+          <a:xfrm>
+            <a:off x="6422601" y="3920220"/>
+            <a:ext cx="5591955" cy="1838582"/>
+          </a:xfrm>
+          <a:prstGeom prst="rect">
+            <a:avLst/>
+          </a:prstGeom>
+        </p:spPr>
+      </p:pic>
+    </p:spTree>
+    <p:extLst>
+      <p:ext uri="{BB962C8B-B14F-4D97-AF65-F5344CB8AC3E}">
+        <p14:creationId xmlns:p14="http://schemas.microsoft.com/office/powerpoint/2010/main" val="2749043660"/>
       </p:ext>
     </p:extLst>
   </p:cSld>

</xml_diff>

<commit_message>
update project steps in pptx file, and add article
</commit_message>
<xml_diff>
--- a/Things we did in project.pptx
+++ b/Things we did in project.pptx
@@ -5,19 +5,23 @@
     <p:sldMasterId id="2147483672" r:id="rId1"/>
   </p:sldMasterIdLst>
   <p:notesMasterIdLst>
-    <p:notesMasterId r:id="rId12"/>
+    <p:notesMasterId r:id="rId16"/>
   </p:notesMasterIdLst>
   <p:sldIdLst>
     <p:sldId id="256" r:id="rId2"/>
     <p:sldId id="263" r:id="rId3"/>
     <p:sldId id="264" r:id="rId4"/>
     <p:sldId id="265" r:id="rId5"/>
-    <p:sldId id="266" r:id="rId6"/>
-    <p:sldId id="267" r:id="rId7"/>
-    <p:sldId id="268" r:id="rId8"/>
-    <p:sldId id="269" r:id="rId9"/>
-    <p:sldId id="270" r:id="rId10"/>
-    <p:sldId id="271" r:id="rId11"/>
+    <p:sldId id="275" r:id="rId6"/>
+    <p:sldId id="274" r:id="rId7"/>
+    <p:sldId id="266" r:id="rId8"/>
+    <p:sldId id="267" r:id="rId9"/>
+    <p:sldId id="268" r:id="rId10"/>
+    <p:sldId id="269" r:id="rId11"/>
+    <p:sldId id="270" r:id="rId12"/>
+    <p:sldId id="271" r:id="rId13"/>
+    <p:sldId id="272" r:id="rId14"/>
+    <p:sldId id="273" r:id="rId15"/>
   </p:sldIdLst>
   <p:sldSz cx="12192000" cy="6858000"/>
   <p:notesSz cx="6858000" cy="9144000"/>
@@ -206,7 +210,7 @@
           <a:p>
             <a:fld id="{99B3FE1B-01D1-459D-875F-8154E6AE5851}" type="datetimeFigureOut">
               <a:rPr lang="he-IL" smtClean="0"/>
-              <a:t>כ"ג/חשון/תשפ"א</a:t>
+              <a:t>א'/כסלו/תשפ"א</a:t>
             </a:fld>
             <a:endParaRPr lang="he-IL"/>
           </a:p>
@@ -808,7 +812,7 @@
           <a:p>
             <a:fld id="{8236B938-022E-4225-A7C0-0A189B935F48}" type="datetimeFigureOut">
               <a:rPr lang="he-IL" smtClean="0"/>
-              <a:t>כ"ג/חשון/תשפ"א</a:t>
+              <a:t>א'/כסלו/תשפ"א</a:t>
             </a:fld>
             <a:endParaRPr lang="he-IL"/>
           </a:p>
@@ -1896,7 +1900,7 @@
           <a:p>
             <a:fld id="{8236B938-022E-4225-A7C0-0A189B935F48}" type="datetimeFigureOut">
               <a:rPr lang="he-IL" smtClean="0"/>
-              <a:t>כ"ג/חשון/תשפ"א</a:t>
+              <a:t>א'/כסלו/תשפ"א</a:t>
             </a:fld>
             <a:endParaRPr lang="he-IL"/>
           </a:p>
@@ -2876,7 +2880,7 @@
           <a:p>
             <a:fld id="{8236B938-022E-4225-A7C0-0A189B935F48}" type="datetimeFigureOut">
               <a:rPr lang="he-IL" smtClean="0"/>
-              <a:t>כ"ג/חשון/תשפ"א</a:t>
+              <a:t>א'/כסלו/תשפ"א</a:t>
             </a:fld>
             <a:endParaRPr lang="he-IL"/>
           </a:p>
@@ -4010,7 +4014,7 @@
           <a:p>
             <a:fld id="{8236B938-022E-4225-A7C0-0A189B935F48}" type="datetimeFigureOut">
               <a:rPr lang="he-IL" smtClean="0"/>
-              <a:t>כ"ג/חשון/תשפ"א</a:t>
+              <a:t>א'/כסלו/תשפ"א</a:t>
             </a:fld>
             <a:endParaRPr lang="he-IL"/>
           </a:p>
@@ -5043,7 +5047,7 @@
           <a:p>
             <a:fld id="{8236B938-022E-4225-A7C0-0A189B935F48}" type="datetimeFigureOut">
               <a:rPr lang="he-IL" smtClean="0"/>
-              <a:t>כ"ג/חשון/תשפ"א</a:t>
+              <a:t>א'/כסלו/תשפ"א</a:t>
             </a:fld>
             <a:endParaRPr lang="he-IL"/>
           </a:p>
@@ -5703,7 +5707,7 @@
           <a:p>
             <a:fld id="{8236B938-022E-4225-A7C0-0A189B935F48}" type="datetimeFigureOut">
               <a:rPr lang="he-IL" smtClean="0"/>
-              <a:t>כ"ג/חשון/תשפ"א</a:t>
+              <a:t>א'/כסלו/תשפ"א</a:t>
             </a:fld>
             <a:endParaRPr lang="he-IL"/>
           </a:p>
@@ -6564,7 +6568,7 @@
           <a:p>
             <a:fld id="{8236B938-022E-4225-A7C0-0A189B935F48}" type="datetimeFigureOut">
               <a:rPr lang="he-IL" smtClean="0"/>
-              <a:t>כ"ג/חשון/תשפ"א</a:t>
+              <a:t>א'/כסלו/תשפ"א</a:t>
             </a:fld>
             <a:endParaRPr lang="he-IL"/>
           </a:p>
@@ -6754,7 +6758,7 @@
           <a:p>
             <a:fld id="{8236B938-022E-4225-A7C0-0A189B935F48}" type="datetimeFigureOut">
               <a:rPr lang="he-IL" smtClean="0"/>
-              <a:t>כ"ג/חשון/תשפ"א</a:t>
+              <a:t>א'/כסלו/תשפ"א</a:t>
             </a:fld>
             <a:endParaRPr lang="he-IL"/>
           </a:p>
@@ -7726,7 +7730,7 @@
           <a:p>
             <a:fld id="{8236B938-022E-4225-A7C0-0A189B935F48}" type="datetimeFigureOut">
               <a:rPr lang="he-IL" smtClean="0"/>
-              <a:t>כ"ג/חשון/תשפ"א</a:t>
+              <a:t>א'/כסלו/תשפ"א</a:t>
             </a:fld>
             <a:endParaRPr lang="he-IL"/>
           </a:p>
@@ -7937,7 +7941,7 @@
           <a:p>
             <a:fld id="{8236B938-022E-4225-A7C0-0A189B935F48}" type="datetimeFigureOut">
               <a:rPr lang="he-IL" smtClean="0"/>
-              <a:t>כ"ג/חשון/תשפ"א</a:t>
+              <a:t>א'/כסלו/תשפ"א</a:t>
             </a:fld>
             <a:endParaRPr lang="he-IL"/>
           </a:p>
@@ -8971,7 +8975,7 @@
           <a:p>
             <a:fld id="{8236B938-022E-4225-A7C0-0A189B935F48}" type="datetimeFigureOut">
               <a:rPr lang="he-IL" smtClean="0"/>
-              <a:t>כ"ג/חשון/תשפ"א</a:t>
+              <a:t>א'/כסלו/תשפ"א</a:t>
             </a:fld>
             <a:endParaRPr lang="he-IL"/>
           </a:p>
@@ -9243,7 +9247,7 @@
           <a:p>
             <a:fld id="{8236B938-022E-4225-A7C0-0A189B935F48}" type="datetimeFigureOut">
               <a:rPr lang="he-IL" smtClean="0"/>
-              <a:t>כ"ג/חשון/תשפ"א</a:t>
+              <a:t>א'/כסלו/תשפ"א</a:t>
             </a:fld>
             <a:endParaRPr lang="he-IL"/>
           </a:p>
@@ -9658,7 +9662,7 @@
           <a:p>
             <a:fld id="{8236B938-022E-4225-A7C0-0A189B935F48}" type="datetimeFigureOut">
               <a:rPr lang="he-IL" smtClean="0"/>
-              <a:t>כ"ג/חשון/תשפ"א</a:t>
+              <a:t>א'/כסלו/תשפ"א</a:t>
             </a:fld>
             <a:endParaRPr lang="he-IL"/>
           </a:p>
@@ -9790,7 +9794,7 @@
           <a:p>
             <a:fld id="{8236B938-022E-4225-A7C0-0A189B935F48}" type="datetimeFigureOut">
               <a:rPr lang="he-IL" smtClean="0"/>
-              <a:t>כ"ג/חשון/תשפ"א</a:t>
+              <a:t>א'/כסלו/תשפ"א</a:t>
             </a:fld>
             <a:endParaRPr lang="he-IL"/>
           </a:p>
@@ -9885,7 +9889,7 @@
           <a:p>
             <a:fld id="{8236B938-022E-4225-A7C0-0A189B935F48}" type="datetimeFigureOut">
               <a:rPr lang="he-IL" smtClean="0"/>
-              <a:t>כ"ג/חשון/תשפ"א</a:t>
+              <a:t>א'/כסלו/תשפ"א</a:t>
             </a:fld>
             <a:endParaRPr lang="he-IL"/>
           </a:p>
@@ -10966,7 +10970,7 @@
           <a:p>
             <a:fld id="{8236B938-022E-4225-A7C0-0A189B935F48}" type="datetimeFigureOut">
               <a:rPr lang="he-IL" smtClean="0"/>
-              <a:t>כ"ג/חשון/תשפ"א</a:t>
+              <a:t>א'/כסלו/תשפ"א</a:t>
             </a:fld>
             <a:endParaRPr lang="he-IL"/>
           </a:p>
@@ -12079,7 +12083,7 @@
           <a:p>
             <a:fld id="{8236B938-022E-4225-A7C0-0A189B935F48}" type="datetimeFigureOut">
               <a:rPr lang="he-IL" smtClean="0"/>
-              <a:t>כ"ג/חשון/תשפ"א</a:t>
+              <a:t>א'/כסלו/תשפ"א</a:t>
             </a:fld>
             <a:endParaRPr lang="he-IL"/>
           </a:p>
@@ -13076,7 +13080,7 @@
           <a:p>
             <a:fld id="{8236B938-022E-4225-A7C0-0A189B935F48}" type="datetimeFigureOut">
               <a:rPr lang="he-IL" smtClean="0"/>
-              <a:t>כ"ג/חשון/תשפ"א</a:t>
+              <a:t>א'/כסלו/תשפ"א</a:t>
             </a:fld>
             <a:endParaRPr lang="he-IL"/>
           </a:p>
@@ -14523,6 +14527,498 @@
         </p:nvSpPr>
         <p:spPr>
           <a:xfrm>
+            <a:off x="1952016" y="6215975"/>
+            <a:ext cx="3073940" cy="369332"/>
+          </a:xfrm>
+          <a:prstGeom prst="rect">
+            <a:avLst/>
+          </a:prstGeom>
+          <a:noFill/>
+        </p:spPr>
+        <p:txBody>
+          <a:bodyPr wrap="square" rtlCol="1">
+            <a:spAutoFit/>
+          </a:bodyPr>
+          <a:lstStyle/>
+          <a:p>
+            <a:r>
+              <a:rPr lang="en-US" dirty="0"/>
+              <a:t>Logistic Regression Model</a:t>
+            </a:r>
+            <a:endParaRPr lang="he-IL" dirty="0"/>
+          </a:p>
+        </p:txBody>
+      </p:sp>
+      <p:sp>
+        <p:nvSpPr>
+          <p:cNvPr id="8" name="תיבת טקסט 7">
+            <a:extLst>
+              <a:ext uri="{FF2B5EF4-FFF2-40B4-BE49-F238E27FC236}">
+                <a16:creationId xmlns:a16="http://schemas.microsoft.com/office/drawing/2014/main" id="{AC713C63-930E-4995-AE6D-47382FB40DAF}"/>
+              </a:ext>
+            </a:extLst>
+          </p:cNvPr>
+          <p:cNvSpPr txBox="1"/>
+          <p:nvPr/>
+        </p:nvSpPr>
+        <p:spPr>
+          <a:xfrm>
+            <a:off x="8291210" y="6215975"/>
+            <a:ext cx="2916676" cy="369332"/>
+          </a:xfrm>
+          <a:prstGeom prst="rect">
+            <a:avLst/>
+          </a:prstGeom>
+          <a:noFill/>
+        </p:spPr>
+        <p:txBody>
+          <a:bodyPr wrap="square" rtlCol="1">
+            <a:spAutoFit/>
+          </a:bodyPr>
+          <a:lstStyle/>
+          <a:p>
+            <a:r>
+              <a:rPr lang="en-US" dirty="0"/>
+              <a:t>Naive Base Model</a:t>
+            </a:r>
+            <a:endParaRPr lang="he-IL" dirty="0"/>
+          </a:p>
+        </p:txBody>
+      </p:sp>
+      <p:pic>
+        <p:nvPicPr>
+          <p:cNvPr id="3" name="תמונה 2">
+            <a:extLst>
+              <a:ext uri="{FF2B5EF4-FFF2-40B4-BE49-F238E27FC236}">
+                <a16:creationId xmlns:a16="http://schemas.microsoft.com/office/drawing/2014/main" id="{5D37AE59-70DB-45A0-9458-876039244BF3}"/>
+              </a:ext>
+            </a:extLst>
+          </p:cNvPr>
+          <p:cNvPicPr>
+            <a:picLocks noChangeAspect="1"/>
+          </p:cNvPicPr>
+          <p:nvPr/>
+        </p:nvPicPr>
+        <p:blipFill>
+          <a:blip r:embed="rId2"/>
+          <a:stretch>
+            <a:fillRect/>
+          </a:stretch>
+        </p:blipFill>
+        <p:spPr>
+          <a:xfrm>
+            <a:off x="531061" y="3786046"/>
+            <a:ext cx="5915851" cy="2029108"/>
+          </a:xfrm>
+          <a:prstGeom prst="rect">
+            <a:avLst/>
+          </a:prstGeom>
+        </p:spPr>
+      </p:pic>
+      <p:pic>
+        <p:nvPicPr>
+          <p:cNvPr id="9" name="תמונה 8">
+            <a:extLst>
+              <a:ext uri="{FF2B5EF4-FFF2-40B4-BE49-F238E27FC236}">
+                <a16:creationId xmlns:a16="http://schemas.microsoft.com/office/drawing/2014/main" id="{78FB95B7-D7F6-4C22-8E4E-614F546EB462}"/>
+              </a:ext>
+            </a:extLst>
+          </p:cNvPr>
+          <p:cNvPicPr>
+            <a:picLocks noChangeAspect="1"/>
+          </p:cNvPicPr>
+          <p:nvPr/>
+        </p:nvPicPr>
+        <p:blipFill>
+          <a:blip r:embed="rId3"/>
+          <a:stretch>
+            <a:fillRect/>
+          </a:stretch>
+        </p:blipFill>
+        <p:spPr>
+          <a:xfrm>
+            <a:off x="6446912" y="3871783"/>
+            <a:ext cx="5630061" cy="1943371"/>
+          </a:xfrm>
+          <a:prstGeom prst="rect">
+            <a:avLst/>
+          </a:prstGeom>
+        </p:spPr>
+      </p:pic>
+    </p:spTree>
+    <p:extLst>
+      <p:ext uri="{BB962C8B-B14F-4D97-AF65-F5344CB8AC3E}">
+        <p14:creationId xmlns:p14="http://schemas.microsoft.com/office/powerpoint/2010/main" val="2121082668"/>
+      </p:ext>
+    </p:extLst>
+  </p:cSld>
+  <p:clrMapOvr>
+    <a:masterClrMapping/>
+  </p:clrMapOvr>
+</p:sld>
+</file>
+
+<file path=ppt/slides/slide11.xml><?xml version="1.0" encoding="utf-8"?>
+<p:sld xmlns:a="http://schemas.openxmlformats.org/drawingml/2006/main" xmlns:r="http://schemas.openxmlformats.org/officeDocument/2006/relationships" xmlns:p="http://schemas.openxmlformats.org/presentationml/2006/main">
+  <p:cSld>
+    <p:spTree>
+      <p:nvGrpSpPr>
+        <p:cNvPr id="1" name=""/>
+        <p:cNvGrpSpPr/>
+        <p:nvPr/>
+      </p:nvGrpSpPr>
+      <p:grpSpPr>
+        <a:xfrm>
+          <a:off x="0" y="0"/>
+          <a:ext cx="0" cy="0"/>
+          <a:chOff x="0" y="0"/>
+          <a:chExt cx="0" cy="0"/>
+        </a:xfrm>
+      </p:grpSpPr>
+      <p:sp>
+        <p:nvSpPr>
+          <p:cNvPr id="2" name="כותרת 1">
+            <a:extLst>
+              <a:ext uri="{FF2B5EF4-FFF2-40B4-BE49-F238E27FC236}">
+                <a16:creationId xmlns:a16="http://schemas.microsoft.com/office/drawing/2014/main" id="{5EF63109-57FF-4909-8FC9-A7AD1F49FC56}"/>
+              </a:ext>
+            </a:extLst>
+          </p:cNvPr>
+          <p:cNvSpPr>
+            <a:spLocks noGrp="1"/>
+          </p:cNvSpPr>
+          <p:nvPr>
+            <p:ph type="title"/>
+          </p:nvPr>
+        </p:nvSpPr>
+        <p:spPr/>
+        <p:txBody>
+          <a:bodyPr/>
+          <a:lstStyle/>
+          <a:p>
+            <a:r>
+              <a:rPr lang="en-US" dirty="0"/>
+              <a:t>Main things we did and challenges</a:t>
+            </a:r>
+            <a:endParaRPr lang="he-IL" dirty="0"/>
+          </a:p>
+        </p:txBody>
+      </p:sp>
+      <p:sp>
+        <p:nvSpPr>
+          <p:cNvPr id="4" name="מציין מיקום תוכן 3">
+            <a:extLst>
+              <a:ext uri="{FF2B5EF4-FFF2-40B4-BE49-F238E27FC236}">
+                <a16:creationId xmlns:a16="http://schemas.microsoft.com/office/drawing/2014/main" id="{D1512E5A-B809-4F4B-A4ED-D899E7C8424A}"/>
+              </a:ext>
+            </a:extLst>
+          </p:cNvPr>
+          <p:cNvSpPr>
+            <a:spLocks noGrp="1"/>
+          </p:cNvSpPr>
+          <p:nvPr>
+            <p:ph sz="half" idx="2"/>
+          </p:nvPr>
+        </p:nvSpPr>
+        <p:spPr>
+          <a:xfrm>
+            <a:off x="1154954" y="2603500"/>
+            <a:ext cx="9878917" cy="3416300"/>
+          </a:xfrm>
+        </p:spPr>
+        <p:txBody>
+          <a:bodyPr/>
+          <a:lstStyle/>
+          <a:p>
+            <a:pPr algn="l" rtl="0"/>
+            <a:r>
+              <a:rPr lang="en-US" dirty="0"/>
+              <a:t>Classification of reviews (supervised model)</a:t>
+            </a:r>
+          </a:p>
+          <a:p>
+            <a:pPr lvl="1" algn="l" rtl="0"/>
+            <a:r>
+              <a:rPr lang="en-US" dirty="0"/>
+              <a:t>..continue</a:t>
+            </a:r>
+          </a:p>
+          <a:p>
+            <a:pPr lvl="1" algn="l" rtl="0"/>
+            <a:endParaRPr lang="en-US" dirty="0"/>
+          </a:p>
+          <a:p>
+            <a:pPr lvl="1" algn="l" rtl="0"/>
+            <a:endParaRPr lang="he-IL" dirty="0"/>
+          </a:p>
+        </p:txBody>
+      </p:sp>
+      <p:sp>
+        <p:nvSpPr>
+          <p:cNvPr id="6" name="תיבת טקסט 5">
+            <a:extLst>
+              <a:ext uri="{FF2B5EF4-FFF2-40B4-BE49-F238E27FC236}">
+                <a16:creationId xmlns:a16="http://schemas.microsoft.com/office/drawing/2014/main" id="{43DD3447-9580-41B5-B558-7F65504323AE}"/>
+              </a:ext>
+            </a:extLst>
+          </p:cNvPr>
+          <p:cNvSpPr txBox="1"/>
+          <p:nvPr/>
+        </p:nvSpPr>
+        <p:spPr>
+          <a:xfrm>
+            <a:off x="1952016" y="6215975"/>
+            <a:ext cx="3073940" cy="369332"/>
+          </a:xfrm>
+          <a:prstGeom prst="rect">
+            <a:avLst/>
+          </a:prstGeom>
+          <a:noFill/>
+        </p:spPr>
+        <p:txBody>
+          <a:bodyPr wrap="square" rtlCol="1">
+            <a:spAutoFit/>
+          </a:bodyPr>
+          <a:lstStyle/>
+          <a:p>
+            <a:r>
+              <a:rPr lang="en-US" dirty="0" err="1"/>
+              <a:t>LinearSVC</a:t>
+            </a:r>
+            <a:r>
+              <a:rPr lang="en-US" dirty="0"/>
+              <a:t> Model</a:t>
+            </a:r>
+            <a:endParaRPr lang="he-IL" dirty="0"/>
+          </a:p>
+        </p:txBody>
+      </p:sp>
+      <p:pic>
+        <p:nvPicPr>
+          <p:cNvPr id="5" name="תמונה 4">
+            <a:extLst>
+              <a:ext uri="{FF2B5EF4-FFF2-40B4-BE49-F238E27FC236}">
+                <a16:creationId xmlns:a16="http://schemas.microsoft.com/office/drawing/2014/main" id="{6B4E1F83-7DE7-4966-866C-673866BB6590}"/>
+              </a:ext>
+            </a:extLst>
+          </p:cNvPr>
+          <p:cNvPicPr>
+            <a:picLocks noChangeAspect="1"/>
+          </p:cNvPicPr>
+          <p:nvPr/>
+        </p:nvPicPr>
+        <p:blipFill>
+          <a:blip r:embed="rId2"/>
+          <a:stretch>
+            <a:fillRect/>
+          </a:stretch>
+        </p:blipFill>
+        <p:spPr>
+          <a:xfrm>
+            <a:off x="464351" y="3863062"/>
+            <a:ext cx="5630061" cy="1952898"/>
+          </a:xfrm>
+          <a:prstGeom prst="rect">
+            <a:avLst/>
+          </a:prstGeom>
+        </p:spPr>
+      </p:pic>
+      <p:sp>
+        <p:nvSpPr>
+          <p:cNvPr id="10" name="תיבת טקסט 9">
+            <a:extLst>
+              <a:ext uri="{FF2B5EF4-FFF2-40B4-BE49-F238E27FC236}">
+                <a16:creationId xmlns:a16="http://schemas.microsoft.com/office/drawing/2014/main" id="{233EEE49-06ED-4996-A0EB-CE0225E9877D}"/>
+              </a:ext>
+            </a:extLst>
+          </p:cNvPr>
+          <p:cNvSpPr txBox="1"/>
+          <p:nvPr/>
+        </p:nvSpPr>
+        <p:spPr>
+          <a:xfrm>
+            <a:off x="8213387" y="6215975"/>
+            <a:ext cx="3073940" cy="369332"/>
+          </a:xfrm>
+          <a:prstGeom prst="rect">
+            <a:avLst/>
+          </a:prstGeom>
+          <a:noFill/>
+        </p:spPr>
+        <p:txBody>
+          <a:bodyPr wrap="square" rtlCol="1">
+            <a:spAutoFit/>
+          </a:bodyPr>
+          <a:lstStyle/>
+          <a:p>
+            <a:r>
+              <a:rPr lang="en-US" dirty="0"/>
+              <a:t>KNN Model (k=7)</a:t>
+            </a:r>
+            <a:endParaRPr lang="he-IL" dirty="0"/>
+          </a:p>
+        </p:txBody>
+      </p:sp>
+      <p:pic>
+        <p:nvPicPr>
+          <p:cNvPr id="11" name="תמונה 10">
+            <a:extLst>
+              <a:ext uri="{FF2B5EF4-FFF2-40B4-BE49-F238E27FC236}">
+                <a16:creationId xmlns:a16="http://schemas.microsoft.com/office/drawing/2014/main" id="{06455232-D515-401C-9D5C-DF308A8CD444}"/>
+              </a:ext>
+            </a:extLst>
+          </p:cNvPr>
+          <p:cNvPicPr>
+            <a:picLocks noChangeAspect="1"/>
+          </p:cNvPicPr>
+          <p:nvPr/>
+        </p:nvPicPr>
+        <p:blipFill>
+          <a:blip r:embed="rId3"/>
+          <a:stretch>
+            <a:fillRect/>
+          </a:stretch>
+        </p:blipFill>
+        <p:spPr>
+          <a:xfrm>
+            <a:off x="6422601" y="3920220"/>
+            <a:ext cx="5591955" cy="1838582"/>
+          </a:xfrm>
+          <a:prstGeom prst="rect">
+            <a:avLst/>
+          </a:prstGeom>
+        </p:spPr>
+      </p:pic>
+    </p:spTree>
+    <p:extLst>
+      <p:ext uri="{BB962C8B-B14F-4D97-AF65-F5344CB8AC3E}">
+        <p14:creationId xmlns:p14="http://schemas.microsoft.com/office/powerpoint/2010/main" val="2749043660"/>
+      </p:ext>
+    </p:extLst>
+  </p:cSld>
+  <p:clrMapOvr>
+    <a:masterClrMapping/>
+  </p:clrMapOvr>
+</p:sld>
+</file>
+
+<file path=ppt/slides/slide12.xml><?xml version="1.0" encoding="utf-8"?>
+<p:sld xmlns:a="http://schemas.openxmlformats.org/drawingml/2006/main" xmlns:r="http://schemas.openxmlformats.org/officeDocument/2006/relationships" xmlns:p="http://schemas.openxmlformats.org/presentationml/2006/main">
+  <p:cSld>
+    <p:spTree>
+      <p:nvGrpSpPr>
+        <p:cNvPr id="1" name=""/>
+        <p:cNvGrpSpPr/>
+        <p:nvPr/>
+      </p:nvGrpSpPr>
+      <p:grpSpPr>
+        <a:xfrm>
+          <a:off x="0" y="0"/>
+          <a:ext cx="0" cy="0"/>
+          <a:chOff x="0" y="0"/>
+          <a:chExt cx="0" cy="0"/>
+        </a:xfrm>
+      </p:grpSpPr>
+      <p:sp>
+        <p:nvSpPr>
+          <p:cNvPr id="2" name="כותרת 1">
+            <a:extLst>
+              <a:ext uri="{FF2B5EF4-FFF2-40B4-BE49-F238E27FC236}">
+                <a16:creationId xmlns:a16="http://schemas.microsoft.com/office/drawing/2014/main" id="{5EF63109-57FF-4909-8FC9-A7AD1F49FC56}"/>
+              </a:ext>
+            </a:extLst>
+          </p:cNvPr>
+          <p:cNvSpPr>
+            <a:spLocks noGrp="1"/>
+          </p:cNvSpPr>
+          <p:nvPr>
+            <p:ph type="title"/>
+          </p:nvPr>
+        </p:nvSpPr>
+        <p:spPr/>
+        <p:txBody>
+          <a:bodyPr/>
+          <a:lstStyle/>
+          <a:p>
+            <a:r>
+              <a:rPr lang="en-US" dirty="0"/>
+              <a:t>Main things we did and challenges</a:t>
+            </a:r>
+            <a:endParaRPr lang="he-IL" dirty="0"/>
+          </a:p>
+        </p:txBody>
+      </p:sp>
+      <p:sp>
+        <p:nvSpPr>
+          <p:cNvPr id="4" name="מציין מיקום תוכן 3">
+            <a:extLst>
+              <a:ext uri="{FF2B5EF4-FFF2-40B4-BE49-F238E27FC236}">
+                <a16:creationId xmlns:a16="http://schemas.microsoft.com/office/drawing/2014/main" id="{D1512E5A-B809-4F4B-A4ED-D899E7C8424A}"/>
+              </a:ext>
+            </a:extLst>
+          </p:cNvPr>
+          <p:cNvSpPr>
+            <a:spLocks noGrp="1"/>
+          </p:cNvSpPr>
+          <p:nvPr>
+            <p:ph sz="half" idx="2"/>
+          </p:nvPr>
+        </p:nvSpPr>
+        <p:spPr>
+          <a:xfrm>
+            <a:off x="1154954" y="2603500"/>
+            <a:ext cx="9878917" cy="3416300"/>
+          </a:xfrm>
+        </p:spPr>
+        <p:txBody>
+          <a:bodyPr/>
+          <a:lstStyle/>
+          <a:p>
+            <a:pPr algn="l" rtl="0"/>
+            <a:r>
+              <a:rPr lang="en-US" dirty="0"/>
+              <a:t>Classification of reviews (supervised model)</a:t>
+            </a:r>
+          </a:p>
+          <a:p>
+            <a:pPr lvl="1" algn="l" rtl="0"/>
+            <a:r>
+              <a:rPr lang="en-US" dirty="0"/>
+              <a:t>Using </a:t>
+            </a:r>
+            <a:r>
+              <a:rPr lang="en-US" dirty="0" err="1"/>
+              <a:t>Fasttext</a:t>
+            </a:r>
+            <a:r>
+              <a:rPr lang="en-US" dirty="0"/>
+              <a:t> from command-line, without ability to choose Model</a:t>
+            </a:r>
+          </a:p>
+          <a:p>
+            <a:pPr lvl="1" algn="l" rtl="0"/>
+            <a:endParaRPr lang="en-US" dirty="0"/>
+          </a:p>
+          <a:p>
+            <a:pPr lvl="1" algn="l" rtl="0"/>
+            <a:endParaRPr lang="he-IL" dirty="0"/>
+          </a:p>
+        </p:txBody>
+      </p:sp>
+      <p:sp>
+        <p:nvSpPr>
+          <p:cNvPr id="6" name="תיבת טקסט 5">
+            <a:extLst>
+              <a:ext uri="{FF2B5EF4-FFF2-40B4-BE49-F238E27FC236}">
+                <a16:creationId xmlns:a16="http://schemas.microsoft.com/office/drawing/2014/main" id="{43DD3447-9580-41B5-B558-7F65504323AE}"/>
+              </a:ext>
+            </a:extLst>
+          </p:cNvPr>
+          <p:cNvSpPr txBox="1"/>
+          <p:nvPr/>
+        </p:nvSpPr>
+        <p:spPr>
+          <a:xfrm>
             <a:off x="1280808" y="5835134"/>
             <a:ext cx="1524212" cy="369332"/>
           </a:xfrm>
@@ -14728,6 +15224,510 @@
 </p:sld>
 </file>
 
+<file path=ppt/slides/slide13.xml><?xml version="1.0" encoding="utf-8"?>
+<p:sld xmlns:a="http://schemas.openxmlformats.org/drawingml/2006/main" xmlns:r="http://schemas.openxmlformats.org/officeDocument/2006/relationships" xmlns:p="http://schemas.openxmlformats.org/presentationml/2006/main">
+  <p:cSld>
+    <p:spTree>
+      <p:nvGrpSpPr>
+        <p:cNvPr id="1" name=""/>
+        <p:cNvGrpSpPr/>
+        <p:nvPr/>
+      </p:nvGrpSpPr>
+      <p:grpSpPr>
+        <a:xfrm>
+          <a:off x="0" y="0"/>
+          <a:ext cx="0" cy="0"/>
+          <a:chOff x="0" y="0"/>
+          <a:chExt cx="0" cy="0"/>
+        </a:xfrm>
+      </p:grpSpPr>
+      <p:sp>
+        <p:nvSpPr>
+          <p:cNvPr id="2" name="כותרת 1">
+            <a:extLst>
+              <a:ext uri="{FF2B5EF4-FFF2-40B4-BE49-F238E27FC236}">
+                <a16:creationId xmlns:a16="http://schemas.microsoft.com/office/drawing/2014/main" id="{5EF63109-57FF-4909-8FC9-A7AD1F49FC56}"/>
+              </a:ext>
+            </a:extLst>
+          </p:cNvPr>
+          <p:cNvSpPr>
+            <a:spLocks noGrp="1"/>
+          </p:cNvSpPr>
+          <p:nvPr>
+            <p:ph type="title"/>
+          </p:nvPr>
+        </p:nvSpPr>
+        <p:spPr/>
+        <p:txBody>
+          <a:bodyPr/>
+          <a:lstStyle/>
+          <a:p>
+            <a:r>
+              <a:rPr lang="en-US" dirty="0"/>
+              <a:t>Main things we did and challenges</a:t>
+            </a:r>
+            <a:endParaRPr lang="he-IL" dirty="0"/>
+          </a:p>
+        </p:txBody>
+      </p:sp>
+      <p:sp>
+        <p:nvSpPr>
+          <p:cNvPr id="4" name="מציין מיקום תוכן 3">
+            <a:extLst>
+              <a:ext uri="{FF2B5EF4-FFF2-40B4-BE49-F238E27FC236}">
+                <a16:creationId xmlns:a16="http://schemas.microsoft.com/office/drawing/2014/main" id="{D1512E5A-B809-4F4B-A4ED-D899E7C8424A}"/>
+              </a:ext>
+            </a:extLst>
+          </p:cNvPr>
+          <p:cNvSpPr>
+            <a:spLocks noGrp="1"/>
+          </p:cNvSpPr>
+          <p:nvPr>
+            <p:ph sz="half" idx="2"/>
+          </p:nvPr>
+        </p:nvSpPr>
+        <p:spPr>
+          <a:xfrm>
+            <a:off x="1154954" y="2603500"/>
+            <a:ext cx="9878917" cy="3416300"/>
+          </a:xfrm>
+        </p:spPr>
+        <p:txBody>
+          <a:bodyPr/>
+          <a:lstStyle/>
+          <a:p>
+            <a:pPr algn="l" rtl="0"/>
+            <a:r>
+              <a:rPr lang="en-US" dirty="0"/>
+              <a:t>Classification of reviews (supervised model)</a:t>
+            </a:r>
+          </a:p>
+          <a:p>
+            <a:pPr lvl="1" algn="l" rtl="0"/>
+            <a:r>
+              <a:rPr lang="en-US" dirty="0"/>
+              <a:t>Loading </a:t>
+            </a:r>
+            <a:r>
+              <a:rPr lang="en-US" dirty="0" err="1"/>
+              <a:t>FastText</a:t>
+            </a:r>
+            <a:r>
+              <a:rPr lang="en-US" dirty="0"/>
+              <a:t> model and using it with different algorithms</a:t>
+            </a:r>
+          </a:p>
+          <a:p>
+            <a:pPr lvl="1" algn="l" rtl="0"/>
+            <a:endParaRPr lang="en-US" dirty="0"/>
+          </a:p>
+          <a:p>
+            <a:pPr lvl="1" algn="l" rtl="0"/>
+            <a:endParaRPr lang="he-IL" dirty="0"/>
+          </a:p>
+        </p:txBody>
+      </p:sp>
+      <p:sp>
+        <p:nvSpPr>
+          <p:cNvPr id="12" name="תיבת טקסט 11">
+            <a:extLst>
+              <a:ext uri="{FF2B5EF4-FFF2-40B4-BE49-F238E27FC236}">
+                <a16:creationId xmlns:a16="http://schemas.microsoft.com/office/drawing/2014/main" id="{D30248E4-FC93-420E-B000-C5460B31A626}"/>
+              </a:ext>
+            </a:extLst>
+          </p:cNvPr>
+          <p:cNvSpPr txBox="1"/>
+          <p:nvPr/>
+        </p:nvSpPr>
+        <p:spPr>
+          <a:xfrm>
+            <a:off x="886660" y="6018898"/>
+            <a:ext cx="3698311" cy="369332"/>
+          </a:xfrm>
+          <a:prstGeom prst="rect">
+            <a:avLst/>
+          </a:prstGeom>
+          <a:noFill/>
+        </p:spPr>
+        <p:txBody>
+          <a:bodyPr wrap="square" rtlCol="1">
+            <a:spAutoFit/>
+          </a:bodyPr>
+          <a:lstStyle/>
+          <a:p>
+            <a:r>
+              <a:rPr lang="en-US" dirty="0" err="1"/>
+              <a:t>FastText</a:t>
+            </a:r>
+            <a:r>
+              <a:rPr lang="en-US" dirty="0"/>
+              <a:t> with cleaned text- SVM</a:t>
+            </a:r>
+            <a:endParaRPr lang="he-IL" dirty="0"/>
+          </a:p>
+        </p:txBody>
+      </p:sp>
+      <p:pic>
+        <p:nvPicPr>
+          <p:cNvPr id="5" name="תמונה 4">
+            <a:extLst>
+              <a:ext uri="{FF2B5EF4-FFF2-40B4-BE49-F238E27FC236}">
+                <a16:creationId xmlns:a16="http://schemas.microsoft.com/office/drawing/2014/main" id="{5084334E-40D1-433F-8D49-EEFCAD3D1900}"/>
+              </a:ext>
+            </a:extLst>
+          </p:cNvPr>
+          <p:cNvPicPr>
+            <a:picLocks noChangeAspect="1"/>
+          </p:cNvPicPr>
+          <p:nvPr/>
+        </p:nvPicPr>
+        <p:blipFill>
+          <a:blip r:embed="rId2"/>
+          <a:stretch>
+            <a:fillRect/>
+          </a:stretch>
+        </p:blipFill>
+        <p:spPr>
+          <a:xfrm>
+            <a:off x="589279" y="4133761"/>
+            <a:ext cx="5106777" cy="1924538"/>
+          </a:xfrm>
+          <a:prstGeom prst="rect">
+            <a:avLst/>
+          </a:prstGeom>
+        </p:spPr>
+      </p:pic>
+      <p:pic>
+        <p:nvPicPr>
+          <p:cNvPr id="10" name="תמונה 9">
+            <a:extLst>
+              <a:ext uri="{FF2B5EF4-FFF2-40B4-BE49-F238E27FC236}">
+                <a16:creationId xmlns:a16="http://schemas.microsoft.com/office/drawing/2014/main" id="{28352F6A-8BAE-4570-802E-E611A02E3C70}"/>
+              </a:ext>
+            </a:extLst>
+          </p:cNvPr>
+          <p:cNvPicPr>
+            <a:picLocks noChangeAspect="1"/>
+          </p:cNvPicPr>
+          <p:nvPr/>
+        </p:nvPicPr>
+        <p:blipFill>
+          <a:blip r:embed="rId3"/>
+          <a:stretch>
+            <a:fillRect/>
+          </a:stretch>
+        </p:blipFill>
+        <p:spPr>
+          <a:xfrm>
+            <a:off x="6208741" y="3949164"/>
+            <a:ext cx="5337815" cy="1910745"/>
+          </a:xfrm>
+          <a:prstGeom prst="rect">
+            <a:avLst/>
+          </a:prstGeom>
+        </p:spPr>
+      </p:pic>
+      <p:sp>
+        <p:nvSpPr>
+          <p:cNvPr id="13" name="תיבת טקסט 12">
+            <a:extLst>
+              <a:ext uri="{FF2B5EF4-FFF2-40B4-BE49-F238E27FC236}">
+                <a16:creationId xmlns:a16="http://schemas.microsoft.com/office/drawing/2014/main" id="{B5EA8437-7984-466F-878D-60977A23A8F7}"/>
+              </a:ext>
+            </a:extLst>
+          </p:cNvPr>
+          <p:cNvSpPr txBox="1"/>
+          <p:nvPr/>
+        </p:nvSpPr>
+        <p:spPr>
+          <a:xfrm>
+            <a:off x="6301724" y="6035671"/>
+            <a:ext cx="5429833" cy="369332"/>
+          </a:xfrm>
+          <a:prstGeom prst="rect">
+            <a:avLst/>
+          </a:prstGeom>
+          <a:noFill/>
+        </p:spPr>
+        <p:txBody>
+          <a:bodyPr wrap="square" rtlCol="1">
+            <a:spAutoFit/>
+          </a:bodyPr>
+          <a:lstStyle/>
+          <a:p>
+            <a:r>
+              <a:rPr lang="en-US" dirty="0" err="1"/>
+              <a:t>FastText</a:t>
+            </a:r>
+            <a:r>
+              <a:rPr lang="en-US" dirty="0"/>
+              <a:t> with cleaned text- Logistic Regression</a:t>
+            </a:r>
+            <a:endParaRPr lang="he-IL" dirty="0"/>
+          </a:p>
+        </p:txBody>
+      </p:sp>
+    </p:spTree>
+    <p:extLst>
+      <p:ext uri="{BB962C8B-B14F-4D97-AF65-F5344CB8AC3E}">
+        <p14:creationId xmlns:p14="http://schemas.microsoft.com/office/powerpoint/2010/main" val="2403493442"/>
+      </p:ext>
+    </p:extLst>
+  </p:cSld>
+  <p:clrMapOvr>
+    <a:masterClrMapping/>
+  </p:clrMapOvr>
+</p:sld>
+</file>
+
+<file path=ppt/slides/slide14.xml><?xml version="1.0" encoding="utf-8"?>
+<p:sld xmlns:a="http://schemas.openxmlformats.org/drawingml/2006/main" xmlns:r="http://schemas.openxmlformats.org/officeDocument/2006/relationships" xmlns:p="http://schemas.openxmlformats.org/presentationml/2006/main">
+  <p:cSld>
+    <p:spTree>
+      <p:nvGrpSpPr>
+        <p:cNvPr id="1" name=""/>
+        <p:cNvGrpSpPr/>
+        <p:nvPr/>
+      </p:nvGrpSpPr>
+      <p:grpSpPr>
+        <a:xfrm>
+          <a:off x="0" y="0"/>
+          <a:ext cx="0" cy="0"/>
+          <a:chOff x="0" y="0"/>
+          <a:chExt cx="0" cy="0"/>
+        </a:xfrm>
+      </p:grpSpPr>
+      <p:sp>
+        <p:nvSpPr>
+          <p:cNvPr id="2" name="כותרת 1">
+            <a:extLst>
+              <a:ext uri="{FF2B5EF4-FFF2-40B4-BE49-F238E27FC236}">
+                <a16:creationId xmlns:a16="http://schemas.microsoft.com/office/drawing/2014/main" id="{5EF63109-57FF-4909-8FC9-A7AD1F49FC56}"/>
+              </a:ext>
+            </a:extLst>
+          </p:cNvPr>
+          <p:cNvSpPr>
+            <a:spLocks noGrp="1"/>
+          </p:cNvSpPr>
+          <p:nvPr>
+            <p:ph type="title"/>
+          </p:nvPr>
+        </p:nvSpPr>
+        <p:spPr/>
+        <p:txBody>
+          <a:bodyPr/>
+          <a:lstStyle/>
+          <a:p>
+            <a:r>
+              <a:rPr lang="en-US" dirty="0"/>
+              <a:t>Main things we did and challenges</a:t>
+            </a:r>
+            <a:endParaRPr lang="he-IL" dirty="0"/>
+          </a:p>
+        </p:txBody>
+      </p:sp>
+      <p:sp>
+        <p:nvSpPr>
+          <p:cNvPr id="4" name="מציין מיקום תוכן 3">
+            <a:extLst>
+              <a:ext uri="{FF2B5EF4-FFF2-40B4-BE49-F238E27FC236}">
+                <a16:creationId xmlns:a16="http://schemas.microsoft.com/office/drawing/2014/main" id="{D1512E5A-B809-4F4B-A4ED-D899E7C8424A}"/>
+              </a:ext>
+            </a:extLst>
+          </p:cNvPr>
+          <p:cNvSpPr>
+            <a:spLocks noGrp="1"/>
+          </p:cNvSpPr>
+          <p:nvPr>
+            <p:ph sz="half" idx="2"/>
+          </p:nvPr>
+        </p:nvSpPr>
+        <p:spPr>
+          <a:xfrm>
+            <a:off x="1154954" y="2603500"/>
+            <a:ext cx="9878917" cy="3416300"/>
+          </a:xfrm>
+        </p:spPr>
+        <p:txBody>
+          <a:bodyPr/>
+          <a:lstStyle/>
+          <a:p>
+            <a:pPr algn="l" rtl="0"/>
+            <a:r>
+              <a:rPr lang="en-US" dirty="0"/>
+              <a:t>Classification of reviews (supervised model)</a:t>
+            </a:r>
+          </a:p>
+          <a:p>
+            <a:pPr lvl="1" algn="l" rtl="0"/>
+            <a:r>
+              <a:rPr lang="en-US" dirty="0"/>
+              <a:t>…continue</a:t>
+            </a:r>
+          </a:p>
+          <a:p>
+            <a:pPr lvl="1" algn="l" rtl="0"/>
+            <a:endParaRPr lang="en-US" dirty="0"/>
+          </a:p>
+          <a:p>
+            <a:pPr lvl="1" algn="l" rtl="0"/>
+            <a:endParaRPr lang="he-IL" dirty="0"/>
+          </a:p>
+        </p:txBody>
+      </p:sp>
+      <p:sp>
+        <p:nvSpPr>
+          <p:cNvPr id="12" name="תיבת טקסט 11">
+            <a:extLst>
+              <a:ext uri="{FF2B5EF4-FFF2-40B4-BE49-F238E27FC236}">
+                <a16:creationId xmlns:a16="http://schemas.microsoft.com/office/drawing/2014/main" id="{D30248E4-FC93-420E-B000-C5460B31A626}"/>
+              </a:ext>
+            </a:extLst>
+          </p:cNvPr>
+          <p:cNvSpPr txBox="1"/>
+          <p:nvPr/>
+        </p:nvSpPr>
+        <p:spPr>
+          <a:xfrm>
+            <a:off x="886660" y="6018898"/>
+            <a:ext cx="5321087" cy="369332"/>
+          </a:xfrm>
+          <a:prstGeom prst="rect">
+            <a:avLst/>
+          </a:prstGeom>
+          <a:noFill/>
+        </p:spPr>
+        <p:txBody>
+          <a:bodyPr wrap="square" rtlCol="1">
+            <a:spAutoFit/>
+          </a:bodyPr>
+          <a:lstStyle/>
+          <a:p>
+            <a:r>
+              <a:rPr lang="en-US" dirty="0" err="1"/>
+              <a:t>FastText</a:t>
+            </a:r>
+            <a:r>
+              <a:rPr lang="en-US" dirty="0"/>
+              <a:t> with cleaned text- Random Forest</a:t>
+            </a:r>
+            <a:endParaRPr lang="he-IL" dirty="0"/>
+          </a:p>
+        </p:txBody>
+      </p:sp>
+      <p:pic>
+        <p:nvPicPr>
+          <p:cNvPr id="3" name="תמונה 2">
+            <a:extLst>
+              <a:ext uri="{FF2B5EF4-FFF2-40B4-BE49-F238E27FC236}">
+                <a16:creationId xmlns:a16="http://schemas.microsoft.com/office/drawing/2014/main" id="{C5D70687-4036-47B0-9AC4-D9CABC6D4563}"/>
+              </a:ext>
+            </a:extLst>
+          </p:cNvPr>
+          <p:cNvPicPr>
+            <a:picLocks noChangeAspect="1"/>
+          </p:cNvPicPr>
+          <p:nvPr/>
+        </p:nvPicPr>
+        <p:blipFill>
+          <a:blip r:embed="rId2"/>
+          <a:stretch>
+            <a:fillRect/>
+          </a:stretch>
+        </p:blipFill>
+        <p:spPr>
+          <a:xfrm>
+            <a:off x="672950" y="3887078"/>
+            <a:ext cx="5534797" cy="1924319"/>
+          </a:xfrm>
+          <a:prstGeom prst="rect">
+            <a:avLst/>
+          </a:prstGeom>
+        </p:spPr>
+      </p:pic>
+      <p:sp>
+        <p:nvSpPr>
+          <p:cNvPr id="9" name="תיבת טקסט 8">
+            <a:extLst>
+              <a:ext uri="{FF2B5EF4-FFF2-40B4-BE49-F238E27FC236}">
+                <a16:creationId xmlns:a16="http://schemas.microsoft.com/office/drawing/2014/main" id="{59910B7F-8970-4A15-863F-219FE1B540B4}"/>
+              </a:ext>
+            </a:extLst>
+          </p:cNvPr>
+          <p:cNvSpPr txBox="1"/>
+          <p:nvPr/>
+        </p:nvSpPr>
+        <p:spPr>
+          <a:xfrm>
+            <a:off x="6379545" y="6018898"/>
+            <a:ext cx="5321087" cy="369332"/>
+          </a:xfrm>
+          <a:prstGeom prst="rect">
+            <a:avLst/>
+          </a:prstGeom>
+          <a:noFill/>
+        </p:spPr>
+        <p:txBody>
+          <a:bodyPr wrap="square" rtlCol="1">
+            <a:spAutoFit/>
+          </a:bodyPr>
+          <a:lstStyle/>
+          <a:p>
+            <a:r>
+              <a:rPr lang="en-US" dirty="0" err="1"/>
+              <a:t>FastText</a:t>
+            </a:r>
+            <a:r>
+              <a:rPr lang="en-US" dirty="0"/>
+              <a:t> with cleaned text- Decision Tree</a:t>
+            </a:r>
+            <a:endParaRPr lang="he-IL" dirty="0"/>
+          </a:p>
+        </p:txBody>
+      </p:sp>
+      <p:pic>
+        <p:nvPicPr>
+          <p:cNvPr id="6" name="תמונה 5">
+            <a:extLst>
+              <a:ext uri="{FF2B5EF4-FFF2-40B4-BE49-F238E27FC236}">
+                <a16:creationId xmlns:a16="http://schemas.microsoft.com/office/drawing/2014/main" id="{2D01467D-47A4-444B-839A-8C1F407025C9}"/>
+              </a:ext>
+            </a:extLst>
+          </p:cNvPr>
+          <p:cNvPicPr>
+            <a:picLocks noChangeAspect="1"/>
+          </p:cNvPicPr>
+          <p:nvPr/>
+        </p:nvPicPr>
+        <p:blipFill>
+          <a:blip r:embed="rId3"/>
+          <a:stretch>
+            <a:fillRect/>
+          </a:stretch>
+        </p:blipFill>
+        <p:spPr>
+          <a:xfrm>
+            <a:off x="6476041" y="3873045"/>
+            <a:ext cx="5442670" cy="1893500"/>
+          </a:xfrm>
+          <a:prstGeom prst="rect">
+            <a:avLst/>
+          </a:prstGeom>
+        </p:spPr>
+      </p:pic>
+    </p:spTree>
+    <p:extLst>
+      <p:ext uri="{BB962C8B-B14F-4D97-AF65-F5344CB8AC3E}">
+        <p14:creationId xmlns:p14="http://schemas.microsoft.com/office/powerpoint/2010/main" val="2007812861"/>
+      </p:ext>
+    </p:extLst>
+  </p:cSld>
+  <p:clrMapOvr>
+    <a:masterClrMapping/>
+  </p:clrMapOvr>
+</p:sld>
+</file>
+
 <file path=ppt/slides/slide2.xml><?xml version="1.0" encoding="utf-8"?>
 <p:sld xmlns:a="http://schemas.openxmlformats.org/drawingml/2006/main" xmlns:r="http://schemas.openxmlformats.org/officeDocument/2006/relationships" xmlns:p="http://schemas.openxmlformats.org/presentationml/2006/main">
   <p:cSld>
@@ -15131,64 +16131,11 @@
             <a:endParaRPr lang="en-US" dirty="0"/>
           </a:p>
           <a:p>
-            <a:pPr algn="l" rtl="0"/>
-            <a:r>
-              <a:rPr lang="en-US" dirty="0"/>
-              <a:t>Classification of reviews (supervised model)</a:t>
-            </a:r>
-          </a:p>
-          <a:p>
-            <a:pPr lvl="1" algn="l" rtl="0"/>
-            <a:r>
-              <a:rPr lang="en-US" dirty="0"/>
-              <a:t>Running Doc2Vec and using </a:t>
-            </a:r>
-            <a:r>
-              <a:rPr lang="en-US" dirty="0" err="1"/>
-              <a:t>DecisionTreeClassifier</a:t>
-            </a:r>
-            <a:endParaRPr lang="en-US" dirty="0"/>
-          </a:p>
-          <a:p>
-            <a:pPr lvl="1" algn="l" rtl="0"/>
-            <a:endParaRPr lang="en-US" dirty="0"/>
-          </a:p>
-          <a:p>
             <a:pPr lvl="1" algn="l" rtl="0"/>
             <a:endParaRPr lang="he-IL" dirty="0"/>
           </a:p>
         </p:txBody>
       </p:sp>
-      <p:pic>
-        <p:nvPicPr>
-          <p:cNvPr id="3" name="תמונה 2">
-            <a:extLst>
-              <a:ext uri="{FF2B5EF4-FFF2-40B4-BE49-F238E27FC236}">
-                <a16:creationId xmlns:a16="http://schemas.microsoft.com/office/drawing/2014/main" id="{43C67EA5-35A9-42B1-BFFF-A8E9CE16D633}"/>
-              </a:ext>
-            </a:extLst>
-          </p:cNvPr>
-          <p:cNvPicPr>
-            <a:picLocks noChangeAspect="1"/>
-          </p:cNvPicPr>
-          <p:nvPr/>
-        </p:nvPicPr>
-        <p:blipFill>
-          <a:blip r:embed="rId2"/>
-          <a:stretch>
-            <a:fillRect/>
-          </a:stretch>
-        </p:blipFill>
-        <p:spPr>
-          <a:xfrm>
-            <a:off x="2987321" y="4658309"/>
-            <a:ext cx="5242280" cy="1923613"/>
-          </a:xfrm>
-          <a:prstGeom prst="rect">
-            <a:avLst/>
-          </a:prstGeom>
-        </p:spPr>
-      </p:pic>
     </p:spTree>
     <p:extLst>
       <p:ext uri="{BB962C8B-B14F-4D97-AF65-F5344CB8AC3E}">
@@ -15277,6 +16224,358 @@
             <a:pPr algn="l" rtl="0"/>
             <a:r>
               <a:rPr lang="en-US" dirty="0"/>
+              <a:t>Embedding</a:t>
+            </a:r>
+          </a:p>
+          <a:p>
+            <a:pPr lvl="1" algn="l" rtl="0"/>
+            <a:r>
+              <a:rPr lang="en-US" dirty="0"/>
+              <a:t>Word2Vec (Dov2Vec)</a:t>
+            </a:r>
+          </a:p>
+          <a:p>
+            <a:pPr lvl="2" algn="l" rtl="0"/>
+            <a:r>
+              <a:rPr lang="en-US" dirty="0"/>
+              <a:t>Word2Vec  Trains a unique word embedding for every individual word</a:t>
+            </a:r>
+          </a:p>
+          <a:p>
+            <a:pPr lvl="1" algn="l" rtl="0"/>
+            <a:r>
+              <a:rPr lang="en-US" dirty="0" err="1"/>
+              <a:t>FastText</a:t>
+            </a:r>
+            <a:endParaRPr lang="en-US" dirty="0"/>
+          </a:p>
+          <a:p>
+            <a:pPr lvl="2" algn="l" rtl="0"/>
+            <a:r>
+              <a:rPr lang="en-US" dirty="0" err="1"/>
+              <a:t>Fasttext</a:t>
+            </a:r>
+            <a:r>
+              <a:rPr lang="en-US" dirty="0"/>
+              <a:t> treats each word as the aggregation of its </a:t>
+            </a:r>
+            <a:r>
+              <a:rPr lang="en-US" dirty="0" err="1"/>
+              <a:t>subwords</a:t>
+            </a:r>
+            <a:r>
+              <a:rPr lang="en-US" dirty="0"/>
+              <a:t> (</a:t>
+            </a:r>
+            <a:r>
+              <a:rPr lang="en-US" dirty="0" err="1"/>
+              <a:t>subwords</a:t>
+            </a:r>
+            <a:r>
+              <a:rPr lang="en-US" dirty="0"/>
+              <a:t> are taken to be the character </a:t>
+            </a:r>
+            <a:r>
+              <a:rPr lang="en-US" dirty="0" err="1"/>
+              <a:t>ngrams</a:t>
+            </a:r>
+            <a:r>
+              <a:rPr lang="en-US" dirty="0"/>
+              <a:t> of the word). The vector for a word is simply taken to be the sum of all vectors of its component char-</a:t>
+            </a:r>
+            <a:r>
+              <a:rPr lang="en-US" dirty="0" err="1"/>
+              <a:t>ngrams</a:t>
+            </a:r>
+            <a:endParaRPr lang="en-US" dirty="0"/>
+          </a:p>
+          <a:p>
+            <a:pPr lvl="2" algn="l" rtl="0"/>
+            <a:r>
+              <a:rPr lang="en-US" dirty="0"/>
+              <a:t>Better for morphologically rich languages (</a:t>
+            </a:r>
+            <a:r>
+              <a:rPr lang="en-US" dirty="0" err="1"/>
+              <a:t>Hebrew,German</a:t>
+            </a:r>
+            <a:r>
+              <a:rPr lang="en-US" dirty="0"/>
+              <a:t>, Turkish </a:t>
+            </a:r>
+            <a:r>
+              <a:rPr lang="en-US" dirty="0" err="1"/>
+              <a:t>etc</a:t>
+            </a:r>
+            <a:r>
+              <a:rPr lang="en-US" dirty="0"/>
+              <a:t>)</a:t>
+            </a:r>
+          </a:p>
+          <a:p>
+            <a:pPr lvl="2" algn="l" rtl="0"/>
+            <a:r>
+              <a:rPr lang="en-US" dirty="0" err="1"/>
+              <a:t>fastText</a:t>
+            </a:r>
+            <a:r>
+              <a:rPr lang="en-US" dirty="0"/>
+              <a:t> can obtain vectors even for out-of-vocabulary (OOV) words, by summing up vectors for its component char-</a:t>
+            </a:r>
+            <a:r>
+              <a:rPr lang="en-US" dirty="0" err="1"/>
+              <a:t>ngrams</a:t>
+            </a:r>
+            <a:r>
+              <a:rPr lang="en-US" dirty="0"/>
+              <a:t>, provided at least one of the char-</a:t>
+            </a:r>
+            <a:r>
+              <a:rPr lang="en-US" dirty="0" err="1"/>
+              <a:t>ngrams</a:t>
+            </a:r>
+            <a:r>
+              <a:rPr lang="en-US" dirty="0"/>
+              <a:t> was present in the training data.</a:t>
+            </a:r>
+          </a:p>
+          <a:p>
+            <a:pPr lvl="1" algn="l" rtl="0"/>
+            <a:endParaRPr lang="he-IL" dirty="0"/>
+          </a:p>
+        </p:txBody>
+      </p:sp>
+    </p:spTree>
+    <p:extLst>
+      <p:ext uri="{BB962C8B-B14F-4D97-AF65-F5344CB8AC3E}">
+        <p14:creationId xmlns:p14="http://schemas.microsoft.com/office/powerpoint/2010/main" val="527216080"/>
+      </p:ext>
+    </p:extLst>
+  </p:cSld>
+  <p:clrMapOvr>
+    <a:masterClrMapping/>
+  </p:clrMapOvr>
+</p:sld>
+</file>
+
+<file path=ppt/slides/slide6.xml><?xml version="1.0" encoding="utf-8"?>
+<p:sld xmlns:a="http://schemas.openxmlformats.org/drawingml/2006/main" xmlns:r="http://schemas.openxmlformats.org/officeDocument/2006/relationships" xmlns:p="http://schemas.openxmlformats.org/presentationml/2006/main">
+  <p:cSld>
+    <p:spTree>
+      <p:nvGrpSpPr>
+        <p:cNvPr id="1" name=""/>
+        <p:cNvGrpSpPr/>
+        <p:nvPr/>
+      </p:nvGrpSpPr>
+      <p:grpSpPr>
+        <a:xfrm>
+          <a:off x="0" y="0"/>
+          <a:ext cx="0" cy="0"/>
+          <a:chOff x="0" y="0"/>
+          <a:chExt cx="0" cy="0"/>
+        </a:xfrm>
+      </p:grpSpPr>
+      <p:sp>
+        <p:nvSpPr>
+          <p:cNvPr id="2" name="כותרת 1">
+            <a:extLst>
+              <a:ext uri="{FF2B5EF4-FFF2-40B4-BE49-F238E27FC236}">
+                <a16:creationId xmlns:a16="http://schemas.microsoft.com/office/drawing/2014/main" id="{5EF63109-57FF-4909-8FC9-A7AD1F49FC56}"/>
+              </a:ext>
+            </a:extLst>
+          </p:cNvPr>
+          <p:cNvSpPr>
+            <a:spLocks noGrp="1"/>
+          </p:cNvSpPr>
+          <p:nvPr>
+            <p:ph type="title"/>
+          </p:nvPr>
+        </p:nvSpPr>
+        <p:spPr/>
+        <p:txBody>
+          <a:bodyPr/>
+          <a:lstStyle/>
+          <a:p>
+            <a:r>
+              <a:rPr lang="en-US" dirty="0"/>
+              <a:t>Main things we did and challenges</a:t>
+            </a:r>
+            <a:endParaRPr lang="he-IL" dirty="0"/>
+          </a:p>
+        </p:txBody>
+      </p:sp>
+      <p:sp>
+        <p:nvSpPr>
+          <p:cNvPr id="4" name="מציין מיקום תוכן 3">
+            <a:extLst>
+              <a:ext uri="{FF2B5EF4-FFF2-40B4-BE49-F238E27FC236}">
+                <a16:creationId xmlns:a16="http://schemas.microsoft.com/office/drawing/2014/main" id="{D1512E5A-B809-4F4B-A4ED-D899E7C8424A}"/>
+              </a:ext>
+            </a:extLst>
+          </p:cNvPr>
+          <p:cNvSpPr>
+            <a:spLocks noGrp="1"/>
+          </p:cNvSpPr>
+          <p:nvPr>
+            <p:ph sz="half" idx="2"/>
+          </p:nvPr>
+        </p:nvSpPr>
+        <p:spPr>
+          <a:xfrm>
+            <a:off x="1154954" y="2603500"/>
+            <a:ext cx="9878917" cy="3416300"/>
+          </a:xfrm>
+        </p:spPr>
+        <p:txBody>
+          <a:bodyPr/>
+          <a:lstStyle/>
+          <a:p>
+            <a:pPr algn="l" rtl="0"/>
+            <a:r>
+              <a:rPr lang="en-US" dirty="0"/>
+              <a:t>Classification of reviews (supervised model)</a:t>
+            </a:r>
+          </a:p>
+          <a:p>
+            <a:pPr lvl="1" algn="l" rtl="0"/>
+            <a:r>
+              <a:rPr lang="en-US" dirty="0"/>
+              <a:t>Running Doc2Vec and using </a:t>
+            </a:r>
+            <a:r>
+              <a:rPr lang="en-US" dirty="0" err="1"/>
+              <a:t>DecisionTreeClassifier</a:t>
+            </a:r>
+            <a:endParaRPr lang="en-US" dirty="0"/>
+          </a:p>
+          <a:p>
+            <a:pPr lvl="1" algn="l" rtl="0"/>
+            <a:endParaRPr lang="en-US" dirty="0"/>
+          </a:p>
+          <a:p>
+            <a:pPr lvl="1" algn="l" rtl="0"/>
+            <a:endParaRPr lang="he-IL" dirty="0"/>
+          </a:p>
+        </p:txBody>
+      </p:sp>
+      <p:pic>
+        <p:nvPicPr>
+          <p:cNvPr id="3" name="תמונה 2">
+            <a:extLst>
+              <a:ext uri="{FF2B5EF4-FFF2-40B4-BE49-F238E27FC236}">
+                <a16:creationId xmlns:a16="http://schemas.microsoft.com/office/drawing/2014/main" id="{43C67EA5-35A9-42B1-BFFF-A8E9CE16D633}"/>
+              </a:ext>
+            </a:extLst>
+          </p:cNvPr>
+          <p:cNvPicPr>
+            <a:picLocks noChangeAspect="1"/>
+          </p:cNvPicPr>
+          <p:nvPr/>
+        </p:nvPicPr>
+        <p:blipFill>
+          <a:blip r:embed="rId2"/>
+          <a:stretch>
+            <a:fillRect/>
+          </a:stretch>
+        </p:blipFill>
+        <p:spPr>
+          <a:xfrm>
+            <a:off x="3035960" y="3880097"/>
+            <a:ext cx="5242280" cy="1923613"/>
+          </a:xfrm>
+          <a:prstGeom prst="rect">
+            <a:avLst/>
+          </a:prstGeom>
+        </p:spPr>
+      </p:pic>
+    </p:spTree>
+    <p:extLst>
+      <p:ext uri="{BB962C8B-B14F-4D97-AF65-F5344CB8AC3E}">
+        <p14:creationId xmlns:p14="http://schemas.microsoft.com/office/powerpoint/2010/main" val="3973849951"/>
+      </p:ext>
+    </p:extLst>
+  </p:cSld>
+  <p:clrMapOvr>
+    <a:masterClrMapping/>
+  </p:clrMapOvr>
+</p:sld>
+</file>
+
+<file path=ppt/slides/slide7.xml><?xml version="1.0" encoding="utf-8"?>
+<p:sld xmlns:a="http://schemas.openxmlformats.org/drawingml/2006/main" xmlns:r="http://schemas.openxmlformats.org/officeDocument/2006/relationships" xmlns:p="http://schemas.openxmlformats.org/presentationml/2006/main">
+  <p:cSld>
+    <p:spTree>
+      <p:nvGrpSpPr>
+        <p:cNvPr id="1" name=""/>
+        <p:cNvGrpSpPr/>
+        <p:nvPr/>
+      </p:nvGrpSpPr>
+      <p:grpSpPr>
+        <a:xfrm>
+          <a:off x="0" y="0"/>
+          <a:ext cx="0" cy="0"/>
+          <a:chOff x="0" y="0"/>
+          <a:chExt cx="0" cy="0"/>
+        </a:xfrm>
+      </p:grpSpPr>
+      <p:sp>
+        <p:nvSpPr>
+          <p:cNvPr id="2" name="כותרת 1">
+            <a:extLst>
+              <a:ext uri="{FF2B5EF4-FFF2-40B4-BE49-F238E27FC236}">
+                <a16:creationId xmlns:a16="http://schemas.microsoft.com/office/drawing/2014/main" id="{5EF63109-57FF-4909-8FC9-A7AD1F49FC56}"/>
+              </a:ext>
+            </a:extLst>
+          </p:cNvPr>
+          <p:cNvSpPr>
+            <a:spLocks noGrp="1"/>
+          </p:cNvSpPr>
+          <p:nvPr>
+            <p:ph type="title"/>
+          </p:nvPr>
+        </p:nvSpPr>
+        <p:spPr/>
+        <p:txBody>
+          <a:bodyPr/>
+          <a:lstStyle/>
+          <a:p>
+            <a:r>
+              <a:rPr lang="en-US" dirty="0"/>
+              <a:t>Main things we did and challenges</a:t>
+            </a:r>
+            <a:endParaRPr lang="he-IL" dirty="0"/>
+          </a:p>
+        </p:txBody>
+      </p:sp>
+      <p:sp>
+        <p:nvSpPr>
+          <p:cNvPr id="4" name="מציין מיקום תוכן 3">
+            <a:extLst>
+              <a:ext uri="{FF2B5EF4-FFF2-40B4-BE49-F238E27FC236}">
+                <a16:creationId xmlns:a16="http://schemas.microsoft.com/office/drawing/2014/main" id="{D1512E5A-B809-4F4B-A4ED-D899E7C8424A}"/>
+              </a:ext>
+            </a:extLst>
+          </p:cNvPr>
+          <p:cNvSpPr>
+            <a:spLocks noGrp="1"/>
+          </p:cNvSpPr>
+          <p:nvPr>
+            <p:ph sz="half" idx="2"/>
+          </p:nvPr>
+        </p:nvSpPr>
+        <p:spPr>
+          <a:xfrm>
+            <a:off x="1154954" y="2603500"/>
+            <a:ext cx="9878917" cy="3416300"/>
+          </a:xfrm>
+        </p:spPr>
+        <p:txBody>
+          <a:bodyPr/>
+          <a:lstStyle/>
+          <a:p>
+            <a:pPr algn="l" rtl="0"/>
+            <a:r>
+              <a:rPr lang="en-US" dirty="0"/>
               <a:t>Classification of reviews (supervised model)</a:t>
             </a:r>
           </a:p>
@@ -15345,7 +16644,7 @@
 </p:sld>
 </file>
 
-<file path=ppt/slides/slide6.xml><?xml version="1.0" encoding="utf-8"?>
+<file path=ppt/slides/slide8.xml><?xml version="1.0" encoding="utf-8"?>
 <p:sld xmlns:a="http://schemas.openxmlformats.org/drawingml/2006/main" xmlns:r="http://schemas.openxmlformats.org/officeDocument/2006/relationships" xmlns:p="http://schemas.openxmlformats.org/presentationml/2006/main">
   <p:cSld>
     <p:spTree>
@@ -15558,7 +16857,7 @@
 </p:sld>
 </file>
 
-<file path=ppt/slides/slide7.xml><?xml version="1.0" encoding="utf-8"?>
+<file path=ppt/slides/slide9.xml><?xml version="1.0" encoding="utf-8"?>
 <p:sld xmlns:a="http://schemas.openxmlformats.org/drawingml/2006/main" xmlns:r="http://schemas.openxmlformats.org/officeDocument/2006/relationships" xmlns:p="http://schemas.openxmlformats.org/presentationml/2006/main">
   <p:cSld>
     <p:spTree>
@@ -15793,490 +17092,6 @@
     <p:extLst>
       <p:ext uri="{BB962C8B-B14F-4D97-AF65-F5344CB8AC3E}">
         <p14:creationId xmlns:p14="http://schemas.microsoft.com/office/powerpoint/2010/main" val="1051921710"/>
-      </p:ext>
-    </p:extLst>
-  </p:cSld>
-  <p:clrMapOvr>
-    <a:masterClrMapping/>
-  </p:clrMapOvr>
-</p:sld>
-</file>
-
-<file path=ppt/slides/slide8.xml><?xml version="1.0" encoding="utf-8"?>
-<p:sld xmlns:a="http://schemas.openxmlformats.org/drawingml/2006/main" xmlns:r="http://schemas.openxmlformats.org/officeDocument/2006/relationships" xmlns:p="http://schemas.openxmlformats.org/presentationml/2006/main">
-  <p:cSld>
-    <p:spTree>
-      <p:nvGrpSpPr>
-        <p:cNvPr id="1" name=""/>
-        <p:cNvGrpSpPr/>
-        <p:nvPr/>
-      </p:nvGrpSpPr>
-      <p:grpSpPr>
-        <a:xfrm>
-          <a:off x="0" y="0"/>
-          <a:ext cx="0" cy="0"/>
-          <a:chOff x="0" y="0"/>
-          <a:chExt cx="0" cy="0"/>
-        </a:xfrm>
-      </p:grpSpPr>
-      <p:sp>
-        <p:nvSpPr>
-          <p:cNvPr id="2" name="כותרת 1">
-            <a:extLst>
-              <a:ext uri="{FF2B5EF4-FFF2-40B4-BE49-F238E27FC236}">
-                <a16:creationId xmlns:a16="http://schemas.microsoft.com/office/drawing/2014/main" id="{5EF63109-57FF-4909-8FC9-A7AD1F49FC56}"/>
-              </a:ext>
-            </a:extLst>
-          </p:cNvPr>
-          <p:cNvSpPr>
-            <a:spLocks noGrp="1"/>
-          </p:cNvSpPr>
-          <p:nvPr>
-            <p:ph type="title"/>
-          </p:nvPr>
-        </p:nvSpPr>
-        <p:spPr/>
-        <p:txBody>
-          <a:bodyPr/>
-          <a:lstStyle/>
-          <a:p>
-            <a:r>
-              <a:rPr lang="en-US" dirty="0"/>
-              <a:t>Main things we did and challenges</a:t>
-            </a:r>
-            <a:endParaRPr lang="he-IL" dirty="0"/>
-          </a:p>
-        </p:txBody>
-      </p:sp>
-      <p:sp>
-        <p:nvSpPr>
-          <p:cNvPr id="4" name="מציין מיקום תוכן 3">
-            <a:extLst>
-              <a:ext uri="{FF2B5EF4-FFF2-40B4-BE49-F238E27FC236}">
-                <a16:creationId xmlns:a16="http://schemas.microsoft.com/office/drawing/2014/main" id="{D1512E5A-B809-4F4B-A4ED-D899E7C8424A}"/>
-              </a:ext>
-            </a:extLst>
-          </p:cNvPr>
-          <p:cNvSpPr>
-            <a:spLocks noGrp="1"/>
-          </p:cNvSpPr>
-          <p:nvPr>
-            <p:ph sz="half" idx="2"/>
-          </p:nvPr>
-        </p:nvSpPr>
-        <p:spPr>
-          <a:xfrm>
-            <a:off x="1154954" y="2603500"/>
-            <a:ext cx="9878917" cy="3416300"/>
-          </a:xfrm>
-        </p:spPr>
-        <p:txBody>
-          <a:bodyPr/>
-          <a:lstStyle/>
-          <a:p>
-            <a:pPr algn="l" rtl="0"/>
-            <a:r>
-              <a:rPr lang="en-US" dirty="0"/>
-              <a:t>Classification of reviews (supervised model)</a:t>
-            </a:r>
-          </a:p>
-          <a:p>
-            <a:pPr lvl="1" algn="l" rtl="0"/>
-            <a:r>
-              <a:rPr lang="en-US" dirty="0"/>
-              <a:t>..continue</a:t>
-            </a:r>
-          </a:p>
-          <a:p>
-            <a:pPr lvl="1" algn="l" rtl="0"/>
-            <a:endParaRPr lang="en-US" dirty="0"/>
-          </a:p>
-          <a:p>
-            <a:pPr lvl="1" algn="l" rtl="0"/>
-            <a:endParaRPr lang="he-IL" dirty="0"/>
-          </a:p>
-        </p:txBody>
-      </p:sp>
-      <p:sp>
-        <p:nvSpPr>
-          <p:cNvPr id="6" name="תיבת טקסט 5">
-            <a:extLst>
-              <a:ext uri="{FF2B5EF4-FFF2-40B4-BE49-F238E27FC236}">
-                <a16:creationId xmlns:a16="http://schemas.microsoft.com/office/drawing/2014/main" id="{43DD3447-9580-41B5-B558-7F65504323AE}"/>
-              </a:ext>
-            </a:extLst>
-          </p:cNvPr>
-          <p:cNvSpPr txBox="1"/>
-          <p:nvPr/>
-        </p:nvSpPr>
-        <p:spPr>
-          <a:xfrm>
-            <a:off x="1952016" y="6215975"/>
-            <a:ext cx="3073940" cy="369332"/>
-          </a:xfrm>
-          <a:prstGeom prst="rect">
-            <a:avLst/>
-          </a:prstGeom>
-          <a:noFill/>
-        </p:spPr>
-        <p:txBody>
-          <a:bodyPr wrap="square" rtlCol="1">
-            <a:spAutoFit/>
-          </a:bodyPr>
-          <a:lstStyle/>
-          <a:p>
-            <a:r>
-              <a:rPr lang="en-US" dirty="0"/>
-              <a:t>Logistic Regression Model</a:t>
-            </a:r>
-            <a:endParaRPr lang="he-IL" dirty="0"/>
-          </a:p>
-        </p:txBody>
-      </p:sp>
-      <p:sp>
-        <p:nvSpPr>
-          <p:cNvPr id="8" name="תיבת טקסט 7">
-            <a:extLst>
-              <a:ext uri="{FF2B5EF4-FFF2-40B4-BE49-F238E27FC236}">
-                <a16:creationId xmlns:a16="http://schemas.microsoft.com/office/drawing/2014/main" id="{AC713C63-930E-4995-AE6D-47382FB40DAF}"/>
-              </a:ext>
-            </a:extLst>
-          </p:cNvPr>
-          <p:cNvSpPr txBox="1"/>
-          <p:nvPr/>
-        </p:nvSpPr>
-        <p:spPr>
-          <a:xfrm>
-            <a:off x="8291210" y="6215975"/>
-            <a:ext cx="2916676" cy="369332"/>
-          </a:xfrm>
-          <a:prstGeom prst="rect">
-            <a:avLst/>
-          </a:prstGeom>
-          <a:noFill/>
-        </p:spPr>
-        <p:txBody>
-          <a:bodyPr wrap="square" rtlCol="1">
-            <a:spAutoFit/>
-          </a:bodyPr>
-          <a:lstStyle/>
-          <a:p>
-            <a:r>
-              <a:rPr lang="en-US" dirty="0"/>
-              <a:t>Naive Base Model</a:t>
-            </a:r>
-            <a:endParaRPr lang="he-IL" dirty="0"/>
-          </a:p>
-        </p:txBody>
-      </p:sp>
-      <p:pic>
-        <p:nvPicPr>
-          <p:cNvPr id="3" name="תמונה 2">
-            <a:extLst>
-              <a:ext uri="{FF2B5EF4-FFF2-40B4-BE49-F238E27FC236}">
-                <a16:creationId xmlns:a16="http://schemas.microsoft.com/office/drawing/2014/main" id="{5D37AE59-70DB-45A0-9458-876039244BF3}"/>
-              </a:ext>
-            </a:extLst>
-          </p:cNvPr>
-          <p:cNvPicPr>
-            <a:picLocks noChangeAspect="1"/>
-          </p:cNvPicPr>
-          <p:nvPr/>
-        </p:nvPicPr>
-        <p:blipFill>
-          <a:blip r:embed="rId2"/>
-          <a:stretch>
-            <a:fillRect/>
-          </a:stretch>
-        </p:blipFill>
-        <p:spPr>
-          <a:xfrm>
-            <a:off x="531061" y="3786046"/>
-            <a:ext cx="5915851" cy="2029108"/>
-          </a:xfrm>
-          <a:prstGeom prst="rect">
-            <a:avLst/>
-          </a:prstGeom>
-        </p:spPr>
-      </p:pic>
-      <p:pic>
-        <p:nvPicPr>
-          <p:cNvPr id="9" name="תמונה 8">
-            <a:extLst>
-              <a:ext uri="{FF2B5EF4-FFF2-40B4-BE49-F238E27FC236}">
-                <a16:creationId xmlns:a16="http://schemas.microsoft.com/office/drawing/2014/main" id="{78FB95B7-D7F6-4C22-8E4E-614F546EB462}"/>
-              </a:ext>
-            </a:extLst>
-          </p:cNvPr>
-          <p:cNvPicPr>
-            <a:picLocks noChangeAspect="1"/>
-          </p:cNvPicPr>
-          <p:nvPr/>
-        </p:nvPicPr>
-        <p:blipFill>
-          <a:blip r:embed="rId3"/>
-          <a:stretch>
-            <a:fillRect/>
-          </a:stretch>
-        </p:blipFill>
-        <p:spPr>
-          <a:xfrm>
-            <a:off x="6446912" y="3871783"/>
-            <a:ext cx="5630061" cy="1943371"/>
-          </a:xfrm>
-          <a:prstGeom prst="rect">
-            <a:avLst/>
-          </a:prstGeom>
-        </p:spPr>
-      </p:pic>
-    </p:spTree>
-    <p:extLst>
-      <p:ext uri="{BB962C8B-B14F-4D97-AF65-F5344CB8AC3E}">
-        <p14:creationId xmlns:p14="http://schemas.microsoft.com/office/powerpoint/2010/main" val="2121082668"/>
-      </p:ext>
-    </p:extLst>
-  </p:cSld>
-  <p:clrMapOvr>
-    <a:masterClrMapping/>
-  </p:clrMapOvr>
-</p:sld>
-</file>
-
-<file path=ppt/slides/slide9.xml><?xml version="1.0" encoding="utf-8"?>
-<p:sld xmlns:a="http://schemas.openxmlformats.org/drawingml/2006/main" xmlns:r="http://schemas.openxmlformats.org/officeDocument/2006/relationships" xmlns:p="http://schemas.openxmlformats.org/presentationml/2006/main">
-  <p:cSld>
-    <p:spTree>
-      <p:nvGrpSpPr>
-        <p:cNvPr id="1" name=""/>
-        <p:cNvGrpSpPr/>
-        <p:nvPr/>
-      </p:nvGrpSpPr>
-      <p:grpSpPr>
-        <a:xfrm>
-          <a:off x="0" y="0"/>
-          <a:ext cx="0" cy="0"/>
-          <a:chOff x="0" y="0"/>
-          <a:chExt cx="0" cy="0"/>
-        </a:xfrm>
-      </p:grpSpPr>
-      <p:sp>
-        <p:nvSpPr>
-          <p:cNvPr id="2" name="כותרת 1">
-            <a:extLst>
-              <a:ext uri="{FF2B5EF4-FFF2-40B4-BE49-F238E27FC236}">
-                <a16:creationId xmlns:a16="http://schemas.microsoft.com/office/drawing/2014/main" id="{5EF63109-57FF-4909-8FC9-A7AD1F49FC56}"/>
-              </a:ext>
-            </a:extLst>
-          </p:cNvPr>
-          <p:cNvSpPr>
-            <a:spLocks noGrp="1"/>
-          </p:cNvSpPr>
-          <p:nvPr>
-            <p:ph type="title"/>
-          </p:nvPr>
-        </p:nvSpPr>
-        <p:spPr/>
-        <p:txBody>
-          <a:bodyPr/>
-          <a:lstStyle/>
-          <a:p>
-            <a:r>
-              <a:rPr lang="en-US" dirty="0"/>
-              <a:t>Main things we did and challenges</a:t>
-            </a:r>
-            <a:endParaRPr lang="he-IL" dirty="0"/>
-          </a:p>
-        </p:txBody>
-      </p:sp>
-      <p:sp>
-        <p:nvSpPr>
-          <p:cNvPr id="4" name="מציין מיקום תוכן 3">
-            <a:extLst>
-              <a:ext uri="{FF2B5EF4-FFF2-40B4-BE49-F238E27FC236}">
-                <a16:creationId xmlns:a16="http://schemas.microsoft.com/office/drawing/2014/main" id="{D1512E5A-B809-4F4B-A4ED-D899E7C8424A}"/>
-              </a:ext>
-            </a:extLst>
-          </p:cNvPr>
-          <p:cNvSpPr>
-            <a:spLocks noGrp="1"/>
-          </p:cNvSpPr>
-          <p:nvPr>
-            <p:ph sz="half" idx="2"/>
-          </p:nvPr>
-        </p:nvSpPr>
-        <p:spPr>
-          <a:xfrm>
-            <a:off x="1154954" y="2603500"/>
-            <a:ext cx="9878917" cy="3416300"/>
-          </a:xfrm>
-        </p:spPr>
-        <p:txBody>
-          <a:bodyPr/>
-          <a:lstStyle/>
-          <a:p>
-            <a:pPr algn="l" rtl="0"/>
-            <a:r>
-              <a:rPr lang="en-US" dirty="0"/>
-              <a:t>Classification of reviews (supervised model)</a:t>
-            </a:r>
-          </a:p>
-          <a:p>
-            <a:pPr lvl="1" algn="l" rtl="0"/>
-            <a:r>
-              <a:rPr lang="en-US" dirty="0"/>
-              <a:t>..continue</a:t>
-            </a:r>
-          </a:p>
-          <a:p>
-            <a:pPr lvl="1" algn="l" rtl="0"/>
-            <a:endParaRPr lang="en-US" dirty="0"/>
-          </a:p>
-          <a:p>
-            <a:pPr lvl="1" algn="l" rtl="0"/>
-            <a:endParaRPr lang="he-IL" dirty="0"/>
-          </a:p>
-        </p:txBody>
-      </p:sp>
-      <p:sp>
-        <p:nvSpPr>
-          <p:cNvPr id="6" name="תיבת טקסט 5">
-            <a:extLst>
-              <a:ext uri="{FF2B5EF4-FFF2-40B4-BE49-F238E27FC236}">
-                <a16:creationId xmlns:a16="http://schemas.microsoft.com/office/drawing/2014/main" id="{43DD3447-9580-41B5-B558-7F65504323AE}"/>
-              </a:ext>
-            </a:extLst>
-          </p:cNvPr>
-          <p:cNvSpPr txBox="1"/>
-          <p:nvPr/>
-        </p:nvSpPr>
-        <p:spPr>
-          <a:xfrm>
-            <a:off x="1952016" y="6215975"/>
-            <a:ext cx="3073940" cy="369332"/>
-          </a:xfrm>
-          <a:prstGeom prst="rect">
-            <a:avLst/>
-          </a:prstGeom>
-          <a:noFill/>
-        </p:spPr>
-        <p:txBody>
-          <a:bodyPr wrap="square" rtlCol="1">
-            <a:spAutoFit/>
-          </a:bodyPr>
-          <a:lstStyle/>
-          <a:p>
-            <a:r>
-              <a:rPr lang="en-US" dirty="0" err="1"/>
-              <a:t>LinearSVC</a:t>
-            </a:r>
-            <a:r>
-              <a:rPr lang="en-US" dirty="0"/>
-              <a:t> Model</a:t>
-            </a:r>
-            <a:endParaRPr lang="he-IL" dirty="0"/>
-          </a:p>
-        </p:txBody>
-      </p:sp>
-      <p:pic>
-        <p:nvPicPr>
-          <p:cNvPr id="5" name="תמונה 4">
-            <a:extLst>
-              <a:ext uri="{FF2B5EF4-FFF2-40B4-BE49-F238E27FC236}">
-                <a16:creationId xmlns:a16="http://schemas.microsoft.com/office/drawing/2014/main" id="{6B4E1F83-7DE7-4966-866C-673866BB6590}"/>
-              </a:ext>
-            </a:extLst>
-          </p:cNvPr>
-          <p:cNvPicPr>
-            <a:picLocks noChangeAspect="1"/>
-          </p:cNvPicPr>
-          <p:nvPr/>
-        </p:nvPicPr>
-        <p:blipFill>
-          <a:blip r:embed="rId2"/>
-          <a:stretch>
-            <a:fillRect/>
-          </a:stretch>
-        </p:blipFill>
-        <p:spPr>
-          <a:xfrm>
-            <a:off x="464351" y="3863062"/>
-            <a:ext cx="5630061" cy="1952898"/>
-          </a:xfrm>
-          <a:prstGeom prst="rect">
-            <a:avLst/>
-          </a:prstGeom>
-        </p:spPr>
-      </p:pic>
-      <p:sp>
-        <p:nvSpPr>
-          <p:cNvPr id="10" name="תיבת טקסט 9">
-            <a:extLst>
-              <a:ext uri="{FF2B5EF4-FFF2-40B4-BE49-F238E27FC236}">
-                <a16:creationId xmlns:a16="http://schemas.microsoft.com/office/drawing/2014/main" id="{233EEE49-06ED-4996-A0EB-CE0225E9877D}"/>
-              </a:ext>
-            </a:extLst>
-          </p:cNvPr>
-          <p:cNvSpPr txBox="1"/>
-          <p:nvPr/>
-        </p:nvSpPr>
-        <p:spPr>
-          <a:xfrm>
-            <a:off x="8213387" y="6215975"/>
-            <a:ext cx="3073940" cy="369332"/>
-          </a:xfrm>
-          <a:prstGeom prst="rect">
-            <a:avLst/>
-          </a:prstGeom>
-          <a:noFill/>
-        </p:spPr>
-        <p:txBody>
-          <a:bodyPr wrap="square" rtlCol="1">
-            <a:spAutoFit/>
-          </a:bodyPr>
-          <a:lstStyle/>
-          <a:p>
-            <a:r>
-              <a:rPr lang="en-US" dirty="0"/>
-              <a:t>KNN Model (k=7)</a:t>
-            </a:r>
-            <a:endParaRPr lang="he-IL" dirty="0"/>
-          </a:p>
-        </p:txBody>
-      </p:sp>
-      <p:pic>
-        <p:nvPicPr>
-          <p:cNvPr id="11" name="תמונה 10">
-            <a:extLst>
-              <a:ext uri="{FF2B5EF4-FFF2-40B4-BE49-F238E27FC236}">
-                <a16:creationId xmlns:a16="http://schemas.microsoft.com/office/drawing/2014/main" id="{06455232-D515-401C-9D5C-DF308A8CD444}"/>
-              </a:ext>
-            </a:extLst>
-          </p:cNvPr>
-          <p:cNvPicPr>
-            <a:picLocks noChangeAspect="1"/>
-          </p:cNvPicPr>
-          <p:nvPr/>
-        </p:nvPicPr>
-        <p:blipFill>
-          <a:blip r:embed="rId3"/>
-          <a:stretch>
-            <a:fillRect/>
-          </a:stretch>
-        </p:blipFill>
-        <p:spPr>
-          <a:xfrm>
-            <a:off x="6422601" y="3920220"/>
-            <a:ext cx="5591955" cy="1838582"/>
-          </a:xfrm>
-          <a:prstGeom prst="rect">
-            <a:avLst/>
-          </a:prstGeom>
-        </p:spPr>
-      </p:pic>
-    </p:spTree>
-    <p:extLst>
-      <p:ext uri="{BB962C8B-B14F-4D97-AF65-F5344CB8AC3E}">
-        <p14:creationId xmlns:p14="http://schemas.microsoft.com/office/powerpoint/2010/main" val="2749043660"/>
       </p:ext>
     </p:extLst>
   </p:cSld>

</xml_diff>

<commit_message>
update status and links
</commit_message>
<xml_diff>
--- a/Things we did in project.pptx
+++ b/Things we did in project.pptx
@@ -5,7 +5,7 @@
     <p:sldMasterId id="2147483672" r:id="rId1"/>
   </p:sldMasterIdLst>
   <p:notesMasterIdLst>
-    <p:notesMasterId r:id="rId20"/>
+    <p:notesMasterId r:id="rId26"/>
   </p:notesMasterIdLst>
   <p:sldIdLst>
     <p:sldId id="256" r:id="rId2"/>
@@ -24,8 +24,14 @@
     <p:sldId id="273" r:id="rId15"/>
     <p:sldId id="276" r:id="rId16"/>
     <p:sldId id="277" r:id="rId17"/>
-    <p:sldId id="278" r:id="rId18"/>
-    <p:sldId id="279" r:id="rId19"/>
+    <p:sldId id="284" r:id="rId18"/>
+    <p:sldId id="285" r:id="rId19"/>
+    <p:sldId id="278" r:id="rId20"/>
+    <p:sldId id="279" r:id="rId21"/>
+    <p:sldId id="280" r:id="rId22"/>
+    <p:sldId id="281" r:id="rId23"/>
+    <p:sldId id="282" r:id="rId24"/>
+    <p:sldId id="283" r:id="rId25"/>
   </p:sldIdLst>
   <p:sldSz cx="12192000" cy="6858000"/>
   <p:notesSz cx="6858000" cy="9144000"/>
@@ -214,7 +220,7 @@
           <a:p>
             <a:fld id="{99B3FE1B-01D1-459D-875F-8154E6AE5851}" type="datetimeFigureOut">
               <a:rPr lang="he-IL" smtClean="0"/>
-              <a:t>כ"ו/כסלו/תשפ"א</a:t>
+              <a:t>כ"ט/כסלו/תשפ"א</a:t>
             </a:fld>
             <a:endParaRPr lang="he-IL"/>
           </a:p>
@@ -816,7 +822,7 @@
           <a:p>
             <a:fld id="{8236B938-022E-4225-A7C0-0A189B935F48}" type="datetimeFigureOut">
               <a:rPr lang="he-IL" smtClean="0"/>
-              <a:t>כ"ו/כסלו/תשפ"א</a:t>
+              <a:t>כ"ט/כסלו/תשפ"א</a:t>
             </a:fld>
             <a:endParaRPr lang="he-IL"/>
           </a:p>
@@ -1904,7 +1910,7 @@
           <a:p>
             <a:fld id="{8236B938-022E-4225-A7C0-0A189B935F48}" type="datetimeFigureOut">
               <a:rPr lang="he-IL" smtClean="0"/>
-              <a:t>כ"ו/כסלו/תשפ"א</a:t>
+              <a:t>כ"ט/כסלו/תשפ"א</a:t>
             </a:fld>
             <a:endParaRPr lang="he-IL"/>
           </a:p>
@@ -2884,7 +2890,7 @@
           <a:p>
             <a:fld id="{8236B938-022E-4225-A7C0-0A189B935F48}" type="datetimeFigureOut">
               <a:rPr lang="he-IL" smtClean="0"/>
-              <a:t>כ"ו/כסלו/תשפ"א</a:t>
+              <a:t>כ"ט/כסלו/תשפ"א</a:t>
             </a:fld>
             <a:endParaRPr lang="he-IL"/>
           </a:p>
@@ -4018,7 +4024,7 @@
           <a:p>
             <a:fld id="{8236B938-022E-4225-A7C0-0A189B935F48}" type="datetimeFigureOut">
               <a:rPr lang="he-IL" smtClean="0"/>
-              <a:t>כ"ו/כסלו/תשפ"א</a:t>
+              <a:t>כ"ט/כסלו/תשפ"א</a:t>
             </a:fld>
             <a:endParaRPr lang="he-IL"/>
           </a:p>
@@ -5051,7 +5057,7 @@
           <a:p>
             <a:fld id="{8236B938-022E-4225-A7C0-0A189B935F48}" type="datetimeFigureOut">
               <a:rPr lang="he-IL" smtClean="0"/>
-              <a:t>כ"ו/כסלו/תשפ"א</a:t>
+              <a:t>כ"ט/כסלו/תשפ"א</a:t>
             </a:fld>
             <a:endParaRPr lang="he-IL"/>
           </a:p>
@@ -5711,7 +5717,7 @@
           <a:p>
             <a:fld id="{8236B938-022E-4225-A7C0-0A189B935F48}" type="datetimeFigureOut">
               <a:rPr lang="he-IL" smtClean="0"/>
-              <a:t>כ"ו/כסלו/תשפ"א</a:t>
+              <a:t>כ"ט/כסלו/תשפ"א</a:t>
             </a:fld>
             <a:endParaRPr lang="he-IL"/>
           </a:p>
@@ -6572,7 +6578,7 @@
           <a:p>
             <a:fld id="{8236B938-022E-4225-A7C0-0A189B935F48}" type="datetimeFigureOut">
               <a:rPr lang="he-IL" smtClean="0"/>
-              <a:t>כ"ו/כסלו/תשפ"א</a:t>
+              <a:t>כ"ט/כסלו/תשפ"א</a:t>
             </a:fld>
             <a:endParaRPr lang="he-IL"/>
           </a:p>
@@ -6762,7 +6768,7 @@
           <a:p>
             <a:fld id="{8236B938-022E-4225-A7C0-0A189B935F48}" type="datetimeFigureOut">
               <a:rPr lang="he-IL" smtClean="0"/>
-              <a:t>כ"ו/כסלו/תשפ"א</a:t>
+              <a:t>כ"ט/כסלו/תשפ"א</a:t>
             </a:fld>
             <a:endParaRPr lang="he-IL"/>
           </a:p>
@@ -7734,7 +7740,7 @@
           <a:p>
             <a:fld id="{8236B938-022E-4225-A7C0-0A189B935F48}" type="datetimeFigureOut">
               <a:rPr lang="he-IL" smtClean="0"/>
-              <a:t>כ"ו/כסלו/תשפ"א</a:t>
+              <a:t>כ"ט/כסלו/תשפ"א</a:t>
             </a:fld>
             <a:endParaRPr lang="he-IL"/>
           </a:p>
@@ -7945,7 +7951,7 @@
           <a:p>
             <a:fld id="{8236B938-022E-4225-A7C0-0A189B935F48}" type="datetimeFigureOut">
               <a:rPr lang="he-IL" smtClean="0"/>
-              <a:t>כ"ו/כסלו/תשפ"א</a:t>
+              <a:t>כ"ט/כסלו/תשפ"א</a:t>
             </a:fld>
             <a:endParaRPr lang="he-IL"/>
           </a:p>
@@ -8979,7 +8985,7 @@
           <a:p>
             <a:fld id="{8236B938-022E-4225-A7C0-0A189B935F48}" type="datetimeFigureOut">
               <a:rPr lang="he-IL" smtClean="0"/>
-              <a:t>כ"ו/כסלו/תשפ"א</a:t>
+              <a:t>כ"ט/כסלו/תשפ"א</a:t>
             </a:fld>
             <a:endParaRPr lang="he-IL"/>
           </a:p>
@@ -9251,7 +9257,7 @@
           <a:p>
             <a:fld id="{8236B938-022E-4225-A7C0-0A189B935F48}" type="datetimeFigureOut">
               <a:rPr lang="he-IL" smtClean="0"/>
-              <a:t>כ"ו/כסלו/תשפ"א</a:t>
+              <a:t>כ"ט/כסלו/תשפ"א</a:t>
             </a:fld>
             <a:endParaRPr lang="he-IL"/>
           </a:p>
@@ -9666,7 +9672,7 @@
           <a:p>
             <a:fld id="{8236B938-022E-4225-A7C0-0A189B935F48}" type="datetimeFigureOut">
               <a:rPr lang="he-IL" smtClean="0"/>
-              <a:t>כ"ו/כסלו/תשפ"א</a:t>
+              <a:t>כ"ט/כסלו/תשפ"א</a:t>
             </a:fld>
             <a:endParaRPr lang="he-IL"/>
           </a:p>
@@ -9798,7 +9804,7 @@
           <a:p>
             <a:fld id="{8236B938-022E-4225-A7C0-0A189B935F48}" type="datetimeFigureOut">
               <a:rPr lang="he-IL" smtClean="0"/>
-              <a:t>כ"ו/כסלו/תשפ"א</a:t>
+              <a:t>כ"ט/כסלו/תשפ"א</a:t>
             </a:fld>
             <a:endParaRPr lang="he-IL"/>
           </a:p>
@@ -9893,7 +9899,7 @@
           <a:p>
             <a:fld id="{8236B938-022E-4225-A7C0-0A189B935F48}" type="datetimeFigureOut">
               <a:rPr lang="he-IL" smtClean="0"/>
-              <a:t>כ"ו/כסלו/תשפ"א</a:t>
+              <a:t>כ"ט/כסלו/תשפ"א</a:t>
             </a:fld>
             <a:endParaRPr lang="he-IL"/>
           </a:p>
@@ -10974,7 +10980,7 @@
           <a:p>
             <a:fld id="{8236B938-022E-4225-A7C0-0A189B935F48}" type="datetimeFigureOut">
               <a:rPr lang="he-IL" smtClean="0"/>
-              <a:t>כ"ו/כסלו/תשפ"א</a:t>
+              <a:t>כ"ט/כסלו/תשפ"א</a:t>
             </a:fld>
             <a:endParaRPr lang="he-IL"/>
           </a:p>
@@ -12087,7 +12093,7 @@
           <a:p>
             <a:fld id="{8236B938-022E-4225-A7C0-0A189B935F48}" type="datetimeFigureOut">
               <a:rPr lang="he-IL" smtClean="0"/>
-              <a:t>כ"ו/כסלו/תשפ"א</a:t>
+              <a:t>כ"ט/כסלו/תשפ"א</a:t>
             </a:fld>
             <a:endParaRPr lang="he-IL"/>
           </a:p>
@@ -13084,7 +13090,7 @@
           <a:p>
             <a:fld id="{8236B938-022E-4225-A7C0-0A189B935F48}" type="datetimeFigureOut">
               <a:rPr lang="he-IL" smtClean="0"/>
-              <a:t>כ"ו/כסלו/תשפ"א</a:t>
+              <a:t>כ"ט/כסלו/תשפ"א</a:t>
             </a:fld>
             <a:endParaRPr lang="he-IL"/>
           </a:p>
@@ -16075,6 +16081,2363 @@
 <file path=ppt/slides/slide17.xml><?xml version="1.0" encoding="utf-8"?>
 <p:sld xmlns:a="http://schemas.openxmlformats.org/drawingml/2006/main" xmlns:r="http://schemas.openxmlformats.org/officeDocument/2006/relationships" xmlns:p="http://schemas.openxmlformats.org/presentationml/2006/main">
   <p:cSld>
+    <p:bg>
+      <p:bgPr>
+        <a:solidFill>
+          <a:schemeClr val="bg1"/>
+        </a:solidFill>
+        <a:effectLst/>
+      </p:bgPr>
+    </p:bg>
+    <p:spTree>
+      <p:nvGrpSpPr>
+        <p:cNvPr id="1" name=""/>
+        <p:cNvGrpSpPr/>
+        <p:nvPr/>
+      </p:nvGrpSpPr>
+      <p:grpSpPr>
+        <a:xfrm>
+          <a:off x="0" y="0"/>
+          <a:ext cx="0" cy="0"/>
+          <a:chOff x="0" y="0"/>
+          <a:chExt cx="0" cy="0"/>
+        </a:xfrm>
+      </p:grpSpPr>
+      <p:grpSp>
+        <p:nvGrpSpPr>
+          <p:cNvPr id="9" name="Group 8">
+            <a:extLst>
+              <a:ext uri="{FF2B5EF4-FFF2-40B4-BE49-F238E27FC236}">
+                <a16:creationId xmlns:a16="http://schemas.microsoft.com/office/drawing/2014/main" id="{FAEF28A3-012D-4640-B8B8-1EF6EAF7233B}"/>
+              </a:ext>
+              <a:ext uri="{C183D7F6-B498-43B3-948B-1728B52AA6E4}">
+                <adec:decorative xmlns:adec="http://schemas.microsoft.com/office/drawing/2017/decorative" val="1"/>
+              </a:ext>
+            </a:extLst>
+          </p:cNvPr>
+          <p:cNvGrpSpPr>
+            <a:grpSpLocks noGrp="1" noUngrp="1" noRot="1" noChangeAspect="1" noMove="1" noResize="1"/>
+          </p:cNvGrpSpPr>
+          <p:nvPr>
+            <p:extLst>
+              <p:ext uri="{386F3935-93C4-4BCD-93E2-E3B085C9AB24}">
+                <p16:designElem xmlns:p16="http://schemas.microsoft.com/office/powerpoint/2015/main" val="1"/>
+              </p:ext>
+            </p:extLst>
+          </p:nvPr>
+        </p:nvGrpSpPr>
+        <p:grpSpPr>
+          <a:xfrm>
+            <a:off x="0" y="0"/>
+            <a:ext cx="12192000" cy="6858000"/>
+            <a:chOff x="0" y="0"/>
+            <a:chExt cx="12192000" cy="6858000"/>
+          </a:xfrm>
+        </p:grpSpPr>
+        <p:sp>
+          <p:nvSpPr>
+            <p:cNvPr id="10" name="Rectangle 9">
+              <a:extLst>
+                <a:ext uri="{FF2B5EF4-FFF2-40B4-BE49-F238E27FC236}">
+                  <a16:creationId xmlns:a16="http://schemas.microsoft.com/office/drawing/2014/main" id="{F3B2F1C2-14D3-4A53-B329-323795BCFD5A}"/>
+                </a:ext>
+                <a:ext uri="{C183D7F6-B498-43B3-948B-1728B52AA6E4}">
+                  <adec:decorative xmlns:adec="http://schemas.microsoft.com/office/drawing/2017/decorative" val="1"/>
+                </a:ext>
+              </a:extLst>
+            </p:cNvPr>
+            <p:cNvSpPr/>
+            <p:nvPr>
+              <p:extLst>
+                <p:ext uri="{386F3935-93C4-4BCD-93E2-E3B085C9AB24}">
+                  <p16:designElem xmlns:p16="http://schemas.microsoft.com/office/powerpoint/2015/main" val="1"/>
+                </p:ext>
+              </p:extLst>
+            </p:nvPr>
+          </p:nvSpPr>
+          <p:spPr>
+            <a:xfrm>
+              <a:off x="0" y="0"/>
+              <a:ext cx="12192000" cy="6858000"/>
+            </a:xfrm>
+            <a:prstGeom prst="rect">
+              <a:avLst/>
+            </a:prstGeom>
+            <a:blipFill>
+              <a:blip r:embed="rId2">
+                <a:duotone>
+                  <a:schemeClr val="dk2">
+                    <a:shade val="69000"/>
+                    <a:hueMod val="91000"/>
+                    <a:satMod val="164000"/>
+                    <a:lumMod val="74000"/>
+                  </a:schemeClr>
+                  <a:schemeClr val="dk2">
+                    <a:hueMod val="124000"/>
+                    <a:satMod val="140000"/>
+                    <a:lumMod val="142000"/>
+                  </a:schemeClr>
+                </a:duotone>
+              </a:blip>
+              <a:stretch>
+                <a:fillRect/>
+              </a:stretch>
+            </a:blipFill>
+            <a:ln>
+              <a:noFill/>
+            </a:ln>
+          </p:spPr>
+          <p:style>
+            <a:lnRef idx="2">
+              <a:schemeClr val="accent1">
+                <a:shade val="50000"/>
+              </a:schemeClr>
+            </a:lnRef>
+            <a:fillRef idx="1">
+              <a:schemeClr val="accent1"/>
+            </a:fillRef>
+            <a:effectRef idx="0">
+              <a:schemeClr val="accent1"/>
+            </a:effectRef>
+            <a:fontRef idx="minor">
+              <a:schemeClr val="lt1"/>
+            </a:fontRef>
+          </p:style>
+        </p:sp>
+        <p:sp>
+          <p:nvSpPr>
+            <p:cNvPr id="11" name="Oval 10">
+              <a:extLst>
+                <a:ext uri="{FF2B5EF4-FFF2-40B4-BE49-F238E27FC236}">
+                  <a16:creationId xmlns:a16="http://schemas.microsoft.com/office/drawing/2014/main" id="{194E879E-1515-4211-8F1B-B68A92B2C20E}"/>
+                </a:ext>
+                <a:ext uri="{C183D7F6-B498-43B3-948B-1728B52AA6E4}">
+                  <adec:decorative xmlns:adec="http://schemas.microsoft.com/office/drawing/2017/decorative" val="1"/>
+                </a:ext>
+              </a:extLst>
+            </p:cNvPr>
+            <p:cNvSpPr/>
+            <p:nvPr>
+              <p:extLst>
+                <p:ext uri="{386F3935-93C4-4BCD-93E2-E3B085C9AB24}">
+                  <p16:designElem xmlns:p16="http://schemas.microsoft.com/office/powerpoint/2015/main" val="1"/>
+                </p:ext>
+              </p:extLst>
+            </p:nvPr>
+          </p:nvSpPr>
+          <p:spPr>
+            <a:xfrm>
+              <a:off x="0" y="2667000"/>
+              <a:ext cx="4191000" cy="4191000"/>
+            </a:xfrm>
+            <a:prstGeom prst="ellipse">
+              <a:avLst/>
+            </a:prstGeom>
+            <a:gradFill flip="none" rotWithShape="1">
+              <a:gsLst>
+                <a:gs pos="0">
+                  <a:schemeClr val="accent5">
+                    <a:alpha val="11000"/>
+                  </a:schemeClr>
+                </a:gs>
+                <a:gs pos="75000">
+                  <a:schemeClr val="accent5">
+                    <a:alpha val="0"/>
+                  </a:schemeClr>
+                </a:gs>
+                <a:gs pos="36000">
+                  <a:schemeClr val="accent5">
+                    <a:alpha val="10000"/>
+                  </a:schemeClr>
+                </a:gs>
+              </a:gsLst>
+              <a:path path="circle">
+                <a:fillToRect l="50000" t="50000" r="50000" b="50000"/>
+              </a:path>
+              <a:tileRect/>
+            </a:gradFill>
+            <a:ln>
+              <a:noFill/>
+            </a:ln>
+            <a:effectLst/>
+          </p:spPr>
+          <p:style>
+            <a:lnRef idx="1">
+              <a:schemeClr val="accent1"/>
+            </a:lnRef>
+            <a:fillRef idx="3">
+              <a:schemeClr val="accent1"/>
+            </a:fillRef>
+            <a:effectRef idx="2">
+              <a:schemeClr val="accent1"/>
+            </a:effectRef>
+            <a:fontRef idx="minor">
+              <a:schemeClr val="lt1"/>
+            </a:fontRef>
+          </p:style>
+        </p:sp>
+        <p:sp>
+          <p:nvSpPr>
+            <p:cNvPr id="12" name="Oval 11">
+              <a:extLst>
+                <a:ext uri="{FF2B5EF4-FFF2-40B4-BE49-F238E27FC236}">
+                  <a16:creationId xmlns:a16="http://schemas.microsoft.com/office/drawing/2014/main" id="{F7137E7D-1F4E-498A-97D1-0E1FE6FC6F9F}"/>
+                </a:ext>
+                <a:ext uri="{C183D7F6-B498-43B3-948B-1728B52AA6E4}">
+                  <adec:decorative xmlns:adec="http://schemas.microsoft.com/office/drawing/2017/decorative" val="1"/>
+                </a:ext>
+              </a:extLst>
+            </p:cNvPr>
+            <p:cNvSpPr/>
+            <p:nvPr>
+              <p:extLst>
+                <p:ext uri="{386F3935-93C4-4BCD-93E2-E3B085C9AB24}">
+                  <p16:designElem xmlns:p16="http://schemas.microsoft.com/office/powerpoint/2015/main" val="1"/>
+                </p:ext>
+              </p:extLst>
+            </p:nvPr>
+          </p:nvSpPr>
+          <p:spPr>
+            <a:xfrm>
+              <a:off x="0" y="2895600"/>
+              <a:ext cx="2362200" cy="2362200"/>
+            </a:xfrm>
+            <a:prstGeom prst="ellipse">
+              <a:avLst/>
+            </a:prstGeom>
+            <a:gradFill flip="none" rotWithShape="1">
+              <a:gsLst>
+                <a:gs pos="0">
+                  <a:schemeClr val="accent5">
+                    <a:alpha val="8000"/>
+                  </a:schemeClr>
+                </a:gs>
+                <a:gs pos="72000">
+                  <a:schemeClr val="accent5">
+                    <a:alpha val="0"/>
+                  </a:schemeClr>
+                </a:gs>
+                <a:gs pos="36000">
+                  <a:schemeClr val="accent5">
+                    <a:alpha val="8000"/>
+                  </a:schemeClr>
+                </a:gs>
+              </a:gsLst>
+              <a:path path="circle">
+                <a:fillToRect l="50000" t="50000" r="50000" b="50000"/>
+              </a:path>
+              <a:tileRect/>
+            </a:gradFill>
+            <a:ln>
+              <a:noFill/>
+            </a:ln>
+            <a:effectLst/>
+          </p:spPr>
+          <p:style>
+            <a:lnRef idx="1">
+              <a:schemeClr val="accent1"/>
+            </a:lnRef>
+            <a:fillRef idx="3">
+              <a:schemeClr val="accent1"/>
+            </a:fillRef>
+            <a:effectRef idx="2">
+              <a:schemeClr val="accent1"/>
+            </a:effectRef>
+            <a:fontRef idx="minor">
+              <a:schemeClr val="lt1"/>
+            </a:fontRef>
+          </p:style>
+        </p:sp>
+        <p:sp>
+          <p:nvSpPr>
+            <p:cNvPr id="13" name="Oval 12">
+              <a:extLst>
+                <a:ext uri="{FF2B5EF4-FFF2-40B4-BE49-F238E27FC236}">
+                  <a16:creationId xmlns:a16="http://schemas.microsoft.com/office/drawing/2014/main" id="{91375183-B6E5-43E0-B28F-39EC9083853F}"/>
+                </a:ext>
+                <a:ext uri="{C183D7F6-B498-43B3-948B-1728B52AA6E4}">
+                  <adec:decorative xmlns:adec="http://schemas.microsoft.com/office/drawing/2017/decorative" val="1"/>
+                </a:ext>
+              </a:extLst>
+            </p:cNvPr>
+            <p:cNvSpPr/>
+            <p:nvPr>
+              <p:extLst>
+                <p:ext uri="{386F3935-93C4-4BCD-93E2-E3B085C9AB24}">
+                  <p16:designElem xmlns:p16="http://schemas.microsoft.com/office/powerpoint/2015/main" val="1"/>
+                </p:ext>
+              </p:extLst>
+            </p:nvPr>
+          </p:nvSpPr>
+          <p:spPr>
+            <a:xfrm>
+              <a:off x="8609012" y="5867400"/>
+              <a:ext cx="990600" cy="990600"/>
+            </a:xfrm>
+            <a:prstGeom prst="ellipse">
+              <a:avLst/>
+            </a:prstGeom>
+            <a:gradFill flip="none" rotWithShape="1">
+              <a:gsLst>
+                <a:gs pos="0">
+                  <a:schemeClr val="accent5">
+                    <a:alpha val="14000"/>
+                  </a:schemeClr>
+                </a:gs>
+                <a:gs pos="66000">
+                  <a:schemeClr val="accent5">
+                    <a:alpha val="0"/>
+                  </a:schemeClr>
+                </a:gs>
+                <a:gs pos="36000">
+                  <a:schemeClr val="accent5">
+                    <a:alpha val="7000"/>
+                  </a:schemeClr>
+                </a:gs>
+              </a:gsLst>
+              <a:path path="circle">
+                <a:fillToRect l="50000" t="50000" r="50000" b="50000"/>
+              </a:path>
+              <a:tileRect/>
+            </a:gradFill>
+            <a:ln>
+              <a:noFill/>
+            </a:ln>
+            <a:effectLst/>
+          </p:spPr>
+          <p:style>
+            <a:lnRef idx="1">
+              <a:schemeClr val="accent1"/>
+            </a:lnRef>
+            <a:fillRef idx="3">
+              <a:schemeClr val="accent1"/>
+            </a:fillRef>
+            <a:effectRef idx="2">
+              <a:schemeClr val="accent1"/>
+            </a:effectRef>
+            <a:fontRef idx="minor">
+              <a:schemeClr val="lt1"/>
+            </a:fontRef>
+          </p:style>
+        </p:sp>
+        <p:sp>
+          <p:nvSpPr>
+            <p:cNvPr id="14" name="Oval 13">
+              <a:extLst>
+                <a:ext uri="{FF2B5EF4-FFF2-40B4-BE49-F238E27FC236}">
+                  <a16:creationId xmlns:a16="http://schemas.microsoft.com/office/drawing/2014/main" id="{267F36BD-A8AF-4304-A662-1007CC1748D8}"/>
+                </a:ext>
+                <a:ext uri="{C183D7F6-B498-43B3-948B-1728B52AA6E4}">
+                  <adec:decorative xmlns:adec="http://schemas.microsoft.com/office/drawing/2017/decorative" val="1"/>
+                </a:ext>
+              </a:extLst>
+            </p:cNvPr>
+            <p:cNvSpPr/>
+            <p:nvPr>
+              <p:extLst>
+                <p:ext uri="{386F3935-93C4-4BCD-93E2-E3B085C9AB24}">
+                  <p16:designElem xmlns:p16="http://schemas.microsoft.com/office/powerpoint/2015/main" val="1"/>
+                </p:ext>
+              </p:extLst>
+            </p:nvPr>
+          </p:nvSpPr>
+          <p:spPr>
+            <a:xfrm>
+              <a:off x="8609012" y="1676400"/>
+              <a:ext cx="2819400" cy="2819400"/>
+            </a:xfrm>
+            <a:prstGeom prst="ellipse">
+              <a:avLst/>
+            </a:prstGeom>
+            <a:gradFill flip="none" rotWithShape="1">
+              <a:gsLst>
+                <a:gs pos="0">
+                  <a:schemeClr val="accent5">
+                    <a:alpha val="7000"/>
+                  </a:schemeClr>
+                </a:gs>
+                <a:gs pos="69000">
+                  <a:schemeClr val="accent5">
+                    <a:alpha val="0"/>
+                  </a:schemeClr>
+                </a:gs>
+                <a:gs pos="36000">
+                  <a:schemeClr val="accent5">
+                    <a:alpha val="6000"/>
+                  </a:schemeClr>
+                </a:gs>
+              </a:gsLst>
+              <a:path path="circle">
+                <a:fillToRect l="50000" t="50000" r="50000" b="50000"/>
+              </a:path>
+              <a:tileRect/>
+            </a:gradFill>
+            <a:ln>
+              <a:noFill/>
+            </a:ln>
+            <a:effectLst/>
+          </p:spPr>
+          <p:style>
+            <a:lnRef idx="1">
+              <a:schemeClr val="accent1"/>
+            </a:lnRef>
+            <a:fillRef idx="3">
+              <a:schemeClr val="accent1"/>
+            </a:fillRef>
+            <a:effectRef idx="2">
+              <a:schemeClr val="accent1"/>
+            </a:effectRef>
+            <a:fontRef idx="minor">
+              <a:schemeClr val="lt1"/>
+            </a:fontRef>
+          </p:style>
+        </p:sp>
+        <p:sp>
+          <p:nvSpPr>
+            <p:cNvPr id="15" name="Oval 14">
+              <a:extLst>
+                <a:ext uri="{FF2B5EF4-FFF2-40B4-BE49-F238E27FC236}">
+                  <a16:creationId xmlns:a16="http://schemas.microsoft.com/office/drawing/2014/main" id="{15D9095F-2809-4A90-A032-250AC21C3529}"/>
+                </a:ext>
+                <a:ext uri="{C183D7F6-B498-43B3-948B-1728B52AA6E4}">
+                  <adec:decorative xmlns:adec="http://schemas.microsoft.com/office/drawing/2017/decorative" val="1"/>
+                </a:ext>
+              </a:extLst>
+            </p:cNvPr>
+            <p:cNvSpPr/>
+            <p:nvPr>
+              <p:extLst>
+                <p:ext uri="{386F3935-93C4-4BCD-93E2-E3B085C9AB24}">
+                  <p16:designElem xmlns:p16="http://schemas.microsoft.com/office/powerpoint/2015/main" val="1"/>
+                </p:ext>
+              </p:extLst>
+            </p:nvPr>
+          </p:nvSpPr>
+          <p:spPr>
+            <a:xfrm>
+              <a:off x="7999412" y="8464"/>
+              <a:ext cx="1600200" cy="1600200"/>
+            </a:xfrm>
+            <a:prstGeom prst="ellipse">
+              <a:avLst/>
+            </a:prstGeom>
+            <a:gradFill flip="none" rotWithShape="1">
+              <a:gsLst>
+                <a:gs pos="0">
+                  <a:schemeClr val="accent5">
+                    <a:alpha val="14000"/>
+                  </a:schemeClr>
+                </a:gs>
+                <a:gs pos="73000">
+                  <a:schemeClr val="accent5">
+                    <a:alpha val="0"/>
+                  </a:schemeClr>
+                </a:gs>
+                <a:gs pos="36000">
+                  <a:schemeClr val="accent5">
+                    <a:alpha val="7000"/>
+                  </a:schemeClr>
+                </a:gs>
+              </a:gsLst>
+              <a:path path="circle">
+                <a:fillToRect l="50000" t="50000" r="50000" b="50000"/>
+              </a:path>
+              <a:tileRect/>
+            </a:gradFill>
+            <a:ln>
+              <a:noFill/>
+            </a:ln>
+            <a:effectLst/>
+          </p:spPr>
+          <p:style>
+            <a:lnRef idx="1">
+              <a:schemeClr val="accent1"/>
+            </a:lnRef>
+            <a:fillRef idx="3">
+              <a:schemeClr val="accent1"/>
+            </a:fillRef>
+            <a:effectRef idx="2">
+              <a:schemeClr val="accent1"/>
+            </a:effectRef>
+            <a:fontRef idx="minor">
+              <a:schemeClr val="lt1"/>
+            </a:fontRef>
+          </p:style>
+        </p:sp>
+        <p:sp>
+          <p:nvSpPr>
+            <p:cNvPr id="16" name="Freeform 5">
+              <a:extLst>
+                <a:ext uri="{FF2B5EF4-FFF2-40B4-BE49-F238E27FC236}">
+                  <a16:creationId xmlns:a16="http://schemas.microsoft.com/office/drawing/2014/main" id="{9027D7BF-C282-4477-A406-245C3F26521E}"/>
+                </a:ext>
+                <a:ext uri="{C183D7F6-B498-43B3-948B-1728B52AA6E4}">
+                  <adec:decorative xmlns:adec="http://schemas.microsoft.com/office/drawing/2017/decorative" val="1"/>
+                </a:ext>
+              </a:extLst>
+            </p:cNvPr>
+            <p:cNvSpPr/>
+            <p:nvPr>
+              <p:extLst>
+                <p:ext uri="{386F3935-93C4-4BCD-93E2-E3B085C9AB24}">
+                  <p16:designElem xmlns:p16="http://schemas.microsoft.com/office/powerpoint/2015/main" val="1"/>
+                </p:ext>
+              </p:extLst>
+            </p:nvPr>
+          </p:nvSpPr>
+          <p:spPr bwMode="gray">
+            <a:xfrm rot="21010068">
+              <a:off x="8490951" y="1797517"/>
+              <a:ext cx="3299407" cy="440924"/>
+            </a:xfrm>
+            <a:custGeom>
+              <a:avLst/>
+              <a:gdLst/>
+              <a:ahLst/>
+              <a:cxnLst/>
+              <a:rect l="l" t="t" r="r" b="b"/>
+              <a:pathLst>
+                <a:path w="10000" h="5291">
+                  <a:moveTo>
+                    <a:pt x="85" y="2532"/>
+                  </a:moveTo>
+                  <a:cubicBezTo>
+                    <a:pt x="1736" y="3911"/>
+                    <a:pt x="7524" y="5298"/>
+                    <a:pt x="9958" y="5291"/>
+                  </a:cubicBezTo>
+                  <a:cubicBezTo>
+                    <a:pt x="9989" y="1958"/>
+                    <a:pt x="9969" y="3333"/>
+                    <a:pt x="10000" y="0"/>
+                  </a:cubicBezTo>
+                  <a:lnTo>
+                    <a:pt x="10000" y="0"/>
+                  </a:lnTo>
+                  <a:lnTo>
+                    <a:pt x="9667" y="204"/>
+                  </a:lnTo>
+                  <a:lnTo>
+                    <a:pt x="9334" y="400"/>
+                  </a:lnTo>
+                  <a:lnTo>
+                    <a:pt x="9001" y="590"/>
+                  </a:lnTo>
+                  <a:lnTo>
+                    <a:pt x="8667" y="753"/>
+                  </a:lnTo>
+                  <a:lnTo>
+                    <a:pt x="8333" y="917"/>
+                  </a:lnTo>
+                  <a:lnTo>
+                    <a:pt x="7999" y="1071"/>
+                  </a:lnTo>
+                  <a:lnTo>
+                    <a:pt x="7669" y="1202"/>
+                  </a:lnTo>
+                  <a:lnTo>
+                    <a:pt x="7333" y="1325"/>
+                  </a:lnTo>
+                  <a:lnTo>
+                    <a:pt x="7000" y="1440"/>
+                  </a:lnTo>
+                  <a:lnTo>
+                    <a:pt x="6673" y="1538"/>
+                  </a:lnTo>
+                  <a:lnTo>
+                    <a:pt x="6340" y="1636"/>
+                  </a:lnTo>
+                  <a:lnTo>
+                    <a:pt x="6013" y="1719"/>
+                  </a:lnTo>
+                  <a:lnTo>
+                    <a:pt x="5686" y="1784"/>
+                  </a:lnTo>
+                  <a:lnTo>
+                    <a:pt x="5359" y="1850"/>
+                  </a:lnTo>
+                  <a:lnTo>
+                    <a:pt x="5036" y="1906"/>
+                  </a:lnTo>
+                  <a:lnTo>
+                    <a:pt x="4717" y="1948"/>
+                  </a:lnTo>
+                  <a:lnTo>
+                    <a:pt x="4396" y="1980"/>
+                  </a:lnTo>
+                  <a:lnTo>
+                    <a:pt x="4079" y="2013"/>
+                  </a:lnTo>
+                  <a:lnTo>
+                    <a:pt x="3766" y="2029"/>
+                  </a:lnTo>
+                  <a:lnTo>
+                    <a:pt x="3454" y="2046"/>
+                  </a:lnTo>
+                  <a:lnTo>
+                    <a:pt x="3145" y="2053"/>
+                  </a:lnTo>
+                  <a:lnTo>
+                    <a:pt x="2839" y="2046"/>
+                  </a:lnTo>
+                  <a:lnTo>
+                    <a:pt x="2537" y="2046"/>
+                  </a:lnTo>
+                  <a:lnTo>
+                    <a:pt x="2238" y="2029"/>
+                  </a:lnTo>
+                  <a:lnTo>
+                    <a:pt x="1943" y="2004"/>
+                  </a:lnTo>
+                  <a:lnTo>
+                    <a:pt x="1653" y="1980"/>
+                  </a:lnTo>
+                  <a:lnTo>
+                    <a:pt x="1368" y="1955"/>
+                  </a:lnTo>
+                  <a:lnTo>
+                    <a:pt x="1085" y="1915"/>
+                  </a:lnTo>
+                  <a:lnTo>
+                    <a:pt x="806" y="1873"/>
+                  </a:lnTo>
+                  <a:lnTo>
+                    <a:pt x="533" y="1833"/>
+                  </a:lnTo>
+                  <a:lnTo>
+                    <a:pt x="0" y="1726"/>
+                  </a:lnTo>
+                  <a:cubicBezTo>
+                    <a:pt x="28" y="1995"/>
+                    <a:pt x="57" y="2263"/>
+                    <a:pt x="85" y="2532"/>
+                  </a:cubicBezTo>
+                  <a:close/>
+                </a:path>
+              </a:pathLst>
+            </a:custGeom>
+            <a:solidFill>
+              <a:schemeClr val="bg1">
+                <a:alpha val="20000"/>
+              </a:schemeClr>
+            </a:solidFill>
+            <a:ln>
+              <a:noFill/>
+            </a:ln>
+          </p:spPr>
+        </p:sp>
+        <p:sp>
+          <p:nvSpPr>
+            <p:cNvPr id="17" name="Freeform 5">
+              <a:extLst>
+                <a:ext uri="{FF2B5EF4-FFF2-40B4-BE49-F238E27FC236}">
+                  <a16:creationId xmlns:a16="http://schemas.microsoft.com/office/drawing/2014/main" id="{AC3C43D8-426E-472E-A8E8-C41BF7A876B9}"/>
+                </a:ext>
+                <a:ext uri="{C183D7F6-B498-43B3-948B-1728B52AA6E4}">
+                  <adec:decorative xmlns:adec="http://schemas.microsoft.com/office/drawing/2017/decorative" val="1"/>
+                </a:ext>
+              </a:extLst>
+            </p:cNvPr>
+            <p:cNvSpPr/>
+            <p:nvPr>
+              <p:extLst>
+                <p:ext uri="{386F3935-93C4-4BCD-93E2-E3B085C9AB24}">
+                  <p16:designElem xmlns:p16="http://schemas.microsoft.com/office/powerpoint/2015/main" val="1"/>
+                </p:ext>
+              </p:extLst>
+            </p:nvPr>
+          </p:nvSpPr>
+          <p:spPr bwMode="gray">
+            <a:xfrm>
+              <a:off x="459506" y="1866405"/>
+              <a:ext cx="11277600" cy="4533900"/>
+            </a:xfrm>
+            <a:custGeom>
+              <a:avLst/>
+              <a:gdLst/>
+              <a:ahLst/>
+              <a:cxnLst/>
+              <a:rect l="0" t="0" r="r" b="b"/>
+              <a:pathLst>
+                <a:path w="7104" h="2856">
+                  <a:moveTo>
+                    <a:pt x="0" y="0"/>
+                  </a:moveTo>
+                  <a:lnTo>
+                    <a:pt x="0" y="2856"/>
+                  </a:lnTo>
+                  <a:lnTo>
+                    <a:pt x="7104" y="2856"/>
+                  </a:lnTo>
+                  <a:lnTo>
+                    <a:pt x="7104" y="1"/>
+                  </a:lnTo>
+                  <a:lnTo>
+                    <a:pt x="7104" y="1"/>
+                  </a:lnTo>
+                  <a:lnTo>
+                    <a:pt x="6943" y="26"/>
+                  </a:lnTo>
+                  <a:lnTo>
+                    <a:pt x="6782" y="50"/>
+                  </a:lnTo>
+                  <a:lnTo>
+                    <a:pt x="6621" y="73"/>
+                  </a:lnTo>
+                  <a:lnTo>
+                    <a:pt x="6459" y="93"/>
+                  </a:lnTo>
+                  <a:lnTo>
+                    <a:pt x="6298" y="113"/>
+                  </a:lnTo>
+                  <a:lnTo>
+                    <a:pt x="6136" y="132"/>
+                  </a:lnTo>
+                  <a:lnTo>
+                    <a:pt x="5976" y="148"/>
+                  </a:lnTo>
+                  <a:lnTo>
+                    <a:pt x="5814" y="163"/>
+                  </a:lnTo>
+                  <a:lnTo>
+                    <a:pt x="5653" y="177"/>
+                  </a:lnTo>
+                  <a:lnTo>
+                    <a:pt x="5494" y="189"/>
+                  </a:lnTo>
+                  <a:lnTo>
+                    <a:pt x="5334" y="201"/>
+                  </a:lnTo>
+                  <a:lnTo>
+                    <a:pt x="5175" y="211"/>
+                  </a:lnTo>
+                  <a:lnTo>
+                    <a:pt x="5017" y="219"/>
+                  </a:lnTo>
+                  <a:lnTo>
+                    <a:pt x="4859" y="227"/>
+                  </a:lnTo>
+                  <a:lnTo>
+                    <a:pt x="4703" y="234"/>
+                  </a:lnTo>
+                  <a:lnTo>
+                    <a:pt x="4548" y="239"/>
+                  </a:lnTo>
+                  <a:lnTo>
+                    <a:pt x="4393" y="243"/>
+                  </a:lnTo>
+                  <a:lnTo>
+                    <a:pt x="4240" y="247"/>
+                  </a:lnTo>
+                  <a:lnTo>
+                    <a:pt x="4088" y="249"/>
+                  </a:lnTo>
+                  <a:lnTo>
+                    <a:pt x="3937" y="251"/>
+                  </a:lnTo>
+                  <a:lnTo>
+                    <a:pt x="3788" y="252"/>
+                  </a:lnTo>
+                  <a:lnTo>
+                    <a:pt x="3640" y="251"/>
+                  </a:lnTo>
+                  <a:lnTo>
+                    <a:pt x="3494" y="251"/>
+                  </a:lnTo>
+                  <a:lnTo>
+                    <a:pt x="3349" y="249"/>
+                  </a:lnTo>
+                  <a:lnTo>
+                    <a:pt x="3207" y="246"/>
+                  </a:lnTo>
+                  <a:lnTo>
+                    <a:pt x="3066" y="243"/>
+                  </a:lnTo>
+                  <a:lnTo>
+                    <a:pt x="2928" y="240"/>
+                  </a:lnTo>
+                  <a:lnTo>
+                    <a:pt x="2791" y="235"/>
+                  </a:lnTo>
+                  <a:lnTo>
+                    <a:pt x="2656" y="230"/>
+                  </a:lnTo>
+                  <a:lnTo>
+                    <a:pt x="2524" y="225"/>
+                  </a:lnTo>
+                  <a:lnTo>
+                    <a:pt x="2266" y="212"/>
+                  </a:lnTo>
+                  <a:lnTo>
+                    <a:pt x="2019" y="198"/>
+                  </a:lnTo>
+                  <a:lnTo>
+                    <a:pt x="1782" y="183"/>
+                  </a:lnTo>
+                  <a:lnTo>
+                    <a:pt x="1557" y="167"/>
+                  </a:lnTo>
+                  <a:lnTo>
+                    <a:pt x="1343" y="150"/>
+                  </a:lnTo>
+                  <a:lnTo>
+                    <a:pt x="1144" y="132"/>
+                  </a:lnTo>
+                  <a:lnTo>
+                    <a:pt x="957" y="114"/>
+                  </a:lnTo>
+                  <a:lnTo>
+                    <a:pt x="785" y="96"/>
+                  </a:lnTo>
+                  <a:lnTo>
+                    <a:pt x="627" y="79"/>
+                  </a:lnTo>
+                  <a:lnTo>
+                    <a:pt x="487" y="63"/>
+                  </a:lnTo>
+                  <a:lnTo>
+                    <a:pt x="361" y="48"/>
+                  </a:lnTo>
+                  <a:lnTo>
+                    <a:pt x="254" y="35"/>
+                  </a:lnTo>
+                  <a:lnTo>
+                    <a:pt x="165" y="23"/>
+                  </a:lnTo>
+                  <a:lnTo>
+                    <a:pt x="42" y="6"/>
+                  </a:lnTo>
+                  <a:lnTo>
+                    <a:pt x="0" y="0"/>
+                  </a:lnTo>
+                  <a:lnTo>
+                    <a:pt x="0" y="0"/>
+                  </a:lnTo>
+                  <a:close/>
+                </a:path>
+              </a:pathLst>
+            </a:custGeom>
+            <a:solidFill>
+              <a:schemeClr val="bg1"/>
+            </a:solidFill>
+            <a:ln>
+              <a:noFill/>
+            </a:ln>
+          </p:spPr>
+        </p:sp>
+        <p:sp>
+          <p:nvSpPr>
+            <p:cNvPr id="18" name="Freeform 5">
+              <a:extLst>
+                <a:ext uri="{FF2B5EF4-FFF2-40B4-BE49-F238E27FC236}">
+                  <a16:creationId xmlns:a16="http://schemas.microsoft.com/office/drawing/2014/main" id="{52DCAE0E-B8DE-4C42-A48F-FA0C8345AC93}"/>
+                </a:ext>
+                <a:ext uri="{C183D7F6-B498-43B3-948B-1728B52AA6E4}">
+                  <adec:decorative xmlns:adec="http://schemas.microsoft.com/office/drawing/2017/decorative" val="1"/>
+                </a:ext>
+              </a:extLst>
+            </p:cNvPr>
+            <p:cNvSpPr>
+              <a:spLocks noEditPoints="1"/>
+            </p:cNvSpPr>
+            <p:nvPr>
+              <p:extLst>
+                <p:ext uri="{386F3935-93C4-4BCD-93E2-E3B085C9AB24}">
+                  <p16:designElem xmlns:p16="http://schemas.microsoft.com/office/powerpoint/2015/main" val="1"/>
+                </p:ext>
+              </p:extLst>
+            </p:nvPr>
+          </p:nvSpPr>
+          <p:spPr bwMode="gray">
+            <a:xfrm>
+              <a:off x="0" y="1587"/>
+              <a:ext cx="12192000" cy="6856413"/>
+            </a:xfrm>
+            <a:custGeom>
+              <a:avLst/>
+              <a:gdLst/>
+              <a:ahLst/>
+              <a:cxnLst/>
+              <a:rect l="0" t="0" r="r" b="b"/>
+              <a:pathLst>
+                <a:path w="15356" h="8638">
+                  <a:moveTo>
+                    <a:pt x="0" y="0"/>
+                  </a:moveTo>
+                  <a:lnTo>
+                    <a:pt x="0" y="8638"/>
+                  </a:lnTo>
+                  <a:lnTo>
+                    <a:pt x="15356" y="8638"/>
+                  </a:lnTo>
+                  <a:lnTo>
+                    <a:pt x="15356" y="0"/>
+                  </a:lnTo>
+                  <a:lnTo>
+                    <a:pt x="0" y="0"/>
+                  </a:lnTo>
+                  <a:close/>
+                  <a:moveTo>
+                    <a:pt x="14748" y="8038"/>
+                  </a:moveTo>
+                  <a:lnTo>
+                    <a:pt x="600" y="8038"/>
+                  </a:lnTo>
+                  <a:lnTo>
+                    <a:pt x="600" y="592"/>
+                  </a:lnTo>
+                  <a:lnTo>
+                    <a:pt x="14748" y="592"/>
+                  </a:lnTo>
+                  <a:lnTo>
+                    <a:pt x="14748" y="8038"/>
+                  </a:lnTo>
+                  <a:close/>
+                </a:path>
+              </a:pathLst>
+            </a:custGeom>
+            <a:solidFill>
+              <a:schemeClr val="bg1"/>
+            </a:solidFill>
+            <a:ln>
+              <a:noFill/>
+            </a:ln>
+          </p:spPr>
+        </p:sp>
+      </p:grpSp>
+      <p:sp>
+        <p:nvSpPr>
+          <p:cNvPr id="20" name="Rectangle 19">
+            <a:extLst>
+              <a:ext uri="{FF2B5EF4-FFF2-40B4-BE49-F238E27FC236}">
+                <a16:creationId xmlns:a16="http://schemas.microsoft.com/office/drawing/2014/main" id="{59647F54-801D-44AB-8284-EDDFF7763139}"/>
+              </a:ext>
+              <a:ext uri="{C183D7F6-B498-43B3-948B-1728B52AA6E4}">
+                <adec:decorative xmlns:adec="http://schemas.microsoft.com/office/drawing/2017/decorative" val="1"/>
+              </a:ext>
+            </a:extLst>
+          </p:cNvPr>
+          <p:cNvSpPr>
+            <a:spLocks noGrp="1" noRot="1" noChangeAspect="1" noMove="1" noResize="1" noEditPoints="1" noAdjustHandles="1" noChangeArrowheads="1" noChangeShapeType="1" noTextEdit="1"/>
+          </p:cNvSpPr>
+          <p:nvPr>
+            <p:extLst>
+              <p:ext uri="{386F3935-93C4-4BCD-93E2-E3B085C9AB24}">
+                <p16:designElem xmlns:p16="http://schemas.microsoft.com/office/powerpoint/2015/main" val="1"/>
+              </p:ext>
+            </p:extLst>
+          </p:nvPr>
+        </p:nvSpPr>
+        <p:spPr>
+          <a:xfrm>
+            <a:off x="10437812" y="0"/>
+            <a:ext cx="685800" cy="1143000"/>
+          </a:xfrm>
+          <a:prstGeom prst="rect">
+            <a:avLst/>
+          </a:prstGeom>
+          <a:solidFill>
+            <a:schemeClr val="accent1"/>
+          </a:solidFill>
+          <a:ln>
+            <a:noFill/>
+          </a:ln>
+        </p:spPr>
+        <p:style>
+          <a:lnRef idx="1">
+            <a:schemeClr val="accent1"/>
+          </a:lnRef>
+          <a:fillRef idx="3">
+            <a:schemeClr val="accent1"/>
+          </a:fillRef>
+          <a:effectRef idx="2">
+            <a:schemeClr val="accent1"/>
+          </a:effectRef>
+          <a:fontRef idx="minor">
+            <a:schemeClr val="lt1"/>
+          </a:fontRef>
+        </p:style>
+      </p:sp>
+      <p:sp>
+        <p:nvSpPr>
+          <p:cNvPr id="2" name="כותרת 1">
+            <a:extLst>
+              <a:ext uri="{FF2B5EF4-FFF2-40B4-BE49-F238E27FC236}">
+                <a16:creationId xmlns:a16="http://schemas.microsoft.com/office/drawing/2014/main" id="{5EF63109-57FF-4909-8FC9-A7AD1F49FC56}"/>
+              </a:ext>
+            </a:extLst>
+          </p:cNvPr>
+          <p:cNvSpPr>
+            <a:spLocks noGrp="1"/>
+          </p:cNvSpPr>
+          <p:nvPr>
+            <p:ph type="title"/>
+          </p:nvPr>
+        </p:nvSpPr>
+        <p:spPr>
+          <a:xfrm>
+            <a:off x="1154954" y="973668"/>
+            <a:ext cx="8761413" cy="706964"/>
+          </a:xfrm>
+        </p:spPr>
+        <p:txBody>
+          <a:bodyPr vert="horz" lIns="91440" tIns="45720" rIns="91440" bIns="45720" rtlCol="0" anchor="ctr">
+            <a:normAutofit/>
+          </a:bodyPr>
+          <a:lstStyle/>
+          <a:p>
+            <a:pPr rtl="0"/>
+            <a:r>
+              <a:rPr lang="en-US" dirty="0"/>
+              <a:t>Main things we did and challenges</a:t>
+            </a:r>
+            <a:endParaRPr lang="en-US"/>
+          </a:p>
+        </p:txBody>
+      </p:sp>
+      <p:sp>
+        <p:nvSpPr>
+          <p:cNvPr id="4" name="מציין מיקום תוכן 3">
+            <a:extLst>
+              <a:ext uri="{FF2B5EF4-FFF2-40B4-BE49-F238E27FC236}">
+                <a16:creationId xmlns:a16="http://schemas.microsoft.com/office/drawing/2014/main" id="{D1512E5A-B809-4F4B-A4ED-D899E7C8424A}"/>
+              </a:ext>
+            </a:extLst>
+          </p:cNvPr>
+          <p:cNvSpPr>
+            <a:spLocks noGrp="1"/>
+          </p:cNvSpPr>
+          <p:nvPr>
+            <p:ph sz="half" idx="2"/>
+          </p:nvPr>
+        </p:nvSpPr>
+        <p:spPr>
+          <a:xfrm>
+            <a:off x="240252" y="2368550"/>
+            <a:ext cx="4243896" cy="3416300"/>
+          </a:xfrm>
+        </p:spPr>
+        <p:txBody>
+          <a:bodyPr vert="horz" lIns="91440" tIns="45720" rIns="91440" bIns="45720" rtlCol="0" anchor="ctr">
+            <a:normAutofit/>
+          </a:bodyPr>
+          <a:lstStyle/>
+          <a:p>
+            <a:pPr algn="l" rtl="0"/>
+            <a:r>
+              <a:rPr lang="en-US" sz="1600" dirty="0"/>
+              <a:t>Classification of reviews (supervised model)</a:t>
+            </a:r>
+          </a:p>
+          <a:p>
+            <a:pPr lvl="1" algn="l" rtl="0"/>
+            <a:r>
+              <a:rPr lang="en-US" dirty="0"/>
+              <a:t>Using NN and GRU – a third run</a:t>
+            </a:r>
+          </a:p>
+          <a:p>
+            <a:pPr lvl="1" algn="l" rtl="0"/>
+            <a:r>
+              <a:rPr lang="en-US" dirty="0"/>
+              <a:t>Got better results than LSTM , but on predict got worser results</a:t>
+            </a:r>
+          </a:p>
+          <a:p>
+            <a:pPr lvl="1" algn="l" rtl="0"/>
+            <a:endParaRPr lang="en-US" dirty="0"/>
+          </a:p>
+          <a:p>
+            <a:pPr lvl="1" algn="l" rtl="0"/>
+            <a:endParaRPr lang="en-US" dirty="0"/>
+          </a:p>
+        </p:txBody>
+      </p:sp>
+      <p:pic>
+        <p:nvPicPr>
+          <p:cNvPr id="3" name="תמונה 2" descr="תמונה שמכילה טקסט&#10;&#10;התיאור נוצר באופן אוטומטי">
+            <a:extLst>
+              <a:ext uri="{FF2B5EF4-FFF2-40B4-BE49-F238E27FC236}">
+                <a16:creationId xmlns:a16="http://schemas.microsoft.com/office/drawing/2014/main" id="{9CA07EFD-62AB-42F4-9E6B-479A2C62FD18}"/>
+              </a:ext>
+            </a:extLst>
+          </p:cNvPr>
+          <p:cNvPicPr>
+            <a:picLocks noChangeAspect="1"/>
+          </p:cNvPicPr>
+          <p:nvPr/>
+        </p:nvPicPr>
+        <p:blipFill rotWithShape="1">
+          <a:blip r:embed="rId3"/>
+          <a:srcRect l="27415" r="16863"/>
+          <a:stretch/>
+        </p:blipFill>
+        <p:spPr>
+          <a:xfrm>
+            <a:off x="5435754" y="2435696"/>
+            <a:ext cx="5307110" cy="2643009"/>
+          </a:xfrm>
+          <a:prstGeom prst="roundRect">
+            <a:avLst>
+              <a:gd name="adj" fmla="val 1858"/>
+            </a:avLst>
+          </a:prstGeom>
+          <a:effectLst>
+            <a:outerShdw blurRad="50800" dist="50800" dir="5400000" algn="tl" rotWithShape="0">
+              <a:srgbClr val="000000">
+                <a:alpha val="43000"/>
+              </a:srgbClr>
+            </a:outerShdw>
+          </a:effectLst>
+        </p:spPr>
+      </p:pic>
+      <p:pic>
+        <p:nvPicPr>
+          <p:cNvPr id="5" name="תמונה 4">
+            <a:extLst>
+              <a:ext uri="{FF2B5EF4-FFF2-40B4-BE49-F238E27FC236}">
+                <a16:creationId xmlns:a16="http://schemas.microsoft.com/office/drawing/2014/main" id="{67D517CA-013B-4E7B-846D-4EEE8F8767E7}"/>
+              </a:ext>
+            </a:extLst>
+          </p:cNvPr>
+          <p:cNvPicPr>
+            <a:picLocks noChangeAspect="1"/>
+          </p:cNvPicPr>
+          <p:nvPr/>
+        </p:nvPicPr>
+        <p:blipFill>
+          <a:blip r:embed="rId4"/>
+          <a:stretch>
+            <a:fillRect/>
+          </a:stretch>
+        </p:blipFill>
+        <p:spPr>
+          <a:xfrm>
+            <a:off x="392837" y="5076810"/>
+            <a:ext cx="9314731" cy="904214"/>
+          </a:xfrm>
+          <a:prstGeom prst="rect">
+            <a:avLst/>
+          </a:prstGeom>
+        </p:spPr>
+      </p:pic>
+      <p:pic>
+        <p:nvPicPr>
+          <p:cNvPr id="6" name="תמונה 5">
+            <a:extLst>
+              <a:ext uri="{FF2B5EF4-FFF2-40B4-BE49-F238E27FC236}">
+                <a16:creationId xmlns:a16="http://schemas.microsoft.com/office/drawing/2014/main" id="{F102B0D2-76C3-4FDC-BC1A-D6655E99AC0D}"/>
+              </a:ext>
+            </a:extLst>
+          </p:cNvPr>
+          <p:cNvPicPr>
+            <a:picLocks noChangeAspect="1"/>
+          </p:cNvPicPr>
+          <p:nvPr/>
+        </p:nvPicPr>
+        <p:blipFill>
+          <a:blip r:embed="rId5"/>
+          <a:stretch>
+            <a:fillRect/>
+          </a:stretch>
+        </p:blipFill>
+        <p:spPr>
+          <a:xfrm>
+            <a:off x="418000" y="5895788"/>
+            <a:ext cx="9916367" cy="929659"/>
+          </a:xfrm>
+          <a:prstGeom prst="rect">
+            <a:avLst/>
+          </a:prstGeom>
+        </p:spPr>
+      </p:pic>
+    </p:spTree>
+    <p:extLst>
+      <p:ext uri="{BB962C8B-B14F-4D97-AF65-F5344CB8AC3E}">
+        <p14:creationId xmlns:p14="http://schemas.microsoft.com/office/powerpoint/2010/main" val="132607447"/>
+      </p:ext>
+    </p:extLst>
+  </p:cSld>
+  <p:clrMapOvr>
+    <a:masterClrMapping/>
+  </p:clrMapOvr>
+</p:sld>
+</file>
+
+<file path=ppt/slides/slide18.xml><?xml version="1.0" encoding="utf-8"?>
+<p:sld xmlns:a="http://schemas.openxmlformats.org/drawingml/2006/main" xmlns:r="http://schemas.openxmlformats.org/officeDocument/2006/relationships" xmlns:p="http://schemas.openxmlformats.org/presentationml/2006/main">
+  <p:cSld>
+    <p:bg>
+      <p:bgPr>
+        <a:solidFill>
+          <a:schemeClr val="bg1"/>
+        </a:solidFill>
+        <a:effectLst/>
+      </p:bgPr>
+    </p:bg>
+    <p:spTree>
+      <p:nvGrpSpPr>
+        <p:cNvPr id="1" name=""/>
+        <p:cNvGrpSpPr/>
+        <p:nvPr/>
+      </p:nvGrpSpPr>
+      <p:grpSpPr>
+        <a:xfrm>
+          <a:off x="0" y="0"/>
+          <a:ext cx="0" cy="0"/>
+          <a:chOff x="0" y="0"/>
+          <a:chExt cx="0" cy="0"/>
+        </a:xfrm>
+      </p:grpSpPr>
+      <p:grpSp>
+        <p:nvGrpSpPr>
+          <p:cNvPr id="9" name="Group 8">
+            <a:extLst>
+              <a:ext uri="{FF2B5EF4-FFF2-40B4-BE49-F238E27FC236}">
+                <a16:creationId xmlns:a16="http://schemas.microsoft.com/office/drawing/2014/main" id="{FAEF28A3-012D-4640-B8B8-1EF6EAF7233B}"/>
+              </a:ext>
+              <a:ext uri="{C183D7F6-B498-43B3-948B-1728B52AA6E4}">
+                <adec:decorative xmlns:adec="http://schemas.microsoft.com/office/drawing/2017/decorative" val="1"/>
+              </a:ext>
+            </a:extLst>
+          </p:cNvPr>
+          <p:cNvGrpSpPr>
+            <a:grpSpLocks noGrp="1" noUngrp="1" noRot="1" noChangeAspect="1" noMove="1" noResize="1"/>
+          </p:cNvGrpSpPr>
+          <p:nvPr>
+            <p:extLst>
+              <p:ext uri="{386F3935-93C4-4BCD-93E2-E3B085C9AB24}">
+                <p16:designElem xmlns:p16="http://schemas.microsoft.com/office/powerpoint/2015/main" val="1"/>
+              </p:ext>
+            </p:extLst>
+          </p:nvPr>
+        </p:nvGrpSpPr>
+        <p:grpSpPr>
+          <a:xfrm>
+            <a:off x="0" y="0"/>
+            <a:ext cx="12192000" cy="6858000"/>
+            <a:chOff x="0" y="0"/>
+            <a:chExt cx="12192000" cy="6858000"/>
+          </a:xfrm>
+        </p:grpSpPr>
+        <p:sp>
+          <p:nvSpPr>
+            <p:cNvPr id="10" name="Rectangle 9">
+              <a:extLst>
+                <a:ext uri="{FF2B5EF4-FFF2-40B4-BE49-F238E27FC236}">
+                  <a16:creationId xmlns:a16="http://schemas.microsoft.com/office/drawing/2014/main" id="{F3B2F1C2-14D3-4A53-B329-323795BCFD5A}"/>
+                </a:ext>
+                <a:ext uri="{C183D7F6-B498-43B3-948B-1728B52AA6E4}">
+                  <adec:decorative xmlns:adec="http://schemas.microsoft.com/office/drawing/2017/decorative" val="1"/>
+                </a:ext>
+              </a:extLst>
+            </p:cNvPr>
+            <p:cNvSpPr/>
+            <p:nvPr>
+              <p:extLst>
+                <p:ext uri="{386F3935-93C4-4BCD-93E2-E3B085C9AB24}">
+                  <p16:designElem xmlns:p16="http://schemas.microsoft.com/office/powerpoint/2015/main" val="1"/>
+                </p:ext>
+              </p:extLst>
+            </p:nvPr>
+          </p:nvSpPr>
+          <p:spPr>
+            <a:xfrm>
+              <a:off x="0" y="0"/>
+              <a:ext cx="12192000" cy="6858000"/>
+            </a:xfrm>
+            <a:prstGeom prst="rect">
+              <a:avLst/>
+            </a:prstGeom>
+            <a:blipFill>
+              <a:blip r:embed="rId2">
+                <a:duotone>
+                  <a:schemeClr val="dk2">
+                    <a:shade val="69000"/>
+                    <a:hueMod val="91000"/>
+                    <a:satMod val="164000"/>
+                    <a:lumMod val="74000"/>
+                  </a:schemeClr>
+                  <a:schemeClr val="dk2">
+                    <a:hueMod val="124000"/>
+                    <a:satMod val="140000"/>
+                    <a:lumMod val="142000"/>
+                  </a:schemeClr>
+                </a:duotone>
+              </a:blip>
+              <a:stretch>
+                <a:fillRect/>
+              </a:stretch>
+            </a:blipFill>
+            <a:ln>
+              <a:noFill/>
+            </a:ln>
+          </p:spPr>
+          <p:style>
+            <a:lnRef idx="2">
+              <a:schemeClr val="accent1">
+                <a:shade val="50000"/>
+              </a:schemeClr>
+            </a:lnRef>
+            <a:fillRef idx="1">
+              <a:schemeClr val="accent1"/>
+            </a:fillRef>
+            <a:effectRef idx="0">
+              <a:schemeClr val="accent1"/>
+            </a:effectRef>
+            <a:fontRef idx="minor">
+              <a:schemeClr val="lt1"/>
+            </a:fontRef>
+          </p:style>
+        </p:sp>
+        <p:sp>
+          <p:nvSpPr>
+            <p:cNvPr id="11" name="Oval 10">
+              <a:extLst>
+                <a:ext uri="{FF2B5EF4-FFF2-40B4-BE49-F238E27FC236}">
+                  <a16:creationId xmlns:a16="http://schemas.microsoft.com/office/drawing/2014/main" id="{194E879E-1515-4211-8F1B-B68A92B2C20E}"/>
+                </a:ext>
+                <a:ext uri="{C183D7F6-B498-43B3-948B-1728B52AA6E4}">
+                  <adec:decorative xmlns:adec="http://schemas.microsoft.com/office/drawing/2017/decorative" val="1"/>
+                </a:ext>
+              </a:extLst>
+            </p:cNvPr>
+            <p:cNvSpPr/>
+            <p:nvPr>
+              <p:extLst>
+                <p:ext uri="{386F3935-93C4-4BCD-93E2-E3B085C9AB24}">
+                  <p16:designElem xmlns:p16="http://schemas.microsoft.com/office/powerpoint/2015/main" val="1"/>
+                </p:ext>
+              </p:extLst>
+            </p:nvPr>
+          </p:nvSpPr>
+          <p:spPr>
+            <a:xfrm>
+              <a:off x="0" y="2667000"/>
+              <a:ext cx="4191000" cy="4191000"/>
+            </a:xfrm>
+            <a:prstGeom prst="ellipse">
+              <a:avLst/>
+            </a:prstGeom>
+            <a:gradFill flip="none" rotWithShape="1">
+              <a:gsLst>
+                <a:gs pos="0">
+                  <a:schemeClr val="accent5">
+                    <a:alpha val="11000"/>
+                  </a:schemeClr>
+                </a:gs>
+                <a:gs pos="75000">
+                  <a:schemeClr val="accent5">
+                    <a:alpha val="0"/>
+                  </a:schemeClr>
+                </a:gs>
+                <a:gs pos="36000">
+                  <a:schemeClr val="accent5">
+                    <a:alpha val="10000"/>
+                  </a:schemeClr>
+                </a:gs>
+              </a:gsLst>
+              <a:path path="circle">
+                <a:fillToRect l="50000" t="50000" r="50000" b="50000"/>
+              </a:path>
+              <a:tileRect/>
+            </a:gradFill>
+            <a:ln>
+              <a:noFill/>
+            </a:ln>
+            <a:effectLst/>
+          </p:spPr>
+          <p:style>
+            <a:lnRef idx="1">
+              <a:schemeClr val="accent1"/>
+            </a:lnRef>
+            <a:fillRef idx="3">
+              <a:schemeClr val="accent1"/>
+            </a:fillRef>
+            <a:effectRef idx="2">
+              <a:schemeClr val="accent1"/>
+            </a:effectRef>
+            <a:fontRef idx="minor">
+              <a:schemeClr val="lt1"/>
+            </a:fontRef>
+          </p:style>
+        </p:sp>
+        <p:sp>
+          <p:nvSpPr>
+            <p:cNvPr id="12" name="Oval 11">
+              <a:extLst>
+                <a:ext uri="{FF2B5EF4-FFF2-40B4-BE49-F238E27FC236}">
+                  <a16:creationId xmlns:a16="http://schemas.microsoft.com/office/drawing/2014/main" id="{F7137E7D-1F4E-498A-97D1-0E1FE6FC6F9F}"/>
+                </a:ext>
+                <a:ext uri="{C183D7F6-B498-43B3-948B-1728B52AA6E4}">
+                  <adec:decorative xmlns:adec="http://schemas.microsoft.com/office/drawing/2017/decorative" val="1"/>
+                </a:ext>
+              </a:extLst>
+            </p:cNvPr>
+            <p:cNvSpPr/>
+            <p:nvPr>
+              <p:extLst>
+                <p:ext uri="{386F3935-93C4-4BCD-93E2-E3B085C9AB24}">
+                  <p16:designElem xmlns:p16="http://schemas.microsoft.com/office/powerpoint/2015/main" val="1"/>
+                </p:ext>
+              </p:extLst>
+            </p:nvPr>
+          </p:nvSpPr>
+          <p:spPr>
+            <a:xfrm>
+              <a:off x="0" y="2895600"/>
+              <a:ext cx="2362200" cy="2362200"/>
+            </a:xfrm>
+            <a:prstGeom prst="ellipse">
+              <a:avLst/>
+            </a:prstGeom>
+            <a:gradFill flip="none" rotWithShape="1">
+              <a:gsLst>
+                <a:gs pos="0">
+                  <a:schemeClr val="accent5">
+                    <a:alpha val="8000"/>
+                  </a:schemeClr>
+                </a:gs>
+                <a:gs pos="72000">
+                  <a:schemeClr val="accent5">
+                    <a:alpha val="0"/>
+                  </a:schemeClr>
+                </a:gs>
+                <a:gs pos="36000">
+                  <a:schemeClr val="accent5">
+                    <a:alpha val="8000"/>
+                  </a:schemeClr>
+                </a:gs>
+              </a:gsLst>
+              <a:path path="circle">
+                <a:fillToRect l="50000" t="50000" r="50000" b="50000"/>
+              </a:path>
+              <a:tileRect/>
+            </a:gradFill>
+            <a:ln>
+              <a:noFill/>
+            </a:ln>
+            <a:effectLst/>
+          </p:spPr>
+          <p:style>
+            <a:lnRef idx="1">
+              <a:schemeClr val="accent1"/>
+            </a:lnRef>
+            <a:fillRef idx="3">
+              <a:schemeClr val="accent1"/>
+            </a:fillRef>
+            <a:effectRef idx="2">
+              <a:schemeClr val="accent1"/>
+            </a:effectRef>
+            <a:fontRef idx="minor">
+              <a:schemeClr val="lt1"/>
+            </a:fontRef>
+          </p:style>
+        </p:sp>
+        <p:sp>
+          <p:nvSpPr>
+            <p:cNvPr id="13" name="Oval 12">
+              <a:extLst>
+                <a:ext uri="{FF2B5EF4-FFF2-40B4-BE49-F238E27FC236}">
+                  <a16:creationId xmlns:a16="http://schemas.microsoft.com/office/drawing/2014/main" id="{91375183-B6E5-43E0-B28F-39EC9083853F}"/>
+                </a:ext>
+                <a:ext uri="{C183D7F6-B498-43B3-948B-1728B52AA6E4}">
+                  <adec:decorative xmlns:adec="http://schemas.microsoft.com/office/drawing/2017/decorative" val="1"/>
+                </a:ext>
+              </a:extLst>
+            </p:cNvPr>
+            <p:cNvSpPr/>
+            <p:nvPr>
+              <p:extLst>
+                <p:ext uri="{386F3935-93C4-4BCD-93E2-E3B085C9AB24}">
+                  <p16:designElem xmlns:p16="http://schemas.microsoft.com/office/powerpoint/2015/main" val="1"/>
+                </p:ext>
+              </p:extLst>
+            </p:nvPr>
+          </p:nvSpPr>
+          <p:spPr>
+            <a:xfrm>
+              <a:off x="8609012" y="5867400"/>
+              <a:ext cx="990600" cy="990600"/>
+            </a:xfrm>
+            <a:prstGeom prst="ellipse">
+              <a:avLst/>
+            </a:prstGeom>
+            <a:gradFill flip="none" rotWithShape="1">
+              <a:gsLst>
+                <a:gs pos="0">
+                  <a:schemeClr val="accent5">
+                    <a:alpha val="14000"/>
+                  </a:schemeClr>
+                </a:gs>
+                <a:gs pos="66000">
+                  <a:schemeClr val="accent5">
+                    <a:alpha val="0"/>
+                  </a:schemeClr>
+                </a:gs>
+                <a:gs pos="36000">
+                  <a:schemeClr val="accent5">
+                    <a:alpha val="7000"/>
+                  </a:schemeClr>
+                </a:gs>
+              </a:gsLst>
+              <a:path path="circle">
+                <a:fillToRect l="50000" t="50000" r="50000" b="50000"/>
+              </a:path>
+              <a:tileRect/>
+            </a:gradFill>
+            <a:ln>
+              <a:noFill/>
+            </a:ln>
+            <a:effectLst/>
+          </p:spPr>
+          <p:style>
+            <a:lnRef idx="1">
+              <a:schemeClr val="accent1"/>
+            </a:lnRef>
+            <a:fillRef idx="3">
+              <a:schemeClr val="accent1"/>
+            </a:fillRef>
+            <a:effectRef idx="2">
+              <a:schemeClr val="accent1"/>
+            </a:effectRef>
+            <a:fontRef idx="minor">
+              <a:schemeClr val="lt1"/>
+            </a:fontRef>
+          </p:style>
+        </p:sp>
+        <p:sp>
+          <p:nvSpPr>
+            <p:cNvPr id="14" name="Oval 13">
+              <a:extLst>
+                <a:ext uri="{FF2B5EF4-FFF2-40B4-BE49-F238E27FC236}">
+                  <a16:creationId xmlns:a16="http://schemas.microsoft.com/office/drawing/2014/main" id="{267F36BD-A8AF-4304-A662-1007CC1748D8}"/>
+                </a:ext>
+                <a:ext uri="{C183D7F6-B498-43B3-948B-1728B52AA6E4}">
+                  <adec:decorative xmlns:adec="http://schemas.microsoft.com/office/drawing/2017/decorative" val="1"/>
+                </a:ext>
+              </a:extLst>
+            </p:cNvPr>
+            <p:cNvSpPr/>
+            <p:nvPr>
+              <p:extLst>
+                <p:ext uri="{386F3935-93C4-4BCD-93E2-E3B085C9AB24}">
+                  <p16:designElem xmlns:p16="http://schemas.microsoft.com/office/powerpoint/2015/main" val="1"/>
+                </p:ext>
+              </p:extLst>
+            </p:nvPr>
+          </p:nvSpPr>
+          <p:spPr>
+            <a:xfrm>
+              <a:off x="8609012" y="1676400"/>
+              <a:ext cx="2819400" cy="2819400"/>
+            </a:xfrm>
+            <a:prstGeom prst="ellipse">
+              <a:avLst/>
+            </a:prstGeom>
+            <a:gradFill flip="none" rotWithShape="1">
+              <a:gsLst>
+                <a:gs pos="0">
+                  <a:schemeClr val="accent5">
+                    <a:alpha val="7000"/>
+                  </a:schemeClr>
+                </a:gs>
+                <a:gs pos="69000">
+                  <a:schemeClr val="accent5">
+                    <a:alpha val="0"/>
+                  </a:schemeClr>
+                </a:gs>
+                <a:gs pos="36000">
+                  <a:schemeClr val="accent5">
+                    <a:alpha val="6000"/>
+                  </a:schemeClr>
+                </a:gs>
+              </a:gsLst>
+              <a:path path="circle">
+                <a:fillToRect l="50000" t="50000" r="50000" b="50000"/>
+              </a:path>
+              <a:tileRect/>
+            </a:gradFill>
+            <a:ln>
+              <a:noFill/>
+            </a:ln>
+            <a:effectLst/>
+          </p:spPr>
+          <p:style>
+            <a:lnRef idx="1">
+              <a:schemeClr val="accent1"/>
+            </a:lnRef>
+            <a:fillRef idx="3">
+              <a:schemeClr val="accent1"/>
+            </a:fillRef>
+            <a:effectRef idx="2">
+              <a:schemeClr val="accent1"/>
+            </a:effectRef>
+            <a:fontRef idx="minor">
+              <a:schemeClr val="lt1"/>
+            </a:fontRef>
+          </p:style>
+        </p:sp>
+        <p:sp>
+          <p:nvSpPr>
+            <p:cNvPr id="15" name="Oval 14">
+              <a:extLst>
+                <a:ext uri="{FF2B5EF4-FFF2-40B4-BE49-F238E27FC236}">
+                  <a16:creationId xmlns:a16="http://schemas.microsoft.com/office/drawing/2014/main" id="{15D9095F-2809-4A90-A032-250AC21C3529}"/>
+                </a:ext>
+                <a:ext uri="{C183D7F6-B498-43B3-948B-1728B52AA6E4}">
+                  <adec:decorative xmlns:adec="http://schemas.microsoft.com/office/drawing/2017/decorative" val="1"/>
+                </a:ext>
+              </a:extLst>
+            </p:cNvPr>
+            <p:cNvSpPr/>
+            <p:nvPr>
+              <p:extLst>
+                <p:ext uri="{386F3935-93C4-4BCD-93E2-E3B085C9AB24}">
+                  <p16:designElem xmlns:p16="http://schemas.microsoft.com/office/powerpoint/2015/main" val="1"/>
+                </p:ext>
+              </p:extLst>
+            </p:nvPr>
+          </p:nvSpPr>
+          <p:spPr>
+            <a:xfrm>
+              <a:off x="7999412" y="8464"/>
+              <a:ext cx="1600200" cy="1600200"/>
+            </a:xfrm>
+            <a:prstGeom prst="ellipse">
+              <a:avLst/>
+            </a:prstGeom>
+            <a:gradFill flip="none" rotWithShape="1">
+              <a:gsLst>
+                <a:gs pos="0">
+                  <a:schemeClr val="accent5">
+                    <a:alpha val="14000"/>
+                  </a:schemeClr>
+                </a:gs>
+                <a:gs pos="73000">
+                  <a:schemeClr val="accent5">
+                    <a:alpha val="0"/>
+                  </a:schemeClr>
+                </a:gs>
+                <a:gs pos="36000">
+                  <a:schemeClr val="accent5">
+                    <a:alpha val="7000"/>
+                  </a:schemeClr>
+                </a:gs>
+              </a:gsLst>
+              <a:path path="circle">
+                <a:fillToRect l="50000" t="50000" r="50000" b="50000"/>
+              </a:path>
+              <a:tileRect/>
+            </a:gradFill>
+            <a:ln>
+              <a:noFill/>
+            </a:ln>
+            <a:effectLst/>
+          </p:spPr>
+          <p:style>
+            <a:lnRef idx="1">
+              <a:schemeClr val="accent1"/>
+            </a:lnRef>
+            <a:fillRef idx="3">
+              <a:schemeClr val="accent1"/>
+            </a:fillRef>
+            <a:effectRef idx="2">
+              <a:schemeClr val="accent1"/>
+            </a:effectRef>
+            <a:fontRef idx="minor">
+              <a:schemeClr val="lt1"/>
+            </a:fontRef>
+          </p:style>
+        </p:sp>
+        <p:sp>
+          <p:nvSpPr>
+            <p:cNvPr id="16" name="Freeform 5">
+              <a:extLst>
+                <a:ext uri="{FF2B5EF4-FFF2-40B4-BE49-F238E27FC236}">
+                  <a16:creationId xmlns:a16="http://schemas.microsoft.com/office/drawing/2014/main" id="{9027D7BF-C282-4477-A406-245C3F26521E}"/>
+                </a:ext>
+                <a:ext uri="{C183D7F6-B498-43B3-948B-1728B52AA6E4}">
+                  <adec:decorative xmlns:adec="http://schemas.microsoft.com/office/drawing/2017/decorative" val="1"/>
+                </a:ext>
+              </a:extLst>
+            </p:cNvPr>
+            <p:cNvSpPr/>
+            <p:nvPr>
+              <p:extLst>
+                <p:ext uri="{386F3935-93C4-4BCD-93E2-E3B085C9AB24}">
+                  <p16:designElem xmlns:p16="http://schemas.microsoft.com/office/powerpoint/2015/main" val="1"/>
+                </p:ext>
+              </p:extLst>
+            </p:nvPr>
+          </p:nvSpPr>
+          <p:spPr bwMode="gray">
+            <a:xfrm rot="21010068">
+              <a:off x="8490951" y="1797517"/>
+              <a:ext cx="3299407" cy="440924"/>
+            </a:xfrm>
+            <a:custGeom>
+              <a:avLst/>
+              <a:gdLst/>
+              <a:ahLst/>
+              <a:cxnLst/>
+              <a:rect l="l" t="t" r="r" b="b"/>
+              <a:pathLst>
+                <a:path w="10000" h="5291">
+                  <a:moveTo>
+                    <a:pt x="85" y="2532"/>
+                  </a:moveTo>
+                  <a:cubicBezTo>
+                    <a:pt x="1736" y="3911"/>
+                    <a:pt x="7524" y="5298"/>
+                    <a:pt x="9958" y="5291"/>
+                  </a:cubicBezTo>
+                  <a:cubicBezTo>
+                    <a:pt x="9989" y="1958"/>
+                    <a:pt x="9969" y="3333"/>
+                    <a:pt x="10000" y="0"/>
+                  </a:cubicBezTo>
+                  <a:lnTo>
+                    <a:pt x="10000" y="0"/>
+                  </a:lnTo>
+                  <a:lnTo>
+                    <a:pt x="9667" y="204"/>
+                  </a:lnTo>
+                  <a:lnTo>
+                    <a:pt x="9334" y="400"/>
+                  </a:lnTo>
+                  <a:lnTo>
+                    <a:pt x="9001" y="590"/>
+                  </a:lnTo>
+                  <a:lnTo>
+                    <a:pt x="8667" y="753"/>
+                  </a:lnTo>
+                  <a:lnTo>
+                    <a:pt x="8333" y="917"/>
+                  </a:lnTo>
+                  <a:lnTo>
+                    <a:pt x="7999" y="1071"/>
+                  </a:lnTo>
+                  <a:lnTo>
+                    <a:pt x="7669" y="1202"/>
+                  </a:lnTo>
+                  <a:lnTo>
+                    <a:pt x="7333" y="1325"/>
+                  </a:lnTo>
+                  <a:lnTo>
+                    <a:pt x="7000" y="1440"/>
+                  </a:lnTo>
+                  <a:lnTo>
+                    <a:pt x="6673" y="1538"/>
+                  </a:lnTo>
+                  <a:lnTo>
+                    <a:pt x="6340" y="1636"/>
+                  </a:lnTo>
+                  <a:lnTo>
+                    <a:pt x="6013" y="1719"/>
+                  </a:lnTo>
+                  <a:lnTo>
+                    <a:pt x="5686" y="1784"/>
+                  </a:lnTo>
+                  <a:lnTo>
+                    <a:pt x="5359" y="1850"/>
+                  </a:lnTo>
+                  <a:lnTo>
+                    <a:pt x="5036" y="1906"/>
+                  </a:lnTo>
+                  <a:lnTo>
+                    <a:pt x="4717" y="1948"/>
+                  </a:lnTo>
+                  <a:lnTo>
+                    <a:pt x="4396" y="1980"/>
+                  </a:lnTo>
+                  <a:lnTo>
+                    <a:pt x="4079" y="2013"/>
+                  </a:lnTo>
+                  <a:lnTo>
+                    <a:pt x="3766" y="2029"/>
+                  </a:lnTo>
+                  <a:lnTo>
+                    <a:pt x="3454" y="2046"/>
+                  </a:lnTo>
+                  <a:lnTo>
+                    <a:pt x="3145" y="2053"/>
+                  </a:lnTo>
+                  <a:lnTo>
+                    <a:pt x="2839" y="2046"/>
+                  </a:lnTo>
+                  <a:lnTo>
+                    <a:pt x="2537" y="2046"/>
+                  </a:lnTo>
+                  <a:lnTo>
+                    <a:pt x="2238" y="2029"/>
+                  </a:lnTo>
+                  <a:lnTo>
+                    <a:pt x="1943" y="2004"/>
+                  </a:lnTo>
+                  <a:lnTo>
+                    <a:pt x="1653" y="1980"/>
+                  </a:lnTo>
+                  <a:lnTo>
+                    <a:pt x="1368" y="1955"/>
+                  </a:lnTo>
+                  <a:lnTo>
+                    <a:pt x="1085" y="1915"/>
+                  </a:lnTo>
+                  <a:lnTo>
+                    <a:pt x="806" y="1873"/>
+                  </a:lnTo>
+                  <a:lnTo>
+                    <a:pt x="533" y="1833"/>
+                  </a:lnTo>
+                  <a:lnTo>
+                    <a:pt x="0" y="1726"/>
+                  </a:lnTo>
+                  <a:cubicBezTo>
+                    <a:pt x="28" y="1995"/>
+                    <a:pt x="57" y="2263"/>
+                    <a:pt x="85" y="2532"/>
+                  </a:cubicBezTo>
+                  <a:close/>
+                </a:path>
+              </a:pathLst>
+            </a:custGeom>
+            <a:solidFill>
+              <a:schemeClr val="bg1">
+                <a:alpha val="20000"/>
+              </a:schemeClr>
+            </a:solidFill>
+            <a:ln>
+              <a:noFill/>
+            </a:ln>
+          </p:spPr>
+        </p:sp>
+        <p:sp>
+          <p:nvSpPr>
+            <p:cNvPr id="17" name="Freeform 5">
+              <a:extLst>
+                <a:ext uri="{FF2B5EF4-FFF2-40B4-BE49-F238E27FC236}">
+                  <a16:creationId xmlns:a16="http://schemas.microsoft.com/office/drawing/2014/main" id="{AC3C43D8-426E-472E-A8E8-C41BF7A876B9}"/>
+                </a:ext>
+                <a:ext uri="{C183D7F6-B498-43B3-948B-1728B52AA6E4}">
+                  <adec:decorative xmlns:adec="http://schemas.microsoft.com/office/drawing/2017/decorative" val="1"/>
+                </a:ext>
+              </a:extLst>
+            </p:cNvPr>
+            <p:cNvSpPr/>
+            <p:nvPr>
+              <p:extLst>
+                <p:ext uri="{386F3935-93C4-4BCD-93E2-E3B085C9AB24}">
+                  <p16:designElem xmlns:p16="http://schemas.microsoft.com/office/powerpoint/2015/main" val="1"/>
+                </p:ext>
+              </p:extLst>
+            </p:nvPr>
+          </p:nvSpPr>
+          <p:spPr bwMode="gray">
+            <a:xfrm>
+              <a:off x="459506" y="1866405"/>
+              <a:ext cx="11277600" cy="4533900"/>
+            </a:xfrm>
+            <a:custGeom>
+              <a:avLst/>
+              <a:gdLst/>
+              <a:ahLst/>
+              <a:cxnLst/>
+              <a:rect l="0" t="0" r="r" b="b"/>
+              <a:pathLst>
+                <a:path w="7104" h="2856">
+                  <a:moveTo>
+                    <a:pt x="0" y="0"/>
+                  </a:moveTo>
+                  <a:lnTo>
+                    <a:pt x="0" y="2856"/>
+                  </a:lnTo>
+                  <a:lnTo>
+                    <a:pt x="7104" y="2856"/>
+                  </a:lnTo>
+                  <a:lnTo>
+                    <a:pt x="7104" y="1"/>
+                  </a:lnTo>
+                  <a:lnTo>
+                    <a:pt x="7104" y="1"/>
+                  </a:lnTo>
+                  <a:lnTo>
+                    <a:pt x="6943" y="26"/>
+                  </a:lnTo>
+                  <a:lnTo>
+                    <a:pt x="6782" y="50"/>
+                  </a:lnTo>
+                  <a:lnTo>
+                    <a:pt x="6621" y="73"/>
+                  </a:lnTo>
+                  <a:lnTo>
+                    <a:pt x="6459" y="93"/>
+                  </a:lnTo>
+                  <a:lnTo>
+                    <a:pt x="6298" y="113"/>
+                  </a:lnTo>
+                  <a:lnTo>
+                    <a:pt x="6136" y="132"/>
+                  </a:lnTo>
+                  <a:lnTo>
+                    <a:pt x="5976" y="148"/>
+                  </a:lnTo>
+                  <a:lnTo>
+                    <a:pt x="5814" y="163"/>
+                  </a:lnTo>
+                  <a:lnTo>
+                    <a:pt x="5653" y="177"/>
+                  </a:lnTo>
+                  <a:lnTo>
+                    <a:pt x="5494" y="189"/>
+                  </a:lnTo>
+                  <a:lnTo>
+                    <a:pt x="5334" y="201"/>
+                  </a:lnTo>
+                  <a:lnTo>
+                    <a:pt x="5175" y="211"/>
+                  </a:lnTo>
+                  <a:lnTo>
+                    <a:pt x="5017" y="219"/>
+                  </a:lnTo>
+                  <a:lnTo>
+                    <a:pt x="4859" y="227"/>
+                  </a:lnTo>
+                  <a:lnTo>
+                    <a:pt x="4703" y="234"/>
+                  </a:lnTo>
+                  <a:lnTo>
+                    <a:pt x="4548" y="239"/>
+                  </a:lnTo>
+                  <a:lnTo>
+                    <a:pt x="4393" y="243"/>
+                  </a:lnTo>
+                  <a:lnTo>
+                    <a:pt x="4240" y="247"/>
+                  </a:lnTo>
+                  <a:lnTo>
+                    <a:pt x="4088" y="249"/>
+                  </a:lnTo>
+                  <a:lnTo>
+                    <a:pt x="3937" y="251"/>
+                  </a:lnTo>
+                  <a:lnTo>
+                    <a:pt x="3788" y="252"/>
+                  </a:lnTo>
+                  <a:lnTo>
+                    <a:pt x="3640" y="251"/>
+                  </a:lnTo>
+                  <a:lnTo>
+                    <a:pt x="3494" y="251"/>
+                  </a:lnTo>
+                  <a:lnTo>
+                    <a:pt x="3349" y="249"/>
+                  </a:lnTo>
+                  <a:lnTo>
+                    <a:pt x="3207" y="246"/>
+                  </a:lnTo>
+                  <a:lnTo>
+                    <a:pt x="3066" y="243"/>
+                  </a:lnTo>
+                  <a:lnTo>
+                    <a:pt x="2928" y="240"/>
+                  </a:lnTo>
+                  <a:lnTo>
+                    <a:pt x="2791" y="235"/>
+                  </a:lnTo>
+                  <a:lnTo>
+                    <a:pt x="2656" y="230"/>
+                  </a:lnTo>
+                  <a:lnTo>
+                    <a:pt x="2524" y="225"/>
+                  </a:lnTo>
+                  <a:lnTo>
+                    <a:pt x="2266" y="212"/>
+                  </a:lnTo>
+                  <a:lnTo>
+                    <a:pt x="2019" y="198"/>
+                  </a:lnTo>
+                  <a:lnTo>
+                    <a:pt x="1782" y="183"/>
+                  </a:lnTo>
+                  <a:lnTo>
+                    <a:pt x="1557" y="167"/>
+                  </a:lnTo>
+                  <a:lnTo>
+                    <a:pt x="1343" y="150"/>
+                  </a:lnTo>
+                  <a:lnTo>
+                    <a:pt x="1144" y="132"/>
+                  </a:lnTo>
+                  <a:lnTo>
+                    <a:pt x="957" y="114"/>
+                  </a:lnTo>
+                  <a:lnTo>
+                    <a:pt x="785" y="96"/>
+                  </a:lnTo>
+                  <a:lnTo>
+                    <a:pt x="627" y="79"/>
+                  </a:lnTo>
+                  <a:lnTo>
+                    <a:pt x="487" y="63"/>
+                  </a:lnTo>
+                  <a:lnTo>
+                    <a:pt x="361" y="48"/>
+                  </a:lnTo>
+                  <a:lnTo>
+                    <a:pt x="254" y="35"/>
+                  </a:lnTo>
+                  <a:lnTo>
+                    <a:pt x="165" y="23"/>
+                  </a:lnTo>
+                  <a:lnTo>
+                    <a:pt x="42" y="6"/>
+                  </a:lnTo>
+                  <a:lnTo>
+                    <a:pt x="0" y="0"/>
+                  </a:lnTo>
+                  <a:lnTo>
+                    <a:pt x="0" y="0"/>
+                  </a:lnTo>
+                  <a:close/>
+                </a:path>
+              </a:pathLst>
+            </a:custGeom>
+            <a:solidFill>
+              <a:schemeClr val="bg1"/>
+            </a:solidFill>
+            <a:ln>
+              <a:noFill/>
+            </a:ln>
+          </p:spPr>
+        </p:sp>
+        <p:sp>
+          <p:nvSpPr>
+            <p:cNvPr id="18" name="Freeform 5">
+              <a:extLst>
+                <a:ext uri="{FF2B5EF4-FFF2-40B4-BE49-F238E27FC236}">
+                  <a16:creationId xmlns:a16="http://schemas.microsoft.com/office/drawing/2014/main" id="{52DCAE0E-B8DE-4C42-A48F-FA0C8345AC93}"/>
+                </a:ext>
+                <a:ext uri="{C183D7F6-B498-43B3-948B-1728B52AA6E4}">
+                  <adec:decorative xmlns:adec="http://schemas.microsoft.com/office/drawing/2017/decorative" val="1"/>
+                </a:ext>
+              </a:extLst>
+            </p:cNvPr>
+            <p:cNvSpPr>
+              <a:spLocks noEditPoints="1"/>
+            </p:cNvSpPr>
+            <p:nvPr>
+              <p:extLst>
+                <p:ext uri="{386F3935-93C4-4BCD-93E2-E3B085C9AB24}">
+                  <p16:designElem xmlns:p16="http://schemas.microsoft.com/office/powerpoint/2015/main" val="1"/>
+                </p:ext>
+              </p:extLst>
+            </p:nvPr>
+          </p:nvSpPr>
+          <p:spPr bwMode="gray">
+            <a:xfrm>
+              <a:off x="0" y="1587"/>
+              <a:ext cx="12192000" cy="6856413"/>
+            </a:xfrm>
+            <a:custGeom>
+              <a:avLst/>
+              <a:gdLst/>
+              <a:ahLst/>
+              <a:cxnLst/>
+              <a:rect l="0" t="0" r="r" b="b"/>
+              <a:pathLst>
+                <a:path w="15356" h="8638">
+                  <a:moveTo>
+                    <a:pt x="0" y="0"/>
+                  </a:moveTo>
+                  <a:lnTo>
+                    <a:pt x="0" y="8638"/>
+                  </a:lnTo>
+                  <a:lnTo>
+                    <a:pt x="15356" y="8638"/>
+                  </a:lnTo>
+                  <a:lnTo>
+                    <a:pt x="15356" y="0"/>
+                  </a:lnTo>
+                  <a:lnTo>
+                    <a:pt x="0" y="0"/>
+                  </a:lnTo>
+                  <a:close/>
+                  <a:moveTo>
+                    <a:pt x="14748" y="8038"/>
+                  </a:moveTo>
+                  <a:lnTo>
+                    <a:pt x="600" y="8038"/>
+                  </a:lnTo>
+                  <a:lnTo>
+                    <a:pt x="600" y="592"/>
+                  </a:lnTo>
+                  <a:lnTo>
+                    <a:pt x="14748" y="592"/>
+                  </a:lnTo>
+                  <a:lnTo>
+                    <a:pt x="14748" y="8038"/>
+                  </a:lnTo>
+                  <a:close/>
+                </a:path>
+              </a:pathLst>
+            </a:custGeom>
+            <a:solidFill>
+              <a:schemeClr val="bg1"/>
+            </a:solidFill>
+            <a:ln>
+              <a:noFill/>
+            </a:ln>
+          </p:spPr>
+        </p:sp>
+      </p:grpSp>
+      <p:sp>
+        <p:nvSpPr>
+          <p:cNvPr id="20" name="Rectangle 19">
+            <a:extLst>
+              <a:ext uri="{FF2B5EF4-FFF2-40B4-BE49-F238E27FC236}">
+                <a16:creationId xmlns:a16="http://schemas.microsoft.com/office/drawing/2014/main" id="{59647F54-801D-44AB-8284-EDDFF7763139}"/>
+              </a:ext>
+              <a:ext uri="{C183D7F6-B498-43B3-948B-1728B52AA6E4}">
+                <adec:decorative xmlns:adec="http://schemas.microsoft.com/office/drawing/2017/decorative" val="1"/>
+              </a:ext>
+            </a:extLst>
+          </p:cNvPr>
+          <p:cNvSpPr>
+            <a:spLocks noGrp="1" noRot="1" noChangeAspect="1" noMove="1" noResize="1" noEditPoints="1" noAdjustHandles="1" noChangeArrowheads="1" noChangeShapeType="1" noTextEdit="1"/>
+          </p:cNvSpPr>
+          <p:nvPr>
+            <p:extLst>
+              <p:ext uri="{386F3935-93C4-4BCD-93E2-E3B085C9AB24}">
+                <p16:designElem xmlns:p16="http://schemas.microsoft.com/office/powerpoint/2015/main" val="1"/>
+              </p:ext>
+            </p:extLst>
+          </p:nvPr>
+        </p:nvSpPr>
+        <p:spPr>
+          <a:xfrm>
+            <a:off x="10437812" y="0"/>
+            <a:ext cx="685800" cy="1143000"/>
+          </a:xfrm>
+          <a:prstGeom prst="rect">
+            <a:avLst/>
+          </a:prstGeom>
+          <a:solidFill>
+            <a:schemeClr val="accent1"/>
+          </a:solidFill>
+          <a:ln>
+            <a:noFill/>
+          </a:ln>
+        </p:spPr>
+        <p:style>
+          <a:lnRef idx="1">
+            <a:schemeClr val="accent1"/>
+          </a:lnRef>
+          <a:fillRef idx="3">
+            <a:schemeClr val="accent1"/>
+          </a:fillRef>
+          <a:effectRef idx="2">
+            <a:schemeClr val="accent1"/>
+          </a:effectRef>
+          <a:fontRef idx="minor">
+            <a:schemeClr val="lt1"/>
+          </a:fontRef>
+        </p:style>
+      </p:sp>
+      <p:sp>
+        <p:nvSpPr>
+          <p:cNvPr id="2" name="כותרת 1">
+            <a:extLst>
+              <a:ext uri="{FF2B5EF4-FFF2-40B4-BE49-F238E27FC236}">
+                <a16:creationId xmlns:a16="http://schemas.microsoft.com/office/drawing/2014/main" id="{5EF63109-57FF-4909-8FC9-A7AD1F49FC56}"/>
+              </a:ext>
+            </a:extLst>
+          </p:cNvPr>
+          <p:cNvSpPr>
+            <a:spLocks noGrp="1"/>
+          </p:cNvSpPr>
+          <p:nvPr>
+            <p:ph type="title"/>
+          </p:nvPr>
+        </p:nvSpPr>
+        <p:spPr>
+          <a:xfrm>
+            <a:off x="1154954" y="973668"/>
+            <a:ext cx="8761413" cy="706964"/>
+          </a:xfrm>
+        </p:spPr>
+        <p:txBody>
+          <a:bodyPr vert="horz" lIns="91440" tIns="45720" rIns="91440" bIns="45720" rtlCol="0" anchor="ctr">
+            <a:normAutofit/>
+          </a:bodyPr>
+          <a:lstStyle/>
+          <a:p>
+            <a:pPr rtl="0"/>
+            <a:r>
+              <a:rPr lang="en-US" dirty="0"/>
+              <a:t>Main things we did and challenges</a:t>
+            </a:r>
+            <a:endParaRPr lang="en-US"/>
+          </a:p>
+        </p:txBody>
+      </p:sp>
+      <p:sp>
+        <p:nvSpPr>
+          <p:cNvPr id="4" name="מציין מיקום תוכן 3">
+            <a:extLst>
+              <a:ext uri="{FF2B5EF4-FFF2-40B4-BE49-F238E27FC236}">
+                <a16:creationId xmlns:a16="http://schemas.microsoft.com/office/drawing/2014/main" id="{D1512E5A-B809-4F4B-A4ED-D899E7C8424A}"/>
+              </a:ext>
+            </a:extLst>
+          </p:cNvPr>
+          <p:cNvSpPr>
+            <a:spLocks noGrp="1"/>
+          </p:cNvSpPr>
+          <p:nvPr>
+            <p:ph sz="half" idx="2"/>
+          </p:nvPr>
+        </p:nvSpPr>
+        <p:spPr>
+          <a:xfrm>
+            <a:off x="240252" y="2368550"/>
+            <a:ext cx="4243896" cy="3416300"/>
+          </a:xfrm>
+        </p:spPr>
+        <p:txBody>
+          <a:bodyPr vert="horz" lIns="91440" tIns="45720" rIns="91440" bIns="45720" rtlCol="0" anchor="ctr">
+            <a:normAutofit/>
+          </a:bodyPr>
+          <a:lstStyle/>
+          <a:p>
+            <a:pPr algn="l" rtl="0"/>
+            <a:r>
+              <a:rPr lang="en-US" sz="1600" dirty="0"/>
+              <a:t>Classification of reviews (supervised model)</a:t>
+            </a:r>
+          </a:p>
+          <a:p>
+            <a:pPr lvl="1" algn="l" rtl="0"/>
+            <a:r>
+              <a:rPr lang="en-US" dirty="0"/>
+              <a:t>Using NN and GRU – Now running with 20 epochs and got the best results ever</a:t>
+            </a:r>
+          </a:p>
+          <a:p>
+            <a:pPr lvl="1" algn="l" rtl="0"/>
+            <a:endParaRPr lang="en-US" dirty="0"/>
+          </a:p>
+          <a:p>
+            <a:pPr lvl="1" algn="l" rtl="0"/>
+            <a:endParaRPr lang="en-US" dirty="0"/>
+          </a:p>
+        </p:txBody>
+      </p:sp>
+      <p:pic>
+        <p:nvPicPr>
+          <p:cNvPr id="7" name="תמונה 6">
+            <a:extLst>
+              <a:ext uri="{FF2B5EF4-FFF2-40B4-BE49-F238E27FC236}">
+                <a16:creationId xmlns:a16="http://schemas.microsoft.com/office/drawing/2014/main" id="{9035231D-D359-4A8F-9589-605E5BE25751}"/>
+              </a:ext>
+            </a:extLst>
+          </p:cNvPr>
+          <p:cNvPicPr>
+            <a:picLocks noChangeAspect="1"/>
+          </p:cNvPicPr>
+          <p:nvPr/>
+        </p:nvPicPr>
+        <p:blipFill>
+          <a:blip r:embed="rId3"/>
+          <a:stretch>
+            <a:fillRect/>
+          </a:stretch>
+        </p:blipFill>
+        <p:spPr>
+          <a:xfrm>
+            <a:off x="4359785" y="3053826"/>
+            <a:ext cx="7865549" cy="1302882"/>
+          </a:xfrm>
+          <a:prstGeom prst="rect">
+            <a:avLst/>
+          </a:prstGeom>
+        </p:spPr>
+      </p:pic>
+      <p:pic>
+        <p:nvPicPr>
+          <p:cNvPr id="8" name="תמונה 7">
+            <a:extLst>
+              <a:ext uri="{FF2B5EF4-FFF2-40B4-BE49-F238E27FC236}">
+                <a16:creationId xmlns:a16="http://schemas.microsoft.com/office/drawing/2014/main" id="{596CA20E-D829-43F8-82B5-BDEBB03030A0}"/>
+              </a:ext>
+            </a:extLst>
+          </p:cNvPr>
+          <p:cNvPicPr>
+            <a:picLocks noChangeAspect="1"/>
+          </p:cNvPicPr>
+          <p:nvPr/>
+        </p:nvPicPr>
+        <p:blipFill>
+          <a:blip r:embed="rId4"/>
+          <a:stretch>
+            <a:fillRect/>
+          </a:stretch>
+        </p:blipFill>
+        <p:spPr>
+          <a:xfrm>
+            <a:off x="724284" y="4479748"/>
+            <a:ext cx="9040699" cy="945646"/>
+          </a:xfrm>
+          <a:prstGeom prst="rect">
+            <a:avLst/>
+          </a:prstGeom>
+        </p:spPr>
+      </p:pic>
+      <p:pic>
+        <p:nvPicPr>
+          <p:cNvPr id="19" name="תמונה 18">
+            <a:extLst>
+              <a:ext uri="{FF2B5EF4-FFF2-40B4-BE49-F238E27FC236}">
+                <a16:creationId xmlns:a16="http://schemas.microsoft.com/office/drawing/2014/main" id="{15792B37-1B88-4FC3-81F1-053488EAB896}"/>
+              </a:ext>
+            </a:extLst>
+          </p:cNvPr>
+          <p:cNvPicPr>
+            <a:picLocks noChangeAspect="1"/>
+          </p:cNvPicPr>
+          <p:nvPr/>
+        </p:nvPicPr>
+        <p:blipFill>
+          <a:blip r:embed="rId5"/>
+          <a:stretch>
+            <a:fillRect/>
+          </a:stretch>
+        </p:blipFill>
+        <p:spPr>
+          <a:xfrm>
+            <a:off x="622570" y="5579349"/>
+            <a:ext cx="10048672" cy="865872"/>
+          </a:xfrm>
+          <a:prstGeom prst="rect">
+            <a:avLst/>
+          </a:prstGeom>
+        </p:spPr>
+      </p:pic>
+    </p:spTree>
+    <p:extLst>
+      <p:ext uri="{BB962C8B-B14F-4D97-AF65-F5344CB8AC3E}">
+        <p14:creationId xmlns:p14="http://schemas.microsoft.com/office/powerpoint/2010/main" val="650338589"/>
+      </p:ext>
+    </p:extLst>
+  </p:cSld>
+  <p:clrMapOvr>
+    <a:masterClrMapping/>
+  </p:clrMapOvr>
+</p:sld>
+</file>
+
+<file path=ppt/slides/slide19.xml><?xml version="1.0" encoding="utf-8"?>
+<p:sld xmlns:a="http://schemas.openxmlformats.org/drawingml/2006/main" xmlns:r="http://schemas.openxmlformats.org/officeDocument/2006/relationships" xmlns:p="http://schemas.openxmlformats.org/presentationml/2006/main">
+  <p:cSld>
     <p:spTree>
       <p:nvGrpSpPr>
         <p:cNvPr id="1" name=""/>
@@ -16234,167 +18597,6 @@
     <p:extLst>
       <p:ext uri="{BB962C8B-B14F-4D97-AF65-F5344CB8AC3E}">
         <p14:creationId xmlns:p14="http://schemas.microsoft.com/office/powerpoint/2010/main" val="970089619"/>
-      </p:ext>
-    </p:extLst>
-  </p:cSld>
-  <p:clrMapOvr>
-    <a:masterClrMapping/>
-  </p:clrMapOvr>
-</p:sld>
-</file>
-
-<file path=ppt/slides/slide18.xml><?xml version="1.0" encoding="utf-8"?>
-<p:sld xmlns:a="http://schemas.openxmlformats.org/drawingml/2006/main" xmlns:r="http://schemas.openxmlformats.org/officeDocument/2006/relationships" xmlns:p="http://schemas.openxmlformats.org/presentationml/2006/main">
-  <p:cSld>
-    <p:spTree>
-      <p:nvGrpSpPr>
-        <p:cNvPr id="1" name=""/>
-        <p:cNvGrpSpPr/>
-        <p:nvPr/>
-      </p:nvGrpSpPr>
-      <p:grpSpPr>
-        <a:xfrm>
-          <a:off x="0" y="0"/>
-          <a:ext cx="0" cy="0"/>
-          <a:chOff x="0" y="0"/>
-          <a:chExt cx="0" cy="0"/>
-        </a:xfrm>
-      </p:grpSpPr>
-      <p:sp>
-        <p:nvSpPr>
-          <p:cNvPr id="2" name="כותרת 1">
-            <a:extLst>
-              <a:ext uri="{FF2B5EF4-FFF2-40B4-BE49-F238E27FC236}">
-                <a16:creationId xmlns:a16="http://schemas.microsoft.com/office/drawing/2014/main" id="{5EF63109-57FF-4909-8FC9-A7AD1F49FC56}"/>
-              </a:ext>
-            </a:extLst>
-          </p:cNvPr>
-          <p:cNvSpPr>
-            <a:spLocks noGrp="1"/>
-          </p:cNvSpPr>
-          <p:nvPr>
-            <p:ph type="title"/>
-          </p:nvPr>
-        </p:nvSpPr>
-        <p:spPr/>
-        <p:txBody>
-          <a:bodyPr/>
-          <a:lstStyle/>
-          <a:p>
-            <a:r>
-              <a:rPr lang="en-US" dirty="0"/>
-              <a:t>Main things we did and challenges</a:t>
-            </a:r>
-            <a:endParaRPr lang="he-IL" dirty="0"/>
-          </a:p>
-        </p:txBody>
-      </p:sp>
-      <p:sp>
-        <p:nvSpPr>
-          <p:cNvPr id="4" name="מציין מיקום תוכן 3">
-            <a:extLst>
-              <a:ext uri="{FF2B5EF4-FFF2-40B4-BE49-F238E27FC236}">
-                <a16:creationId xmlns:a16="http://schemas.microsoft.com/office/drawing/2014/main" id="{D1512E5A-B809-4F4B-A4ED-D899E7C8424A}"/>
-              </a:ext>
-            </a:extLst>
-          </p:cNvPr>
-          <p:cNvSpPr>
-            <a:spLocks noGrp="1"/>
-          </p:cNvSpPr>
-          <p:nvPr>
-            <p:ph sz="half" idx="2"/>
-          </p:nvPr>
-        </p:nvSpPr>
-        <p:spPr>
-          <a:xfrm>
-            <a:off x="1154954" y="2603500"/>
-            <a:ext cx="9878917" cy="3416300"/>
-          </a:xfrm>
-        </p:spPr>
-        <p:txBody>
-          <a:bodyPr/>
-          <a:lstStyle/>
-          <a:p>
-            <a:pPr algn="l" rtl="0"/>
-            <a:r>
-              <a:rPr lang="en-US" dirty="0"/>
-              <a:t>Topic Modelling</a:t>
-            </a:r>
-          </a:p>
-          <a:p>
-            <a:pPr lvl="1" algn="l" rtl="0"/>
-            <a:r>
-              <a:rPr lang="en-US" dirty="0"/>
-              <a:t>We made a second try, dropping film, movie words.</a:t>
-            </a:r>
-          </a:p>
-          <a:p>
-            <a:pPr lvl="1" algn="l" rtl="0"/>
-            <a:r>
-              <a:rPr lang="en-US" dirty="0"/>
-              <a:t>Not good ,since there are also reviews on episodes etc. So maybe topic modelling will be one films and episodes etc.</a:t>
-            </a:r>
-          </a:p>
-          <a:p>
-            <a:pPr lvl="1" algn="l" rtl="0"/>
-            <a:r>
-              <a:rPr lang="en-US" dirty="0"/>
-              <a:t>So a third try (keep </a:t>
-            </a:r>
-            <a:r>
-              <a:rPr lang="en-US" dirty="0" err="1"/>
-              <a:t>orig</a:t>
-            </a:r>
-            <a:r>
-              <a:rPr lang="en-US" dirty="0"/>
-              <a:t> </a:t>
-            </a:r>
-            <a:r>
-              <a:rPr lang="en-US" dirty="0" err="1"/>
-              <a:t>stopwords</a:t>
-            </a:r>
-            <a:r>
-              <a:rPr lang="en-US" dirty="0"/>
-              <a:t>):</a:t>
-            </a:r>
-          </a:p>
-          <a:p>
-            <a:pPr lvl="2" algn="l" rtl="0"/>
-            <a:r>
-              <a:rPr lang="en-US" dirty="0"/>
-              <a:t>Make graph score as a </a:t>
-            </a:r>
-            <a:r>
-              <a:rPr lang="en-US"/>
-              <a:t>function of num </a:t>
-            </a:r>
-            <a:r>
-              <a:rPr lang="en-US" dirty="0"/>
-              <a:t>of topics </a:t>
-            </a:r>
-          </a:p>
-          <a:p>
-            <a:pPr lvl="1" algn="l" rtl="0"/>
-            <a:endParaRPr lang="en-US" dirty="0"/>
-          </a:p>
-          <a:p>
-            <a:pPr lvl="1" algn="l" rtl="0"/>
-            <a:endParaRPr lang="en-US" dirty="0"/>
-          </a:p>
-          <a:p>
-            <a:pPr lvl="1" algn="l" rtl="0"/>
-            <a:endParaRPr lang="en-US" dirty="0"/>
-          </a:p>
-          <a:p>
-            <a:pPr lvl="1" algn="l" rtl="0"/>
-            <a:endParaRPr lang="he-IL" dirty="0"/>
-          </a:p>
-        </p:txBody>
-      </p:sp>
-    </p:spTree>
-    <p:extLst>
-      <p:ext uri="{BB962C8B-B14F-4D97-AF65-F5344CB8AC3E}">
-        <p14:creationId xmlns:p14="http://schemas.microsoft.com/office/powerpoint/2010/main" val="1213935601"/>
       </p:ext>
     </p:extLst>
   </p:cSld>
@@ -16566,6 +18768,1926 @@
     <p:extLst>
       <p:ext uri="{BB962C8B-B14F-4D97-AF65-F5344CB8AC3E}">
         <p14:creationId xmlns:p14="http://schemas.microsoft.com/office/powerpoint/2010/main" val="2601649669"/>
+      </p:ext>
+    </p:extLst>
+  </p:cSld>
+  <p:clrMapOvr>
+    <a:masterClrMapping/>
+  </p:clrMapOvr>
+</p:sld>
+</file>
+
+<file path=ppt/slides/slide20.xml><?xml version="1.0" encoding="utf-8"?>
+<p:sld xmlns:a="http://schemas.openxmlformats.org/drawingml/2006/main" xmlns:r="http://schemas.openxmlformats.org/officeDocument/2006/relationships" xmlns:p="http://schemas.openxmlformats.org/presentationml/2006/main">
+  <p:cSld>
+    <p:spTree>
+      <p:nvGrpSpPr>
+        <p:cNvPr id="1" name=""/>
+        <p:cNvGrpSpPr/>
+        <p:nvPr/>
+      </p:nvGrpSpPr>
+      <p:grpSpPr>
+        <a:xfrm>
+          <a:off x="0" y="0"/>
+          <a:ext cx="0" cy="0"/>
+          <a:chOff x="0" y="0"/>
+          <a:chExt cx="0" cy="0"/>
+        </a:xfrm>
+      </p:grpSpPr>
+      <p:sp>
+        <p:nvSpPr>
+          <p:cNvPr id="2" name="כותרת 1">
+            <a:extLst>
+              <a:ext uri="{FF2B5EF4-FFF2-40B4-BE49-F238E27FC236}">
+                <a16:creationId xmlns:a16="http://schemas.microsoft.com/office/drawing/2014/main" id="{5EF63109-57FF-4909-8FC9-A7AD1F49FC56}"/>
+              </a:ext>
+            </a:extLst>
+          </p:cNvPr>
+          <p:cNvSpPr>
+            <a:spLocks noGrp="1"/>
+          </p:cNvSpPr>
+          <p:nvPr>
+            <p:ph type="title"/>
+          </p:nvPr>
+        </p:nvSpPr>
+        <p:spPr/>
+        <p:txBody>
+          <a:bodyPr/>
+          <a:lstStyle/>
+          <a:p>
+            <a:r>
+              <a:rPr lang="en-US" dirty="0"/>
+              <a:t>Main things we did and challenges</a:t>
+            </a:r>
+            <a:endParaRPr lang="he-IL" dirty="0"/>
+          </a:p>
+        </p:txBody>
+      </p:sp>
+      <p:sp>
+        <p:nvSpPr>
+          <p:cNvPr id="4" name="מציין מיקום תוכן 3">
+            <a:extLst>
+              <a:ext uri="{FF2B5EF4-FFF2-40B4-BE49-F238E27FC236}">
+                <a16:creationId xmlns:a16="http://schemas.microsoft.com/office/drawing/2014/main" id="{D1512E5A-B809-4F4B-A4ED-D899E7C8424A}"/>
+              </a:ext>
+            </a:extLst>
+          </p:cNvPr>
+          <p:cNvSpPr>
+            <a:spLocks noGrp="1"/>
+          </p:cNvSpPr>
+          <p:nvPr>
+            <p:ph sz="half" idx="2"/>
+          </p:nvPr>
+        </p:nvSpPr>
+        <p:spPr>
+          <a:xfrm>
+            <a:off x="1154954" y="2603500"/>
+            <a:ext cx="9878917" cy="3416300"/>
+          </a:xfrm>
+        </p:spPr>
+        <p:txBody>
+          <a:bodyPr/>
+          <a:lstStyle/>
+          <a:p>
+            <a:pPr algn="l" rtl="0"/>
+            <a:r>
+              <a:rPr lang="en-US" dirty="0"/>
+              <a:t>Topic Modelling</a:t>
+            </a:r>
+          </a:p>
+          <a:p>
+            <a:pPr lvl="1" algn="l" rtl="0"/>
+            <a:r>
+              <a:rPr lang="en-US" dirty="0"/>
+              <a:t>We made a second try, dropping film, movie words.</a:t>
+            </a:r>
+          </a:p>
+          <a:p>
+            <a:pPr lvl="1" algn="l" rtl="0"/>
+            <a:r>
+              <a:rPr lang="en-US" dirty="0"/>
+              <a:t>Not good ,since there are also reviews on episodes etc. So maybe topic modelling will be one films and episodes etc.</a:t>
+            </a:r>
+          </a:p>
+          <a:p>
+            <a:pPr lvl="1" algn="l" rtl="0"/>
+            <a:r>
+              <a:rPr lang="en-US" dirty="0"/>
+              <a:t>So a third try (keep </a:t>
+            </a:r>
+            <a:r>
+              <a:rPr lang="en-US" dirty="0" err="1"/>
+              <a:t>orig</a:t>
+            </a:r>
+            <a:r>
+              <a:rPr lang="en-US" dirty="0"/>
+              <a:t> </a:t>
+            </a:r>
+            <a:r>
+              <a:rPr lang="en-US" dirty="0" err="1"/>
+              <a:t>stopwords</a:t>
+            </a:r>
+            <a:r>
+              <a:rPr lang="en-US" dirty="0"/>
+              <a:t>):</a:t>
+            </a:r>
+          </a:p>
+          <a:p>
+            <a:pPr lvl="2" algn="l" rtl="0"/>
+            <a:r>
+              <a:rPr lang="en-US" dirty="0"/>
+              <a:t>Make graph score as a function of num of topics </a:t>
+            </a:r>
+          </a:p>
+          <a:p>
+            <a:pPr lvl="2" algn="l" rtl="0"/>
+            <a:r>
+              <a:rPr lang="en-US" dirty="0"/>
+              <a:t>The best score was for 14 topics</a:t>
+            </a:r>
+          </a:p>
+          <a:p>
+            <a:pPr lvl="2" algn="l" rtl="0"/>
+            <a:endParaRPr lang="en-US" dirty="0"/>
+          </a:p>
+          <a:p>
+            <a:pPr lvl="1" algn="l" rtl="0"/>
+            <a:endParaRPr lang="en-US" dirty="0"/>
+          </a:p>
+          <a:p>
+            <a:pPr lvl="1" algn="l" rtl="0"/>
+            <a:endParaRPr lang="en-US" dirty="0"/>
+          </a:p>
+          <a:p>
+            <a:pPr lvl="1" algn="l" rtl="0"/>
+            <a:endParaRPr lang="en-US" dirty="0"/>
+          </a:p>
+          <a:p>
+            <a:pPr lvl="1" algn="l" rtl="0"/>
+            <a:endParaRPr lang="he-IL" dirty="0"/>
+          </a:p>
+        </p:txBody>
+      </p:sp>
+      <p:pic>
+        <p:nvPicPr>
+          <p:cNvPr id="3" name="תמונה 2">
+            <a:extLst>
+              <a:ext uri="{FF2B5EF4-FFF2-40B4-BE49-F238E27FC236}">
+                <a16:creationId xmlns:a16="http://schemas.microsoft.com/office/drawing/2014/main" id="{D8057D21-AC11-4DF8-B284-7C4E26EEEDCC}"/>
+              </a:ext>
+            </a:extLst>
+          </p:cNvPr>
+          <p:cNvPicPr>
+            <a:picLocks noChangeAspect="1"/>
+          </p:cNvPicPr>
+          <p:nvPr/>
+        </p:nvPicPr>
+        <p:blipFill>
+          <a:blip r:embed="rId2"/>
+          <a:stretch>
+            <a:fillRect/>
+          </a:stretch>
+        </p:blipFill>
+        <p:spPr>
+          <a:xfrm>
+            <a:off x="6894828" y="4075890"/>
+            <a:ext cx="3670470" cy="2453740"/>
+          </a:xfrm>
+          <a:prstGeom prst="rect">
+            <a:avLst/>
+          </a:prstGeom>
+        </p:spPr>
+      </p:pic>
+    </p:spTree>
+    <p:extLst>
+      <p:ext uri="{BB962C8B-B14F-4D97-AF65-F5344CB8AC3E}">
+        <p14:creationId xmlns:p14="http://schemas.microsoft.com/office/powerpoint/2010/main" val="1213935601"/>
+      </p:ext>
+    </p:extLst>
+  </p:cSld>
+  <p:clrMapOvr>
+    <a:masterClrMapping/>
+  </p:clrMapOvr>
+</p:sld>
+</file>
+
+<file path=ppt/slides/slide21.xml><?xml version="1.0" encoding="utf-8"?>
+<p:sld xmlns:a="http://schemas.openxmlformats.org/drawingml/2006/main" xmlns:r="http://schemas.openxmlformats.org/officeDocument/2006/relationships" xmlns:p="http://schemas.openxmlformats.org/presentationml/2006/main">
+  <p:cSld>
+    <p:spTree>
+      <p:nvGrpSpPr>
+        <p:cNvPr id="1" name=""/>
+        <p:cNvGrpSpPr/>
+        <p:nvPr/>
+      </p:nvGrpSpPr>
+      <p:grpSpPr>
+        <a:xfrm>
+          <a:off x="0" y="0"/>
+          <a:ext cx="0" cy="0"/>
+          <a:chOff x="0" y="0"/>
+          <a:chExt cx="0" cy="0"/>
+        </a:xfrm>
+      </p:grpSpPr>
+      <p:sp>
+        <p:nvSpPr>
+          <p:cNvPr id="2" name="כותרת 1">
+            <a:extLst>
+              <a:ext uri="{FF2B5EF4-FFF2-40B4-BE49-F238E27FC236}">
+                <a16:creationId xmlns:a16="http://schemas.microsoft.com/office/drawing/2014/main" id="{5EF63109-57FF-4909-8FC9-A7AD1F49FC56}"/>
+              </a:ext>
+            </a:extLst>
+          </p:cNvPr>
+          <p:cNvSpPr>
+            <a:spLocks noGrp="1"/>
+          </p:cNvSpPr>
+          <p:nvPr>
+            <p:ph type="title"/>
+          </p:nvPr>
+        </p:nvSpPr>
+        <p:spPr/>
+        <p:txBody>
+          <a:bodyPr/>
+          <a:lstStyle/>
+          <a:p>
+            <a:r>
+              <a:rPr lang="en-US" dirty="0"/>
+              <a:t>Main things we did and challenges</a:t>
+            </a:r>
+            <a:endParaRPr lang="he-IL" dirty="0"/>
+          </a:p>
+        </p:txBody>
+      </p:sp>
+      <p:sp>
+        <p:nvSpPr>
+          <p:cNvPr id="5" name="תיבת טקסט 4">
+            <a:extLst>
+              <a:ext uri="{FF2B5EF4-FFF2-40B4-BE49-F238E27FC236}">
+                <a16:creationId xmlns:a16="http://schemas.microsoft.com/office/drawing/2014/main" id="{AE5C6F31-EAF3-4D40-9BA1-73A78595F7B6}"/>
+              </a:ext>
+            </a:extLst>
+          </p:cNvPr>
+          <p:cNvSpPr txBox="1"/>
+          <p:nvPr/>
+        </p:nvSpPr>
+        <p:spPr>
+          <a:xfrm>
+            <a:off x="564204" y="3127443"/>
+            <a:ext cx="3083668" cy="2123658"/>
+          </a:xfrm>
+          <a:prstGeom prst="rect">
+            <a:avLst/>
+          </a:prstGeom>
+          <a:noFill/>
+        </p:spPr>
+        <p:txBody>
+          <a:bodyPr wrap="square" rtlCol="1">
+            <a:spAutoFit/>
+          </a:bodyPr>
+          <a:lstStyle/>
+          <a:p>
+            <a:r>
+              <a:rPr lang="en-US" sz="1200" dirty="0"/>
+              <a:t>(1,</a:t>
+            </a:r>
+          </a:p>
+          <a:p>
+            <a:r>
+              <a:rPr lang="en-US" sz="1200" dirty="0"/>
+              <a:t>  [('great', 0.04810005310895667),</a:t>
+            </a:r>
+          </a:p>
+          <a:p>
+            <a:r>
+              <a:rPr lang="en-US" sz="1200" dirty="0"/>
+              <a:t>   ('music', 0.03004300784138125),</a:t>
+            </a:r>
+          </a:p>
+          <a:p>
+            <a:r>
+              <a:rPr lang="en-US" sz="1200" dirty="0"/>
+              <a:t>   ('version', 0.023013881223380436),</a:t>
+            </a:r>
+          </a:p>
+          <a:p>
+            <a:r>
+              <a:rPr lang="en-US" sz="1200" dirty="0"/>
+              <a:t>   ('good', 0.016536671213904133),</a:t>
+            </a:r>
+          </a:p>
+          <a:p>
+            <a:r>
+              <a:rPr lang="en-US" sz="1200" dirty="0"/>
+              <a:t>   ('time', 0.016255506149184102),</a:t>
+            </a:r>
+          </a:p>
+          <a:p>
+            <a:r>
+              <a:rPr lang="en-US" sz="1200" dirty="0"/>
+              <a:t>   ('star', 0.01500588363931729),</a:t>
+            </a:r>
+          </a:p>
+          <a:p>
+            <a:r>
+              <a:rPr lang="en-US" sz="1200" dirty="0"/>
+              <a:t>   ('wonderful', 0.014985056597486175),</a:t>
+            </a:r>
+          </a:p>
+          <a:p>
+            <a:r>
+              <a:rPr lang="en-US" sz="1200" dirty="0"/>
+              <a:t>   ('year', 0.014943402513823948),</a:t>
+            </a:r>
+          </a:p>
+          <a:p>
+            <a:r>
+              <a:rPr lang="en-US" sz="1200" dirty="0"/>
+              <a:t>   ('number', 0.014370658863468328),</a:t>
+            </a:r>
+          </a:p>
+          <a:p>
+            <a:r>
+              <a:rPr lang="en-US" sz="1200" dirty="0"/>
+              <a:t>   ('song', 0.014027012673254954)]),</a:t>
+            </a:r>
+            <a:endParaRPr lang="he-IL" sz="1200" dirty="0"/>
+          </a:p>
+        </p:txBody>
+      </p:sp>
+      <p:sp>
+        <p:nvSpPr>
+          <p:cNvPr id="6" name="תיבת טקסט 5">
+            <a:extLst>
+              <a:ext uri="{FF2B5EF4-FFF2-40B4-BE49-F238E27FC236}">
+                <a16:creationId xmlns:a16="http://schemas.microsoft.com/office/drawing/2014/main" id="{874C4DFE-26A2-436B-BE51-9F1BB546B538}"/>
+              </a:ext>
+            </a:extLst>
+          </p:cNvPr>
+          <p:cNvSpPr txBox="1"/>
+          <p:nvPr/>
+        </p:nvSpPr>
+        <p:spPr>
+          <a:xfrm>
+            <a:off x="3570673" y="3218663"/>
+            <a:ext cx="3083668" cy="2123658"/>
+          </a:xfrm>
+          <a:prstGeom prst="rect">
+            <a:avLst/>
+          </a:prstGeom>
+          <a:noFill/>
+        </p:spPr>
+        <p:txBody>
+          <a:bodyPr wrap="square" rtlCol="1">
+            <a:spAutoFit/>
+          </a:bodyPr>
+          <a:lstStyle/>
+          <a:p>
+            <a:r>
+              <a:rPr lang="en-US" sz="1200" dirty="0"/>
+              <a:t> (6,</a:t>
+            </a:r>
+          </a:p>
+          <a:p>
+            <a:r>
+              <a:rPr lang="en-US" sz="1200" dirty="0"/>
+              <a:t>  [('scene', 0.03321999723249056),</a:t>
+            </a:r>
+          </a:p>
+          <a:p>
+            <a:r>
+              <a:rPr lang="en-US" sz="1200" dirty="0"/>
+              <a:t>   ('guy', 0.02616284816257141),</a:t>
+            </a:r>
+          </a:p>
+          <a:p>
+            <a:r>
+              <a:rPr lang="en-US" sz="1200" dirty="0"/>
+              <a:t>   ('woman', 0.017721944373060274),</a:t>
+            </a:r>
+          </a:p>
+          <a:p>
+            <a:r>
+              <a:rPr lang="en-US" sz="1200" dirty="0"/>
+              <a:t>   ('sex', 0.015537588708561489),</a:t>
+            </a:r>
+          </a:p>
+          <a:p>
+            <a:r>
+              <a:rPr lang="en-US" sz="1200" dirty="0"/>
+              <a:t>   ('girl', 0.014648032103109495),</a:t>
+            </a:r>
+          </a:p>
+          <a:p>
+            <a:r>
+              <a:rPr lang="en-US" sz="1200" dirty="0"/>
+              <a:t>   ('death', 0.014262557574080298),</a:t>
+            </a:r>
+          </a:p>
+          <a:p>
+            <a:r>
+              <a:rPr lang="en-US" sz="1200" dirty="0"/>
+              <a:t>   ('car', 0.014203253800383498),</a:t>
+            </a:r>
+          </a:p>
+          <a:p>
+            <a:r>
+              <a:rPr lang="en-US" sz="1200" dirty="0"/>
+              <a:t>   ('killer', 0.014203253800383498),</a:t>
+            </a:r>
+          </a:p>
+          <a:p>
+            <a:r>
+              <a:rPr lang="en-US" sz="1200" dirty="0"/>
+              <a:t>   ('night', 0.01233518492893431),</a:t>
+            </a:r>
+          </a:p>
+          <a:p>
+            <a:r>
+              <a:rPr lang="en-US" sz="1200" dirty="0"/>
+              <a:t>   ('head', 0.011840986814794315)]),</a:t>
+            </a:r>
+            <a:endParaRPr lang="he-IL" sz="1200" dirty="0"/>
+          </a:p>
+        </p:txBody>
+      </p:sp>
+      <p:sp>
+        <p:nvSpPr>
+          <p:cNvPr id="7" name="תיבת טקסט 6">
+            <a:extLst>
+              <a:ext uri="{FF2B5EF4-FFF2-40B4-BE49-F238E27FC236}">
+                <a16:creationId xmlns:a16="http://schemas.microsoft.com/office/drawing/2014/main" id="{3098E3FB-137C-41BD-87C7-3DACA83415EA}"/>
+              </a:ext>
+            </a:extLst>
+          </p:cNvPr>
+          <p:cNvSpPr txBox="1"/>
+          <p:nvPr/>
+        </p:nvSpPr>
+        <p:spPr>
+          <a:xfrm>
+            <a:off x="6654341" y="3249821"/>
+            <a:ext cx="3083668" cy="2123658"/>
+          </a:xfrm>
+          <a:prstGeom prst="rect">
+            <a:avLst/>
+          </a:prstGeom>
+          <a:noFill/>
+        </p:spPr>
+        <p:txBody>
+          <a:bodyPr wrap="square" rtlCol="1">
+            <a:spAutoFit/>
+          </a:bodyPr>
+          <a:lstStyle/>
+          <a:p>
+            <a:r>
+              <a:rPr lang="en-US" sz="1200" dirty="0"/>
+              <a:t> (11,</a:t>
+            </a:r>
+          </a:p>
+          <a:p>
+            <a:r>
+              <a:rPr lang="en-US" sz="1200" dirty="0"/>
+              <a:t>  [('scene', 0.05976507172447578),</a:t>
+            </a:r>
+          </a:p>
+          <a:p>
+            <a:r>
+              <a:rPr lang="en-US" sz="1200" dirty="0"/>
+              <a:t>   ('action', 0.037007060627682345),</a:t>
+            </a:r>
+          </a:p>
+          <a:p>
+            <a:r>
+              <a:rPr lang="en-US" sz="1200" dirty="0"/>
+              <a:t>   ('black', 0.01966965208038253),</a:t>
+            </a:r>
+          </a:p>
+          <a:p>
+            <a:r>
+              <a:rPr lang="en-US" sz="1200" dirty="0"/>
+              <a:t>   ('art', 0.015101010638864336),</a:t>
+            </a:r>
+          </a:p>
+          <a:p>
+            <a:r>
+              <a:rPr lang="en-US" sz="1200" dirty="0"/>
+              <a:t>   ('sequence', 0.014131904878542295),</a:t>
+            </a:r>
+          </a:p>
+          <a:p>
+            <a:r>
+              <a:rPr lang="en-US" sz="1200" dirty="0"/>
+              <a:t>   ('hero', 0.011810310859309272),</a:t>
+            </a:r>
+          </a:p>
+          <a:p>
+            <a:r>
+              <a:rPr lang="en-US" sz="1200" dirty="0"/>
+              <a:t>   ('style', 0.011597320582315418),</a:t>
+            </a:r>
+          </a:p>
+          <a:p>
+            <a:r>
+              <a:rPr lang="en-US" sz="1200" dirty="0"/>
+              <a:t>   ('time', 0.009861449824815497),</a:t>
+            </a:r>
+          </a:p>
+          <a:p>
+            <a:r>
+              <a:rPr lang="en-US" sz="1200" dirty="0"/>
+              <a:t>   ('point', 0.009776253714017955),</a:t>
+            </a:r>
+          </a:p>
+          <a:p>
+            <a:r>
+              <a:rPr lang="en-US" sz="1200" dirty="0"/>
+              <a:t>   ('slow', 0.009765604200168263)]),</a:t>
+            </a:r>
+            <a:endParaRPr lang="he-IL" sz="1200" dirty="0"/>
+          </a:p>
+        </p:txBody>
+      </p:sp>
+      <p:sp>
+        <p:nvSpPr>
+          <p:cNvPr id="8" name="תיבת טקסט 7">
+            <a:extLst>
+              <a:ext uri="{FF2B5EF4-FFF2-40B4-BE49-F238E27FC236}">
+                <a16:creationId xmlns:a16="http://schemas.microsoft.com/office/drawing/2014/main" id="{0ABAD80F-F3E8-4ED2-AC1B-502D5FFE920F}"/>
+              </a:ext>
+            </a:extLst>
+          </p:cNvPr>
+          <p:cNvSpPr txBox="1"/>
+          <p:nvPr/>
+        </p:nvSpPr>
+        <p:spPr>
+          <a:xfrm>
+            <a:off x="1031133" y="5612860"/>
+            <a:ext cx="1099224" cy="369332"/>
+          </a:xfrm>
+          <a:prstGeom prst="rect">
+            <a:avLst/>
+          </a:prstGeom>
+          <a:noFill/>
+        </p:spPr>
+        <p:txBody>
+          <a:bodyPr wrap="square" rtlCol="1">
+            <a:spAutoFit/>
+          </a:bodyPr>
+          <a:lstStyle/>
+          <a:p>
+            <a:r>
+              <a:rPr lang="en-US" dirty="0"/>
+              <a:t>Musical</a:t>
+            </a:r>
+            <a:endParaRPr lang="he-IL" dirty="0"/>
+          </a:p>
+        </p:txBody>
+      </p:sp>
+      <p:sp>
+        <p:nvSpPr>
+          <p:cNvPr id="9" name="תיבת טקסט 8">
+            <a:extLst>
+              <a:ext uri="{FF2B5EF4-FFF2-40B4-BE49-F238E27FC236}">
+                <a16:creationId xmlns:a16="http://schemas.microsoft.com/office/drawing/2014/main" id="{7C83F2A0-728A-4111-8726-8414BAB4973E}"/>
+              </a:ext>
+            </a:extLst>
+          </p:cNvPr>
+          <p:cNvSpPr txBox="1"/>
+          <p:nvPr/>
+        </p:nvSpPr>
+        <p:spPr>
+          <a:xfrm>
+            <a:off x="3839183" y="5599890"/>
+            <a:ext cx="2065506" cy="369332"/>
+          </a:xfrm>
+          <a:prstGeom prst="rect">
+            <a:avLst/>
+          </a:prstGeom>
+          <a:noFill/>
+        </p:spPr>
+        <p:txBody>
+          <a:bodyPr wrap="square" rtlCol="1">
+            <a:spAutoFit/>
+          </a:bodyPr>
+          <a:lstStyle/>
+          <a:p>
+            <a:r>
+              <a:rPr lang="en-US" dirty="0"/>
+              <a:t>Death and killing</a:t>
+            </a:r>
+            <a:endParaRPr lang="he-IL" dirty="0"/>
+          </a:p>
+        </p:txBody>
+      </p:sp>
+      <p:sp>
+        <p:nvSpPr>
+          <p:cNvPr id="10" name="תיבת טקסט 9">
+            <a:extLst>
+              <a:ext uri="{FF2B5EF4-FFF2-40B4-BE49-F238E27FC236}">
+                <a16:creationId xmlns:a16="http://schemas.microsoft.com/office/drawing/2014/main" id="{11339AA5-FBCB-4D3C-9E90-68B1219C379C}"/>
+              </a:ext>
+            </a:extLst>
+          </p:cNvPr>
+          <p:cNvSpPr txBox="1"/>
+          <p:nvPr/>
+        </p:nvSpPr>
+        <p:spPr>
+          <a:xfrm>
+            <a:off x="6987703" y="5606376"/>
+            <a:ext cx="2065506" cy="369332"/>
+          </a:xfrm>
+          <a:prstGeom prst="rect">
+            <a:avLst/>
+          </a:prstGeom>
+          <a:noFill/>
+        </p:spPr>
+        <p:txBody>
+          <a:bodyPr wrap="square" rtlCol="1">
+            <a:spAutoFit/>
+          </a:bodyPr>
+          <a:lstStyle/>
+          <a:p>
+            <a:r>
+              <a:rPr lang="en-US" dirty="0"/>
+              <a:t>Action</a:t>
+            </a:r>
+            <a:endParaRPr lang="he-IL" dirty="0"/>
+          </a:p>
+        </p:txBody>
+      </p:sp>
+    </p:spTree>
+    <p:extLst>
+      <p:ext uri="{BB962C8B-B14F-4D97-AF65-F5344CB8AC3E}">
+        <p14:creationId xmlns:p14="http://schemas.microsoft.com/office/powerpoint/2010/main" val="436364225"/>
+      </p:ext>
+    </p:extLst>
+  </p:cSld>
+  <p:clrMapOvr>
+    <a:masterClrMapping/>
+  </p:clrMapOvr>
+</p:sld>
+</file>
+
+<file path=ppt/slides/slide22.xml><?xml version="1.0" encoding="utf-8"?>
+<p:sld xmlns:a="http://schemas.openxmlformats.org/drawingml/2006/main" xmlns:r="http://schemas.openxmlformats.org/officeDocument/2006/relationships" xmlns:p="http://schemas.openxmlformats.org/presentationml/2006/main">
+  <p:cSld>
+    <p:spTree>
+      <p:nvGrpSpPr>
+        <p:cNvPr id="1" name=""/>
+        <p:cNvGrpSpPr/>
+        <p:nvPr/>
+      </p:nvGrpSpPr>
+      <p:grpSpPr>
+        <a:xfrm>
+          <a:off x="0" y="0"/>
+          <a:ext cx="0" cy="0"/>
+          <a:chOff x="0" y="0"/>
+          <a:chExt cx="0" cy="0"/>
+        </a:xfrm>
+      </p:grpSpPr>
+      <p:sp>
+        <p:nvSpPr>
+          <p:cNvPr id="2" name="כותרת 1">
+            <a:extLst>
+              <a:ext uri="{FF2B5EF4-FFF2-40B4-BE49-F238E27FC236}">
+                <a16:creationId xmlns:a16="http://schemas.microsoft.com/office/drawing/2014/main" id="{5EF63109-57FF-4909-8FC9-A7AD1F49FC56}"/>
+              </a:ext>
+            </a:extLst>
+          </p:cNvPr>
+          <p:cNvSpPr>
+            <a:spLocks noGrp="1"/>
+          </p:cNvSpPr>
+          <p:nvPr>
+            <p:ph type="title"/>
+          </p:nvPr>
+        </p:nvSpPr>
+        <p:spPr/>
+        <p:txBody>
+          <a:bodyPr/>
+          <a:lstStyle/>
+          <a:p>
+            <a:r>
+              <a:rPr lang="en-US" dirty="0"/>
+              <a:t>Main things we did and challenges</a:t>
+            </a:r>
+            <a:endParaRPr lang="he-IL" dirty="0"/>
+          </a:p>
+        </p:txBody>
+      </p:sp>
+      <p:sp>
+        <p:nvSpPr>
+          <p:cNvPr id="4" name="מציין מיקום תוכן 3">
+            <a:extLst>
+              <a:ext uri="{FF2B5EF4-FFF2-40B4-BE49-F238E27FC236}">
+                <a16:creationId xmlns:a16="http://schemas.microsoft.com/office/drawing/2014/main" id="{D1512E5A-B809-4F4B-A4ED-D899E7C8424A}"/>
+              </a:ext>
+            </a:extLst>
+          </p:cNvPr>
+          <p:cNvSpPr>
+            <a:spLocks noGrp="1"/>
+          </p:cNvSpPr>
+          <p:nvPr>
+            <p:ph sz="half" idx="2"/>
+          </p:nvPr>
+        </p:nvSpPr>
+        <p:spPr>
+          <a:xfrm>
+            <a:off x="1154954" y="2603500"/>
+            <a:ext cx="9878917" cy="3416300"/>
+          </a:xfrm>
+        </p:spPr>
+        <p:txBody>
+          <a:bodyPr/>
+          <a:lstStyle/>
+          <a:p>
+            <a:pPr algn="l" rtl="0"/>
+            <a:r>
+              <a:rPr lang="en-US" dirty="0"/>
+              <a:t>Topic Modelling – getting 14 topics</a:t>
+            </a:r>
+          </a:p>
+          <a:p>
+            <a:pPr lvl="1" algn="l" rtl="0"/>
+            <a:endParaRPr lang="en-US" dirty="0"/>
+          </a:p>
+          <a:p>
+            <a:pPr lvl="1" algn="l" rtl="0"/>
+            <a:endParaRPr lang="en-US" dirty="0"/>
+          </a:p>
+          <a:p>
+            <a:pPr lvl="1" algn="l" rtl="0"/>
+            <a:endParaRPr lang="en-US" dirty="0"/>
+          </a:p>
+          <a:p>
+            <a:pPr lvl="1" algn="l" rtl="0"/>
+            <a:endParaRPr lang="en-US" dirty="0"/>
+          </a:p>
+          <a:p>
+            <a:pPr lvl="1" algn="l" rtl="0"/>
+            <a:endParaRPr lang="he-IL" dirty="0"/>
+          </a:p>
+        </p:txBody>
+      </p:sp>
+      <p:sp>
+        <p:nvSpPr>
+          <p:cNvPr id="5" name="תיבת טקסט 4">
+            <a:extLst>
+              <a:ext uri="{FF2B5EF4-FFF2-40B4-BE49-F238E27FC236}">
+                <a16:creationId xmlns:a16="http://schemas.microsoft.com/office/drawing/2014/main" id="{AE5C6F31-EAF3-4D40-9BA1-73A78595F7B6}"/>
+              </a:ext>
+            </a:extLst>
+          </p:cNvPr>
+          <p:cNvSpPr txBox="1"/>
+          <p:nvPr/>
+        </p:nvSpPr>
+        <p:spPr>
+          <a:xfrm>
+            <a:off x="564204" y="3127443"/>
+            <a:ext cx="3083668" cy="2123658"/>
+          </a:xfrm>
+          <a:prstGeom prst="rect">
+            <a:avLst/>
+          </a:prstGeom>
+          <a:noFill/>
+        </p:spPr>
+        <p:txBody>
+          <a:bodyPr wrap="square" rtlCol="1">
+            <a:spAutoFit/>
+          </a:bodyPr>
+          <a:lstStyle/>
+          <a:p>
+            <a:r>
+              <a:rPr lang="en-US" sz="1200" dirty="0"/>
+              <a:t> (8,</a:t>
+            </a:r>
+          </a:p>
+          <a:p>
+            <a:r>
+              <a:rPr lang="en-US" sz="1200" dirty="0"/>
+              <a:t>  [('film', 0.4150432678505516),</a:t>
+            </a:r>
+          </a:p>
+          <a:p>
+            <a:r>
+              <a:rPr lang="en-US" sz="1200" dirty="0"/>
+              <a:t>   ('director', 0.03753639831029816),</a:t>
+            </a:r>
+          </a:p>
+          <a:p>
+            <a:r>
+              <a:rPr lang="en-US" sz="1200" dirty="0"/>
+              <a:t>   ('camera', 0.01416970840339581),</a:t>
+            </a:r>
+          </a:p>
+          <a:p>
+            <a:r>
+              <a:rPr lang="en-US" sz="1200" dirty="0"/>
+              <a:t>   ('work', 0.013298199565270886),</a:t>
+            </a:r>
+          </a:p>
+          <a:p>
+            <a:r>
+              <a:rPr lang="en-US" sz="1200" dirty="0"/>
+              <a:t>   ('minute', 0.011114300947381372),</a:t>
+            </a:r>
+          </a:p>
+          <a:p>
+            <a:r>
+              <a:rPr lang="en-US" sz="1200" dirty="0"/>
+              <a:t>   ('audience', 0.010601648689660828),</a:t>
+            </a:r>
+          </a:p>
+          <a:p>
+            <a:r>
+              <a:rPr lang="en-US" sz="1200" dirty="0"/>
+              <a:t>   ('shot', 0.009904441619160891),</a:t>
+            </a:r>
+          </a:p>
+          <a:p>
+            <a:r>
+              <a:rPr lang="en-US" sz="1200" dirty="0"/>
+              <a:t>   ('scene', 0.00964811549030062),</a:t>
+            </a:r>
+          </a:p>
+          <a:p>
+            <a:r>
+              <a:rPr lang="en-US" sz="1200" dirty="0"/>
+              <a:t>   ('time', 0.009217487593815363),</a:t>
+            </a:r>
+          </a:p>
+          <a:p>
+            <a:r>
+              <a:rPr lang="en-US" sz="1200" dirty="0"/>
+              <a:t>   ('cinema', 0.008551039658778656)]),</a:t>
+            </a:r>
+            <a:endParaRPr lang="he-IL" sz="1200" dirty="0"/>
+          </a:p>
+        </p:txBody>
+      </p:sp>
+      <p:sp>
+        <p:nvSpPr>
+          <p:cNvPr id="6" name="תיבת טקסט 5">
+            <a:extLst>
+              <a:ext uri="{FF2B5EF4-FFF2-40B4-BE49-F238E27FC236}">
+                <a16:creationId xmlns:a16="http://schemas.microsoft.com/office/drawing/2014/main" id="{874C4DFE-26A2-436B-BE51-9F1BB546B538}"/>
+              </a:ext>
+            </a:extLst>
+          </p:cNvPr>
+          <p:cNvSpPr txBox="1"/>
+          <p:nvPr/>
+        </p:nvSpPr>
+        <p:spPr>
+          <a:xfrm>
+            <a:off x="3570673" y="3218663"/>
+            <a:ext cx="3083668" cy="2123658"/>
+          </a:xfrm>
+          <a:prstGeom prst="rect">
+            <a:avLst/>
+          </a:prstGeom>
+          <a:noFill/>
+        </p:spPr>
+        <p:txBody>
+          <a:bodyPr wrap="square" rtlCol="1">
+            <a:spAutoFit/>
+          </a:bodyPr>
+          <a:lstStyle/>
+          <a:p>
+            <a:r>
+              <a:rPr lang="en-US" sz="1200" dirty="0"/>
+              <a:t> (5,</a:t>
+            </a:r>
+          </a:p>
+          <a:p>
+            <a:r>
+              <a:rPr lang="en-US" sz="1200" dirty="0"/>
+              <a:t>  [('bad', 0.09762325867927903),</a:t>
+            </a:r>
+          </a:p>
+          <a:p>
+            <a:r>
+              <a:rPr lang="en-US" sz="1200" dirty="0"/>
+              <a:t>   ('horror', 0.030106714890403608),</a:t>
+            </a:r>
+          </a:p>
+          <a:p>
+            <a:r>
+              <a:rPr lang="en-US" sz="1200" dirty="0"/>
+              <a:t>   ('effect', 0.027473619363685142),</a:t>
+            </a:r>
+          </a:p>
+          <a:p>
+            <a:r>
+              <a:rPr lang="en-US" sz="1200" dirty="0"/>
+              <a:t>   ('low', 0.019504779316786233),</a:t>
+            </a:r>
+          </a:p>
+          <a:p>
+            <a:r>
+              <a:rPr lang="en-US" sz="1200" dirty="0"/>
+              <a:t>   ('plot', 0.018848989487490312),</a:t>
+            </a:r>
+          </a:p>
+          <a:p>
+            <a:r>
+              <a:rPr lang="en-US" sz="1200" dirty="0"/>
+              <a:t>   ('budget', 0.01745792015262018),</a:t>
+            </a:r>
+          </a:p>
+          <a:p>
+            <a:r>
+              <a:rPr lang="en-US" sz="1200" dirty="0"/>
+              <a:t>   ('awful', 0.01646429919914151),</a:t>
+            </a:r>
+          </a:p>
+          <a:p>
+            <a:r>
+              <a:rPr lang="en-US" sz="1200" dirty="0"/>
+              <a:t>   ('special', 0.016394745732398006),</a:t>
+            </a:r>
+          </a:p>
+          <a:p>
+            <a:r>
+              <a:rPr lang="en-US" sz="1200" dirty="0"/>
+              <a:t>   ('terrible', 0.014755271159158204),</a:t>
+            </a:r>
+          </a:p>
+          <a:p>
+            <a:r>
+              <a:rPr lang="en-US" sz="1200" dirty="0"/>
+              <a:t>   ('stupid', 0.013384074243357644)]),</a:t>
+            </a:r>
+            <a:endParaRPr lang="he-IL" sz="1200" dirty="0"/>
+          </a:p>
+        </p:txBody>
+      </p:sp>
+      <p:sp>
+        <p:nvSpPr>
+          <p:cNvPr id="7" name="תיבת טקסט 6">
+            <a:extLst>
+              <a:ext uri="{FF2B5EF4-FFF2-40B4-BE49-F238E27FC236}">
+                <a16:creationId xmlns:a16="http://schemas.microsoft.com/office/drawing/2014/main" id="{3098E3FB-137C-41BD-87C7-3DACA83415EA}"/>
+              </a:ext>
+            </a:extLst>
+          </p:cNvPr>
+          <p:cNvSpPr txBox="1"/>
+          <p:nvPr/>
+        </p:nvSpPr>
+        <p:spPr>
+          <a:xfrm>
+            <a:off x="6654341" y="3249821"/>
+            <a:ext cx="3083668" cy="2123658"/>
+          </a:xfrm>
+          <a:prstGeom prst="rect">
+            <a:avLst/>
+          </a:prstGeom>
+          <a:noFill/>
+        </p:spPr>
+        <p:txBody>
+          <a:bodyPr wrap="square" rtlCol="1">
+            <a:spAutoFit/>
+          </a:bodyPr>
+          <a:lstStyle/>
+          <a:p>
+            <a:r>
+              <a:rPr lang="en-US" sz="1200" dirty="0"/>
+              <a:t> (3,</a:t>
+            </a:r>
+          </a:p>
+          <a:p>
+            <a:r>
+              <a:rPr lang="en-US" sz="1200" dirty="0"/>
+              <a:t>  [('life', 0.043484419263456094),</a:t>
+            </a:r>
+          </a:p>
+          <a:p>
+            <a:r>
+              <a:rPr lang="en-US" sz="1200" dirty="0"/>
+              <a:t>   ('young', 0.04026709834075273),</a:t>
+            </a:r>
+          </a:p>
+          <a:p>
+            <a:r>
+              <a:rPr lang="en-US" sz="1200" dirty="0"/>
+              <a:t>   ('family', 0.033903278025091056),</a:t>
+            </a:r>
+          </a:p>
+          <a:p>
+            <a:r>
+              <a:rPr lang="en-US" sz="1200" dirty="0"/>
+              <a:t>   ('friend', 0.027974504249291786),</a:t>
+            </a:r>
+          </a:p>
+          <a:p>
+            <a:r>
+              <a:rPr lang="en-US" sz="1200" dirty="0"/>
+              <a:t>   ('child', 0.027610279239174425),</a:t>
+            </a:r>
+          </a:p>
+          <a:p>
+            <a:r>
+              <a:rPr lang="en-US" sz="1200" dirty="0"/>
+              <a:t>   ('woman', 0.027013354917037637),</a:t>
+            </a:r>
+          </a:p>
+          <a:p>
+            <a:r>
+              <a:rPr lang="en-US" sz="1200" dirty="0"/>
+              <a:t>   ('love', 0.026375961149332255),</a:t>
+            </a:r>
+          </a:p>
+          <a:p>
+            <a:r>
+              <a:rPr lang="en-US" sz="1200" dirty="0"/>
+              <a:t>   ('kid', 0.026345609065155807),</a:t>
+            </a:r>
+          </a:p>
+          <a:p>
+            <a:r>
+              <a:rPr lang="en-US" sz="1200" dirty="0"/>
+              <a:t>   ('girl', 0.02285511938486443),</a:t>
+            </a:r>
+          </a:p>
+          <a:p>
+            <a:r>
+              <a:rPr lang="en-US" sz="1200" dirty="0"/>
+              <a:t>   ('boy', 0.019789558883043304)]),</a:t>
+            </a:r>
+            <a:endParaRPr lang="he-IL" sz="1200" dirty="0"/>
+          </a:p>
+        </p:txBody>
+      </p:sp>
+      <p:sp>
+        <p:nvSpPr>
+          <p:cNvPr id="8" name="תיבת טקסט 7">
+            <a:extLst>
+              <a:ext uri="{FF2B5EF4-FFF2-40B4-BE49-F238E27FC236}">
+                <a16:creationId xmlns:a16="http://schemas.microsoft.com/office/drawing/2014/main" id="{7009FB34-8CC3-47E8-AB82-3DF668C3B26D}"/>
+              </a:ext>
+            </a:extLst>
+          </p:cNvPr>
+          <p:cNvSpPr txBox="1"/>
+          <p:nvPr/>
+        </p:nvSpPr>
+        <p:spPr>
+          <a:xfrm>
+            <a:off x="1031133" y="5612860"/>
+            <a:ext cx="1284050" cy="369332"/>
+          </a:xfrm>
+          <a:prstGeom prst="rect">
+            <a:avLst/>
+          </a:prstGeom>
+          <a:noFill/>
+        </p:spPr>
+        <p:txBody>
+          <a:bodyPr wrap="square" rtlCol="1">
+            <a:spAutoFit/>
+          </a:bodyPr>
+          <a:lstStyle/>
+          <a:p>
+            <a:r>
+              <a:rPr lang="en-US" dirty="0"/>
+              <a:t>Directors</a:t>
+            </a:r>
+            <a:endParaRPr lang="he-IL" dirty="0"/>
+          </a:p>
+        </p:txBody>
+      </p:sp>
+      <p:sp>
+        <p:nvSpPr>
+          <p:cNvPr id="9" name="תיבת טקסט 8">
+            <a:extLst>
+              <a:ext uri="{FF2B5EF4-FFF2-40B4-BE49-F238E27FC236}">
+                <a16:creationId xmlns:a16="http://schemas.microsoft.com/office/drawing/2014/main" id="{B0A0DB88-5DDA-4202-8367-084373858EA6}"/>
+              </a:ext>
+            </a:extLst>
+          </p:cNvPr>
+          <p:cNvSpPr txBox="1"/>
+          <p:nvPr/>
+        </p:nvSpPr>
+        <p:spPr>
+          <a:xfrm>
+            <a:off x="3828457" y="5584910"/>
+            <a:ext cx="1284050" cy="369332"/>
+          </a:xfrm>
+          <a:prstGeom prst="rect">
+            <a:avLst/>
+          </a:prstGeom>
+          <a:noFill/>
+        </p:spPr>
+        <p:txBody>
+          <a:bodyPr wrap="square" rtlCol="1">
+            <a:spAutoFit/>
+          </a:bodyPr>
+          <a:lstStyle/>
+          <a:p>
+            <a:r>
+              <a:rPr lang="en-US" dirty="0"/>
+              <a:t>Horror</a:t>
+            </a:r>
+            <a:endParaRPr lang="he-IL" dirty="0"/>
+          </a:p>
+        </p:txBody>
+      </p:sp>
+      <p:sp>
+        <p:nvSpPr>
+          <p:cNvPr id="10" name="תיבת טקסט 9">
+            <a:extLst>
+              <a:ext uri="{FF2B5EF4-FFF2-40B4-BE49-F238E27FC236}">
+                <a16:creationId xmlns:a16="http://schemas.microsoft.com/office/drawing/2014/main" id="{83689694-C87D-46BE-90F3-95305F726FCE}"/>
+              </a:ext>
+            </a:extLst>
+          </p:cNvPr>
+          <p:cNvSpPr txBox="1"/>
+          <p:nvPr/>
+        </p:nvSpPr>
+        <p:spPr>
+          <a:xfrm>
+            <a:off x="7431164" y="5584910"/>
+            <a:ext cx="1284050" cy="369332"/>
+          </a:xfrm>
+          <a:prstGeom prst="rect">
+            <a:avLst/>
+          </a:prstGeom>
+          <a:noFill/>
+        </p:spPr>
+        <p:txBody>
+          <a:bodyPr wrap="square" rtlCol="1">
+            <a:spAutoFit/>
+          </a:bodyPr>
+          <a:lstStyle/>
+          <a:p>
+            <a:r>
+              <a:rPr lang="en-US" dirty="0"/>
+              <a:t>Family</a:t>
+            </a:r>
+            <a:endParaRPr lang="he-IL" dirty="0"/>
+          </a:p>
+        </p:txBody>
+      </p:sp>
+    </p:spTree>
+    <p:extLst>
+      <p:ext uri="{BB962C8B-B14F-4D97-AF65-F5344CB8AC3E}">
+        <p14:creationId xmlns:p14="http://schemas.microsoft.com/office/powerpoint/2010/main" val="85337015"/>
+      </p:ext>
+    </p:extLst>
+  </p:cSld>
+  <p:clrMapOvr>
+    <a:masterClrMapping/>
+  </p:clrMapOvr>
+</p:sld>
+</file>
+
+<file path=ppt/slides/slide23.xml><?xml version="1.0" encoding="utf-8"?>
+<p:sld xmlns:a="http://schemas.openxmlformats.org/drawingml/2006/main" xmlns:r="http://schemas.openxmlformats.org/officeDocument/2006/relationships" xmlns:p="http://schemas.openxmlformats.org/presentationml/2006/main">
+  <p:cSld>
+    <p:spTree>
+      <p:nvGrpSpPr>
+        <p:cNvPr id="1" name=""/>
+        <p:cNvGrpSpPr/>
+        <p:nvPr/>
+      </p:nvGrpSpPr>
+      <p:grpSpPr>
+        <a:xfrm>
+          <a:off x="0" y="0"/>
+          <a:ext cx="0" cy="0"/>
+          <a:chOff x="0" y="0"/>
+          <a:chExt cx="0" cy="0"/>
+        </a:xfrm>
+      </p:grpSpPr>
+      <p:sp>
+        <p:nvSpPr>
+          <p:cNvPr id="2" name="כותרת 1">
+            <a:extLst>
+              <a:ext uri="{FF2B5EF4-FFF2-40B4-BE49-F238E27FC236}">
+                <a16:creationId xmlns:a16="http://schemas.microsoft.com/office/drawing/2014/main" id="{5EF63109-57FF-4909-8FC9-A7AD1F49FC56}"/>
+              </a:ext>
+            </a:extLst>
+          </p:cNvPr>
+          <p:cNvSpPr>
+            <a:spLocks noGrp="1"/>
+          </p:cNvSpPr>
+          <p:nvPr>
+            <p:ph type="title"/>
+          </p:nvPr>
+        </p:nvSpPr>
+        <p:spPr/>
+        <p:txBody>
+          <a:bodyPr/>
+          <a:lstStyle/>
+          <a:p>
+            <a:r>
+              <a:rPr lang="en-US" dirty="0"/>
+              <a:t>Main things we did and challenges</a:t>
+            </a:r>
+            <a:endParaRPr lang="he-IL" dirty="0"/>
+          </a:p>
+        </p:txBody>
+      </p:sp>
+      <p:sp>
+        <p:nvSpPr>
+          <p:cNvPr id="4" name="מציין מיקום תוכן 3">
+            <a:extLst>
+              <a:ext uri="{FF2B5EF4-FFF2-40B4-BE49-F238E27FC236}">
+                <a16:creationId xmlns:a16="http://schemas.microsoft.com/office/drawing/2014/main" id="{D1512E5A-B809-4F4B-A4ED-D899E7C8424A}"/>
+              </a:ext>
+            </a:extLst>
+          </p:cNvPr>
+          <p:cNvSpPr>
+            <a:spLocks noGrp="1"/>
+          </p:cNvSpPr>
+          <p:nvPr>
+            <p:ph sz="half" idx="2"/>
+          </p:nvPr>
+        </p:nvSpPr>
+        <p:spPr>
+          <a:xfrm>
+            <a:off x="1154954" y="2603500"/>
+            <a:ext cx="9878917" cy="3416300"/>
+          </a:xfrm>
+        </p:spPr>
+        <p:txBody>
+          <a:bodyPr/>
+          <a:lstStyle/>
+          <a:p>
+            <a:pPr algn="l" rtl="0"/>
+            <a:r>
+              <a:rPr lang="en-US" dirty="0"/>
+              <a:t>Topic Modelling – getting 14 topics</a:t>
+            </a:r>
+          </a:p>
+          <a:p>
+            <a:pPr lvl="1" algn="l" rtl="0"/>
+            <a:endParaRPr lang="en-US" dirty="0"/>
+          </a:p>
+          <a:p>
+            <a:pPr lvl="1" algn="l" rtl="0"/>
+            <a:endParaRPr lang="en-US" dirty="0"/>
+          </a:p>
+          <a:p>
+            <a:pPr lvl="1" algn="l" rtl="0"/>
+            <a:endParaRPr lang="en-US" dirty="0"/>
+          </a:p>
+          <a:p>
+            <a:pPr lvl="1" algn="l" rtl="0"/>
+            <a:endParaRPr lang="en-US" dirty="0"/>
+          </a:p>
+          <a:p>
+            <a:pPr lvl="1" algn="l" rtl="0"/>
+            <a:endParaRPr lang="he-IL" dirty="0"/>
+          </a:p>
+        </p:txBody>
+      </p:sp>
+      <p:sp>
+        <p:nvSpPr>
+          <p:cNvPr id="5" name="תיבת טקסט 4">
+            <a:extLst>
+              <a:ext uri="{FF2B5EF4-FFF2-40B4-BE49-F238E27FC236}">
+                <a16:creationId xmlns:a16="http://schemas.microsoft.com/office/drawing/2014/main" id="{AE5C6F31-EAF3-4D40-9BA1-73A78595F7B6}"/>
+              </a:ext>
+            </a:extLst>
+          </p:cNvPr>
+          <p:cNvSpPr txBox="1"/>
+          <p:nvPr/>
+        </p:nvSpPr>
+        <p:spPr>
+          <a:xfrm>
+            <a:off x="564204" y="3127443"/>
+            <a:ext cx="3083668" cy="2308324"/>
+          </a:xfrm>
+          <a:prstGeom prst="rect">
+            <a:avLst/>
+          </a:prstGeom>
+          <a:noFill/>
+        </p:spPr>
+        <p:txBody>
+          <a:bodyPr wrap="square" rtlCol="1">
+            <a:spAutoFit/>
+          </a:bodyPr>
+          <a:lstStyle/>
+          <a:p>
+            <a:r>
+              <a:rPr lang="en-US" sz="1200" dirty="0"/>
+              <a:t>(10,</a:t>
+            </a:r>
+          </a:p>
+          <a:p>
+            <a:r>
+              <a:rPr lang="en-US" sz="1200" dirty="0"/>
+              <a:t>  [('performance', 0.03530586137385641),</a:t>
+            </a:r>
+          </a:p>
+          <a:p>
+            <a:r>
+              <a:rPr lang="en-US" sz="1200" dirty="0"/>
+              <a:t>   ('story', 0.02670956737478679),</a:t>
+            </a:r>
+          </a:p>
+          <a:p>
+            <a:r>
+              <a:rPr lang="en-US" sz="1200" dirty="0"/>
+              <a:t>   ('book', 0.02293960303923089),</a:t>
+            </a:r>
+          </a:p>
+          <a:p>
+            <a:r>
+              <a:rPr lang="en-US" sz="1200" dirty="0"/>
+              <a:t>   ('role', 0.01312218948674213),</a:t>
+            </a:r>
+          </a:p>
+          <a:p>
+            <a:r>
+              <a:rPr lang="en-US" sz="1200" dirty="0"/>
+              <a:t>   ('drama', 0.012812063885873779),</a:t>
+            </a:r>
+          </a:p>
+          <a:p>
+            <a:r>
+              <a:rPr lang="en-US" sz="1200" dirty="0"/>
+              <a:t>   ('character', 0.011290510156613429),</a:t>
+            </a:r>
+          </a:p>
+          <a:p>
+            <a:r>
+              <a:rPr lang="en-US" sz="1200" dirty="0"/>
+              <a:t>   ('strong', 0.010631493254768181),</a:t>
+            </a:r>
+          </a:p>
+          <a:p>
+            <a:r>
+              <a:rPr lang="en-US" sz="1200" dirty="0"/>
+              <a:t>   ('viewer', 0.010059699178167158),</a:t>
+            </a:r>
+          </a:p>
+          <a:p>
+            <a:r>
+              <a:rPr lang="en-US" sz="1200" dirty="0"/>
+              <a:t>   ('work', 0.00969142502713599),</a:t>
+            </a:r>
+          </a:p>
+          <a:p>
+            <a:r>
+              <a:rPr lang="en-US" sz="1200" dirty="0"/>
+              <a:t>   ('brilliant', 0.009148705225616375)]),</a:t>
+            </a:r>
+            <a:endParaRPr lang="he-IL" sz="1200" dirty="0"/>
+          </a:p>
+        </p:txBody>
+      </p:sp>
+      <p:sp>
+        <p:nvSpPr>
+          <p:cNvPr id="6" name="תיבת טקסט 5">
+            <a:extLst>
+              <a:ext uri="{FF2B5EF4-FFF2-40B4-BE49-F238E27FC236}">
+                <a16:creationId xmlns:a16="http://schemas.microsoft.com/office/drawing/2014/main" id="{874C4DFE-26A2-436B-BE51-9F1BB546B538}"/>
+              </a:ext>
+            </a:extLst>
+          </p:cNvPr>
+          <p:cNvSpPr txBox="1"/>
+          <p:nvPr/>
+        </p:nvSpPr>
+        <p:spPr>
+          <a:xfrm>
+            <a:off x="3570673" y="3218663"/>
+            <a:ext cx="3083668" cy="2123658"/>
+          </a:xfrm>
+          <a:prstGeom prst="rect">
+            <a:avLst/>
+          </a:prstGeom>
+          <a:noFill/>
+        </p:spPr>
+        <p:txBody>
+          <a:bodyPr wrap="square" rtlCol="1">
+            <a:spAutoFit/>
+          </a:bodyPr>
+          <a:lstStyle/>
+          <a:p>
+            <a:r>
+              <a:rPr lang="en-US" sz="1200" dirty="0"/>
+              <a:t> (9,</a:t>
+            </a:r>
+          </a:p>
+          <a:p>
+            <a:r>
+              <a:rPr lang="en-US" sz="1200" dirty="0"/>
+              <a:t>  [('good', 0.049701941482089146),</a:t>
+            </a:r>
+          </a:p>
+          <a:p>
+            <a:r>
+              <a:rPr lang="en-US" sz="1200" dirty="0"/>
+              <a:t>   ('funny', 0.04608148755810774),</a:t>
+            </a:r>
+          </a:p>
+          <a:p>
+            <a:r>
+              <a:rPr lang="en-US" sz="1200" dirty="0"/>
+              <a:t>   ('actor', 0.03541700847689363),</a:t>
+            </a:r>
+          </a:p>
+          <a:p>
+            <a:r>
+              <a:rPr lang="en-US" sz="1200" dirty="0"/>
+              <a:t>   ('comedy', 0.03476073284112661),</a:t>
+            </a:r>
+          </a:p>
+          <a:p>
+            <a:r>
+              <a:rPr lang="en-US" sz="1200" dirty="0"/>
+              <a:t>   ('line', 0.0246322121957889),</a:t>
+            </a:r>
+          </a:p>
+          <a:p>
+            <a:r>
+              <a:rPr lang="en-US" sz="1200" dirty="0"/>
+              <a:t>   ('fun', 0.02306808859721083),</a:t>
+            </a:r>
+          </a:p>
+          <a:p>
+            <a:r>
+              <a:rPr lang="en-US" sz="1200" dirty="0"/>
+              <a:t>   ('humor', 0.018714793546622914),</a:t>
+            </a:r>
+          </a:p>
+          <a:p>
+            <a:r>
+              <a:rPr lang="en-US" sz="1200" dirty="0"/>
+              <a:t>   ('script', 0.017828821438337434),</a:t>
+            </a:r>
+          </a:p>
+          <a:p>
+            <a:r>
+              <a:rPr lang="en-US" sz="1200" dirty="0"/>
+              <a:t>   ('part', 0.01742411812961444),</a:t>
+            </a:r>
+          </a:p>
+          <a:p>
+            <a:r>
+              <a:rPr lang="en-US" sz="1200" dirty="0"/>
+              <a:t>   ('joke', 0.01332239540607055)]),</a:t>
+            </a:r>
+            <a:endParaRPr lang="he-IL" sz="1200" dirty="0"/>
+          </a:p>
+        </p:txBody>
+      </p:sp>
+      <p:sp>
+        <p:nvSpPr>
+          <p:cNvPr id="7" name="תיבת טקסט 6">
+            <a:extLst>
+              <a:ext uri="{FF2B5EF4-FFF2-40B4-BE49-F238E27FC236}">
+                <a16:creationId xmlns:a16="http://schemas.microsoft.com/office/drawing/2014/main" id="{3098E3FB-137C-41BD-87C7-3DACA83415EA}"/>
+              </a:ext>
+            </a:extLst>
+          </p:cNvPr>
+          <p:cNvSpPr txBox="1"/>
+          <p:nvPr/>
+        </p:nvSpPr>
+        <p:spPr>
+          <a:xfrm>
+            <a:off x="6654341" y="3249821"/>
+            <a:ext cx="3481880" cy="2123658"/>
+          </a:xfrm>
+          <a:prstGeom prst="rect">
+            <a:avLst/>
+          </a:prstGeom>
+          <a:noFill/>
+        </p:spPr>
+        <p:txBody>
+          <a:bodyPr wrap="square" rtlCol="1">
+            <a:spAutoFit/>
+          </a:bodyPr>
+          <a:lstStyle/>
+          <a:p>
+            <a:r>
+              <a:rPr lang="en-US" sz="1200" dirty="0"/>
+              <a:t> (13,</a:t>
+            </a:r>
+          </a:p>
+          <a:p>
+            <a:r>
+              <a:rPr lang="en-US" sz="1200" dirty="0"/>
+              <a:t>  [('people', 0.03337990698030509),</a:t>
+            </a:r>
+          </a:p>
+          <a:p>
+            <a:r>
+              <a:rPr lang="en-US" sz="1200" dirty="0"/>
+              <a:t>   ('life', 0.015407583210519264),</a:t>
+            </a:r>
+          </a:p>
+          <a:p>
+            <a:r>
+              <a:rPr lang="en-US" sz="1200" dirty="0"/>
+              <a:t>   ('war', 0.014737688288322774),</a:t>
+            </a:r>
+          </a:p>
+          <a:p>
+            <a:r>
+              <a:rPr lang="en-US" sz="1200" dirty="0"/>
+              <a:t>   ('history', 0.012536604972534308),</a:t>
+            </a:r>
+          </a:p>
+          <a:p>
+            <a:r>
+              <a:rPr lang="en-US" sz="1200" dirty="0"/>
+              <a:t>   ('</a:t>
+            </a:r>
+            <a:r>
+              <a:rPr lang="en-US" sz="1200" dirty="0" err="1"/>
+              <a:t>american</a:t>
+            </a:r>
+            <a:r>
+              <a:rPr lang="en-US" sz="1200" dirty="0"/>
+              <a:t>', 0.012105958236836564),</a:t>
+            </a:r>
+          </a:p>
+          <a:p>
+            <a:r>
+              <a:rPr lang="en-US" sz="1200" dirty="0"/>
+              <a:t>   ('point', 0.011397783604800276),</a:t>
+            </a:r>
+          </a:p>
+          <a:p>
+            <a:r>
+              <a:rPr lang="en-US" sz="1200" dirty="0"/>
+              <a:t>   ('world', 0.010814018029743334),</a:t>
+            </a:r>
+          </a:p>
+          <a:p>
+            <a:r>
+              <a:rPr lang="en-US" sz="1200" dirty="0"/>
+              <a:t>   ('documentary', 0.009981434340727697),</a:t>
+            </a:r>
+          </a:p>
+          <a:p>
+            <a:r>
+              <a:rPr lang="en-US" sz="1200" dirty="0"/>
+              <a:t>   ('event', 0.009646486879629452),</a:t>
+            </a:r>
+          </a:p>
+          <a:p>
+            <a:r>
+              <a:rPr lang="en-US" sz="1200" dirty="0"/>
+              <a:t>   ('country', 0.00917756043409191)]),</a:t>
+            </a:r>
+            <a:endParaRPr lang="he-IL" sz="1200" dirty="0"/>
+          </a:p>
+        </p:txBody>
+      </p:sp>
+      <p:sp>
+        <p:nvSpPr>
+          <p:cNvPr id="8" name="תיבת טקסט 7">
+            <a:extLst>
+              <a:ext uri="{FF2B5EF4-FFF2-40B4-BE49-F238E27FC236}">
+                <a16:creationId xmlns:a16="http://schemas.microsoft.com/office/drawing/2014/main" id="{D5D011D0-E384-4096-9099-567172AF1C9D}"/>
+              </a:ext>
+            </a:extLst>
+          </p:cNvPr>
+          <p:cNvSpPr txBox="1"/>
+          <p:nvPr/>
+        </p:nvSpPr>
+        <p:spPr>
+          <a:xfrm>
+            <a:off x="824213" y="5650468"/>
+            <a:ext cx="2171906" cy="369332"/>
+          </a:xfrm>
+          <a:prstGeom prst="rect">
+            <a:avLst/>
+          </a:prstGeom>
+          <a:noFill/>
+        </p:spPr>
+        <p:txBody>
+          <a:bodyPr wrap="square" rtlCol="1">
+            <a:spAutoFit/>
+          </a:bodyPr>
+          <a:lstStyle/>
+          <a:p>
+            <a:r>
+              <a:rPr lang="en-US" dirty="0"/>
+              <a:t>Performance</a:t>
+            </a:r>
+            <a:endParaRPr lang="he-IL" dirty="0"/>
+          </a:p>
+        </p:txBody>
+      </p:sp>
+      <p:sp>
+        <p:nvSpPr>
+          <p:cNvPr id="9" name="תיבת טקסט 8">
+            <a:extLst>
+              <a:ext uri="{FF2B5EF4-FFF2-40B4-BE49-F238E27FC236}">
+                <a16:creationId xmlns:a16="http://schemas.microsoft.com/office/drawing/2014/main" id="{4D208DE6-EAF8-4ECD-8814-C01AEE4E8200}"/>
+              </a:ext>
+            </a:extLst>
+          </p:cNvPr>
+          <p:cNvSpPr txBox="1"/>
+          <p:nvPr/>
+        </p:nvSpPr>
+        <p:spPr>
+          <a:xfrm>
+            <a:off x="3903050" y="5697191"/>
+            <a:ext cx="2565843" cy="369332"/>
+          </a:xfrm>
+          <a:prstGeom prst="rect">
+            <a:avLst/>
+          </a:prstGeom>
+          <a:noFill/>
+        </p:spPr>
+        <p:txBody>
+          <a:bodyPr wrap="square" rtlCol="1">
+            <a:spAutoFit/>
+          </a:bodyPr>
+          <a:lstStyle/>
+          <a:p>
+            <a:r>
+              <a:rPr lang="en-US" dirty="0"/>
+              <a:t>Funny and comedy</a:t>
+            </a:r>
+            <a:endParaRPr lang="he-IL" dirty="0"/>
+          </a:p>
+        </p:txBody>
+      </p:sp>
+      <p:sp>
+        <p:nvSpPr>
+          <p:cNvPr id="10" name="תיבת טקסט 9">
+            <a:extLst>
+              <a:ext uri="{FF2B5EF4-FFF2-40B4-BE49-F238E27FC236}">
+                <a16:creationId xmlns:a16="http://schemas.microsoft.com/office/drawing/2014/main" id="{CD54637B-EA51-49F3-9241-642A334D8F37}"/>
+              </a:ext>
+            </a:extLst>
+          </p:cNvPr>
+          <p:cNvSpPr txBox="1"/>
+          <p:nvPr/>
+        </p:nvSpPr>
+        <p:spPr>
+          <a:xfrm>
+            <a:off x="7118009" y="5673830"/>
+            <a:ext cx="2171906" cy="369332"/>
+          </a:xfrm>
+          <a:prstGeom prst="rect">
+            <a:avLst/>
+          </a:prstGeom>
+          <a:noFill/>
+        </p:spPr>
+        <p:txBody>
+          <a:bodyPr wrap="square" rtlCol="1">
+            <a:spAutoFit/>
+          </a:bodyPr>
+          <a:lstStyle/>
+          <a:p>
+            <a:r>
+              <a:rPr lang="en-US" dirty="0"/>
+              <a:t>History</a:t>
+            </a:r>
+            <a:endParaRPr lang="he-IL" dirty="0"/>
+          </a:p>
+        </p:txBody>
+      </p:sp>
+    </p:spTree>
+    <p:extLst>
+      <p:ext uri="{BB962C8B-B14F-4D97-AF65-F5344CB8AC3E}">
+        <p14:creationId xmlns:p14="http://schemas.microsoft.com/office/powerpoint/2010/main" val="3624624794"/>
+      </p:ext>
+    </p:extLst>
+  </p:cSld>
+  <p:clrMapOvr>
+    <a:masterClrMapping/>
+  </p:clrMapOvr>
+</p:sld>
+</file>
+
+<file path=ppt/slides/slide24.xml><?xml version="1.0" encoding="utf-8"?>
+<p:sld xmlns:a="http://schemas.openxmlformats.org/drawingml/2006/main" xmlns:r="http://schemas.openxmlformats.org/officeDocument/2006/relationships" xmlns:p="http://schemas.openxmlformats.org/presentationml/2006/main">
+  <p:cSld>
+    <p:spTree>
+      <p:nvGrpSpPr>
+        <p:cNvPr id="1" name=""/>
+        <p:cNvGrpSpPr/>
+        <p:nvPr/>
+      </p:nvGrpSpPr>
+      <p:grpSpPr>
+        <a:xfrm>
+          <a:off x="0" y="0"/>
+          <a:ext cx="0" cy="0"/>
+          <a:chOff x="0" y="0"/>
+          <a:chExt cx="0" cy="0"/>
+        </a:xfrm>
+      </p:grpSpPr>
+      <p:sp>
+        <p:nvSpPr>
+          <p:cNvPr id="2" name="כותרת 1">
+            <a:extLst>
+              <a:ext uri="{FF2B5EF4-FFF2-40B4-BE49-F238E27FC236}">
+                <a16:creationId xmlns:a16="http://schemas.microsoft.com/office/drawing/2014/main" id="{5EF63109-57FF-4909-8FC9-A7AD1F49FC56}"/>
+              </a:ext>
+            </a:extLst>
+          </p:cNvPr>
+          <p:cNvSpPr>
+            <a:spLocks noGrp="1"/>
+          </p:cNvSpPr>
+          <p:nvPr>
+            <p:ph type="title"/>
+          </p:nvPr>
+        </p:nvSpPr>
+        <p:spPr/>
+        <p:txBody>
+          <a:bodyPr/>
+          <a:lstStyle/>
+          <a:p>
+            <a:r>
+              <a:rPr lang="en-US" dirty="0"/>
+              <a:t>Main things we did and challenges</a:t>
+            </a:r>
+            <a:endParaRPr lang="he-IL" dirty="0"/>
+          </a:p>
+        </p:txBody>
+      </p:sp>
+      <p:sp>
+        <p:nvSpPr>
+          <p:cNvPr id="4" name="מציין מיקום תוכן 3">
+            <a:extLst>
+              <a:ext uri="{FF2B5EF4-FFF2-40B4-BE49-F238E27FC236}">
+                <a16:creationId xmlns:a16="http://schemas.microsoft.com/office/drawing/2014/main" id="{D1512E5A-B809-4F4B-A4ED-D899E7C8424A}"/>
+              </a:ext>
+            </a:extLst>
+          </p:cNvPr>
+          <p:cNvSpPr>
+            <a:spLocks noGrp="1"/>
+          </p:cNvSpPr>
+          <p:nvPr>
+            <p:ph sz="half" idx="2"/>
+          </p:nvPr>
+        </p:nvSpPr>
+        <p:spPr>
+          <a:xfrm>
+            <a:off x="1154954" y="2603500"/>
+            <a:ext cx="9878917" cy="3416300"/>
+          </a:xfrm>
+        </p:spPr>
+        <p:txBody>
+          <a:bodyPr/>
+          <a:lstStyle/>
+          <a:p>
+            <a:pPr algn="l" rtl="0"/>
+            <a:r>
+              <a:rPr lang="en-US" dirty="0"/>
+              <a:t>Topic Modelling – getting 14 topics</a:t>
+            </a:r>
+          </a:p>
+          <a:p>
+            <a:pPr lvl="1" algn="l" rtl="0"/>
+            <a:endParaRPr lang="en-US" dirty="0"/>
+          </a:p>
+          <a:p>
+            <a:pPr lvl="1" algn="l" rtl="0"/>
+            <a:endParaRPr lang="en-US" dirty="0"/>
+          </a:p>
+          <a:p>
+            <a:pPr lvl="1" algn="l" rtl="0"/>
+            <a:endParaRPr lang="en-US" dirty="0"/>
+          </a:p>
+          <a:p>
+            <a:pPr lvl="1" algn="l" rtl="0"/>
+            <a:endParaRPr lang="en-US" dirty="0"/>
+          </a:p>
+          <a:p>
+            <a:pPr lvl="1" algn="l" rtl="0"/>
+            <a:endParaRPr lang="he-IL" dirty="0"/>
+          </a:p>
+        </p:txBody>
+      </p:sp>
+      <p:sp>
+        <p:nvSpPr>
+          <p:cNvPr id="5" name="תיבת טקסט 4">
+            <a:extLst>
+              <a:ext uri="{FF2B5EF4-FFF2-40B4-BE49-F238E27FC236}">
+                <a16:creationId xmlns:a16="http://schemas.microsoft.com/office/drawing/2014/main" id="{AE5C6F31-EAF3-4D40-9BA1-73A78595F7B6}"/>
+              </a:ext>
+            </a:extLst>
+          </p:cNvPr>
+          <p:cNvSpPr txBox="1"/>
+          <p:nvPr/>
+        </p:nvSpPr>
+        <p:spPr>
+          <a:xfrm>
+            <a:off x="564204" y="3127443"/>
+            <a:ext cx="3083668" cy="2123658"/>
+          </a:xfrm>
+          <a:prstGeom prst="rect">
+            <a:avLst/>
+          </a:prstGeom>
+          <a:noFill/>
+        </p:spPr>
+        <p:txBody>
+          <a:bodyPr wrap="square" rtlCol="1">
+            <a:spAutoFit/>
+          </a:bodyPr>
+          <a:lstStyle/>
+          <a:p>
+            <a:r>
+              <a:rPr lang="en-US" sz="1200" dirty="0"/>
+              <a:t> (0,</a:t>
+            </a:r>
+          </a:p>
+          <a:p>
+            <a:r>
+              <a:rPr lang="en-US" sz="1200" dirty="0"/>
+              <a:t>  [('movie', 0.5241227369967113),</a:t>
+            </a:r>
+          </a:p>
+          <a:p>
+            <a:r>
+              <a:rPr lang="en-US" sz="1200" dirty="0"/>
+              <a:t>   ('people', 0.03708079227731835),</a:t>
+            </a:r>
+          </a:p>
+          <a:p>
+            <a:r>
+              <a:rPr lang="en-US" sz="1200" dirty="0"/>
+              <a:t>   ('bad', 0.032812882488798066),</a:t>
+            </a:r>
+          </a:p>
+          <a:p>
+            <a:r>
+              <a:rPr lang="en-US" sz="1200" dirty="0"/>
+              <a:t>   ('time', 0.02650148472173441),</a:t>
+            </a:r>
+          </a:p>
+          <a:p>
+            <a:r>
+              <a:rPr lang="en-US" sz="1200" dirty="0"/>
+              <a:t>   ('good', 0.02611833072575753),</a:t>
+            </a:r>
+          </a:p>
+          <a:p>
+            <a:r>
+              <a:rPr lang="en-US" sz="1200" dirty="0"/>
+              <a:t>   ('watch', 0.014964292176208266),</a:t>
+            </a:r>
+          </a:p>
+          <a:p>
+            <a:r>
+              <a:rPr lang="en-US" sz="1200" dirty="0"/>
+              <a:t>   ('thing', 0.012495077535468352),</a:t>
+            </a:r>
+          </a:p>
+          <a:p>
+            <a:r>
+              <a:rPr lang="en-US" sz="1200" dirty="0"/>
+              <a:t>   ('money', 0.011377545047202444),</a:t>
+            </a:r>
+          </a:p>
+          <a:p>
+            <a:r>
+              <a:rPr lang="en-US" sz="1200" dirty="0"/>
+              <a:t>   ('waste', 0.010462232723479889),</a:t>
+            </a:r>
+          </a:p>
+          <a:p>
+            <a:r>
+              <a:rPr lang="en-US" sz="1200" dirty="0"/>
+              <a:t>   ('theater', 0.010323871558266015)</a:t>
+            </a:r>
+            <a:endParaRPr lang="he-IL" sz="1200" dirty="0"/>
+          </a:p>
+        </p:txBody>
+      </p:sp>
+      <p:sp>
+        <p:nvSpPr>
+          <p:cNvPr id="8" name="תיבת טקסט 7">
+            <a:extLst>
+              <a:ext uri="{FF2B5EF4-FFF2-40B4-BE49-F238E27FC236}">
+                <a16:creationId xmlns:a16="http://schemas.microsoft.com/office/drawing/2014/main" id="{737F3DE3-A714-4E26-84D8-D2454DAA3317}"/>
+              </a:ext>
+            </a:extLst>
+          </p:cNvPr>
+          <p:cNvSpPr txBox="1"/>
+          <p:nvPr/>
+        </p:nvSpPr>
+        <p:spPr>
+          <a:xfrm>
+            <a:off x="882579" y="5590378"/>
+            <a:ext cx="2171906" cy="369332"/>
+          </a:xfrm>
+          <a:prstGeom prst="rect">
+            <a:avLst/>
+          </a:prstGeom>
+          <a:noFill/>
+        </p:spPr>
+        <p:txBody>
+          <a:bodyPr wrap="square" rtlCol="1">
+            <a:spAutoFit/>
+          </a:bodyPr>
+          <a:lstStyle/>
+          <a:p>
+            <a:r>
+              <a:rPr lang="en-US" dirty="0"/>
+              <a:t>Time on watching</a:t>
+            </a:r>
+            <a:endParaRPr lang="he-IL" dirty="0"/>
+          </a:p>
+        </p:txBody>
+      </p:sp>
+    </p:spTree>
+    <p:extLst>
+      <p:ext uri="{BB962C8B-B14F-4D97-AF65-F5344CB8AC3E}">
+        <p14:creationId xmlns:p14="http://schemas.microsoft.com/office/powerpoint/2010/main" val="846852919"/>
       </p:ext>
     </p:extLst>
   </p:cSld>

</xml_diff>